<commit_message>
1. Deviatoric strain & stress 정리 2. Distortion Strain Energy Density 정리 3. Von Mises Yield Criterion 정리 4. Countability.md 복습 5. basis.md 복습 6. eventually in.md 복습
</commit_message>
<xml_diff>
--- a/그림.pptx
+++ b/그림.pptx
@@ -28,6 +28,7 @@
     <p:sldId id="259" r:id="rId22"/>
     <p:sldId id="264" r:id="rId23"/>
     <p:sldId id="273" r:id="rId24"/>
+    <p:sldId id="281" r:id="rId25"/>
   </p:sldIdLst>
   <p:sldSz cx="12192000" cy="6858000"/>
   <p:notesSz cx="6858000" cy="9144000"/>
@@ -158,6 +159,7 @@
             <p14:sldId id="259"/>
             <p14:sldId id="264"/>
             <p14:sldId id="273"/>
+            <p14:sldId id="281"/>
           </p14:sldIdLst>
         </p14:section>
       </p14:sectionLst>
@@ -298,7 +300,7 @@
           <a:p>
             <a:fld id="{586A42AD-E6DF-43A8-BCEE-31B231F72482}" type="datetimeFigureOut">
               <a:rPr lang="ko-KR" altLang="en-US" smtClean="0"/>
-              <a:t>2022-09-23</a:t>
+              <a:t>2022-12-01</a:t>
             </a:fld>
             <a:endParaRPr lang="ko-KR" altLang="en-US"/>
           </a:p>
@@ -466,7 +468,7 @@
           <a:p>
             <a:fld id="{586A42AD-E6DF-43A8-BCEE-31B231F72482}" type="datetimeFigureOut">
               <a:rPr lang="ko-KR" altLang="en-US" smtClean="0"/>
-              <a:t>2022-09-23</a:t>
+              <a:t>2022-12-01</a:t>
             </a:fld>
             <a:endParaRPr lang="ko-KR" altLang="en-US"/>
           </a:p>
@@ -644,7 +646,7 @@
           <a:p>
             <a:fld id="{586A42AD-E6DF-43A8-BCEE-31B231F72482}" type="datetimeFigureOut">
               <a:rPr lang="ko-KR" altLang="en-US" smtClean="0"/>
-              <a:t>2022-09-23</a:t>
+              <a:t>2022-12-01</a:t>
             </a:fld>
             <a:endParaRPr lang="ko-KR" altLang="en-US"/>
           </a:p>
@@ -812,7 +814,7 @@
           <a:p>
             <a:fld id="{586A42AD-E6DF-43A8-BCEE-31B231F72482}" type="datetimeFigureOut">
               <a:rPr lang="ko-KR" altLang="en-US" smtClean="0"/>
-              <a:t>2022-09-23</a:t>
+              <a:t>2022-12-01</a:t>
             </a:fld>
             <a:endParaRPr lang="ko-KR" altLang="en-US"/>
           </a:p>
@@ -1057,7 +1059,7 @@
           <a:p>
             <a:fld id="{586A42AD-E6DF-43A8-BCEE-31B231F72482}" type="datetimeFigureOut">
               <a:rPr lang="ko-KR" altLang="en-US" smtClean="0"/>
-              <a:t>2022-09-23</a:t>
+              <a:t>2022-12-01</a:t>
             </a:fld>
             <a:endParaRPr lang="ko-KR" altLang="en-US"/>
           </a:p>
@@ -1286,7 +1288,7 @@
           <a:p>
             <a:fld id="{586A42AD-E6DF-43A8-BCEE-31B231F72482}" type="datetimeFigureOut">
               <a:rPr lang="ko-KR" altLang="en-US" smtClean="0"/>
-              <a:t>2022-09-23</a:t>
+              <a:t>2022-12-01</a:t>
             </a:fld>
             <a:endParaRPr lang="ko-KR" altLang="en-US"/>
           </a:p>
@@ -1650,7 +1652,7 @@
           <a:p>
             <a:fld id="{586A42AD-E6DF-43A8-BCEE-31B231F72482}" type="datetimeFigureOut">
               <a:rPr lang="ko-KR" altLang="en-US" smtClean="0"/>
-              <a:t>2022-09-23</a:t>
+              <a:t>2022-12-01</a:t>
             </a:fld>
             <a:endParaRPr lang="ko-KR" altLang="en-US"/>
           </a:p>
@@ -1767,7 +1769,7 @@
           <a:p>
             <a:fld id="{586A42AD-E6DF-43A8-BCEE-31B231F72482}" type="datetimeFigureOut">
               <a:rPr lang="ko-KR" altLang="en-US" smtClean="0"/>
-              <a:t>2022-09-23</a:t>
+              <a:t>2022-12-01</a:t>
             </a:fld>
             <a:endParaRPr lang="ko-KR" altLang="en-US"/>
           </a:p>
@@ -1862,7 +1864,7 @@
           <a:p>
             <a:fld id="{586A42AD-E6DF-43A8-BCEE-31B231F72482}" type="datetimeFigureOut">
               <a:rPr lang="ko-KR" altLang="en-US" smtClean="0"/>
-              <a:t>2022-09-23</a:t>
+              <a:t>2022-12-01</a:t>
             </a:fld>
             <a:endParaRPr lang="ko-KR" altLang="en-US"/>
           </a:p>
@@ -2137,7 +2139,7 @@
           <a:p>
             <a:fld id="{586A42AD-E6DF-43A8-BCEE-31B231F72482}" type="datetimeFigureOut">
               <a:rPr lang="ko-KR" altLang="en-US" smtClean="0"/>
-              <a:t>2022-09-23</a:t>
+              <a:t>2022-12-01</a:t>
             </a:fld>
             <a:endParaRPr lang="ko-KR" altLang="en-US"/>
           </a:p>
@@ -2389,7 +2391,7 @@
           <a:p>
             <a:fld id="{586A42AD-E6DF-43A8-BCEE-31B231F72482}" type="datetimeFigureOut">
               <a:rPr lang="ko-KR" altLang="en-US" smtClean="0"/>
-              <a:t>2022-09-23</a:t>
+              <a:t>2022-12-01</a:t>
             </a:fld>
             <a:endParaRPr lang="ko-KR" altLang="en-US"/>
           </a:p>
@@ -2600,7 +2602,7 @@
           <a:p>
             <a:fld id="{586A42AD-E6DF-43A8-BCEE-31B231F72482}" type="datetimeFigureOut">
               <a:rPr lang="ko-KR" altLang="en-US" smtClean="0"/>
-              <a:t>2022-09-23</a:t>
+              <a:t>2022-12-01</a:t>
             </a:fld>
             <a:endParaRPr lang="ko-KR" altLang="en-US"/>
           </a:p>
@@ -9604,7 +9606,7 @@
           <p:cNvPr id="71" name="자유형: 도형 18">
             <a:extLst>
               <a:ext uri="{FF2B5EF4-FFF2-40B4-BE49-F238E27FC236}">
-                <a16:creationId xmlns:a16="http://schemas.microsoft.com/office/drawing/2014/main" xmlns="" id="{28DE563C-2016-4934-A4EE-657070DFAE5E}"/>
+                <a16:creationId xmlns="" xmlns:a16="http://schemas.microsoft.com/office/drawing/2014/main" id="{28DE563C-2016-4934-A4EE-657070DFAE5E}"/>
               </a:ext>
             </a:extLst>
           </p:cNvPr>
@@ -9696,7 +9698,7 @@
               <p:cNvPr id="72" name="TextBox 71">
                 <a:extLst>
                   <a:ext uri="{FF2B5EF4-FFF2-40B4-BE49-F238E27FC236}">
-                    <a16:creationId xmlns:a16="http://schemas.microsoft.com/office/drawing/2014/main" xmlns="" id="{702F36E8-3840-4F82-ACA9-0ADC9BF2CD7E}"/>
+                    <a16:creationId xmlns="" xmlns:a16="http://schemas.microsoft.com/office/drawing/2014/main" id="{702F36E8-3840-4F82-ACA9-0ADC9BF2CD7E}"/>
                   </a:ext>
                 </a:extLst>
               </p:cNvPr>
@@ -9796,7 +9798,7 @@
           <p:cNvPr id="73" name="자유형: 도형 18">
             <a:extLst>
               <a:ext uri="{FF2B5EF4-FFF2-40B4-BE49-F238E27FC236}">
-                <a16:creationId xmlns:a16="http://schemas.microsoft.com/office/drawing/2014/main" xmlns="" id="{28DE563C-2016-4934-A4EE-657070DFAE5E}"/>
+                <a16:creationId xmlns="" xmlns:a16="http://schemas.microsoft.com/office/drawing/2014/main" id="{28DE563C-2016-4934-A4EE-657070DFAE5E}"/>
               </a:ext>
             </a:extLst>
           </p:cNvPr>
@@ -9888,7 +9890,7 @@
               <p:cNvPr id="74" name="TextBox 73">
                 <a:extLst>
                   <a:ext uri="{FF2B5EF4-FFF2-40B4-BE49-F238E27FC236}">
-                    <a16:creationId xmlns:a16="http://schemas.microsoft.com/office/drawing/2014/main" xmlns="" id="{702F36E8-3840-4F82-ACA9-0ADC9BF2CD7E}"/>
+                    <a16:creationId xmlns="" xmlns:a16="http://schemas.microsoft.com/office/drawing/2014/main" id="{702F36E8-3840-4F82-ACA9-0ADC9BF2CD7E}"/>
                   </a:ext>
                 </a:extLst>
               </p:cNvPr>
@@ -13126,8 +13128,8 @@
           </a:prstGeom>
         </p:spPr>
       </p:pic>
-      <mc:AlternateContent xmlns:mc="http://schemas.openxmlformats.org/markup-compatibility/2006">
-        <mc:Choice xmlns:a14="http://schemas.microsoft.com/office/drawing/2010/main" Requires="a14">
+      <mc:AlternateContent xmlns:mc="http://schemas.openxmlformats.org/markup-compatibility/2006" xmlns:a14="http://schemas.microsoft.com/office/drawing/2010/main">
+        <mc:Choice Requires="a14">
           <p:sp>
             <p:nvSpPr>
               <p:cNvPr id="53" name="TextBox 52"/>
@@ -13171,7 +13173,7 @@
             </p:txBody>
           </p:sp>
         </mc:Choice>
-        <mc:Fallback>
+        <mc:Fallback xmlns="">
           <p:sp>
             <p:nvSpPr>
               <p:cNvPr id="53" name="TextBox 52"/>
@@ -13210,8 +13212,8 @@
           </p:sp>
         </mc:Fallback>
       </mc:AlternateContent>
-      <mc:AlternateContent xmlns:mc="http://schemas.openxmlformats.org/markup-compatibility/2006">
-        <mc:Choice xmlns:a14="http://schemas.microsoft.com/office/drawing/2010/main" Requires="a14">
+      <mc:AlternateContent xmlns:mc="http://schemas.openxmlformats.org/markup-compatibility/2006" xmlns:a14="http://schemas.microsoft.com/office/drawing/2010/main">
+        <mc:Choice Requires="a14">
           <p:sp>
             <p:nvSpPr>
               <p:cNvPr id="32" name="TextBox 31"/>
@@ -13255,7 +13257,7 @@
             </p:txBody>
           </p:sp>
         </mc:Choice>
-        <mc:Fallback>
+        <mc:Fallback xmlns="">
           <p:sp>
             <p:nvSpPr>
               <p:cNvPr id="32" name="TextBox 31"/>
@@ -13364,8 +13366,8 @@
           </a:fontRef>
         </p:style>
       </p:cxnSp>
-      <mc:AlternateContent xmlns:mc="http://schemas.openxmlformats.org/markup-compatibility/2006">
-        <mc:Choice xmlns:a14="http://schemas.microsoft.com/office/drawing/2010/main" Requires="a14">
+      <mc:AlternateContent xmlns:mc="http://schemas.openxmlformats.org/markup-compatibility/2006" xmlns:a14="http://schemas.microsoft.com/office/drawing/2010/main">
+        <mc:Choice Requires="a14">
           <p:sp>
             <p:nvSpPr>
               <p:cNvPr id="52" name="TextBox 51"/>
@@ -13409,7 +13411,7 @@
             </p:txBody>
           </p:sp>
         </mc:Choice>
-        <mc:Fallback>
+        <mc:Fallback xmlns="">
           <p:sp>
             <p:nvSpPr>
               <p:cNvPr id="52" name="TextBox 51"/>
@@ -13448,8 +13450,8 @@
           </p:sp>
         </mc:Fallback>
       </mc:AlternateContent>
-      <mc:AlternateContent xmlns:mc="http://schemas.openxmlformats.org/markup-compatibility/2006">
-        <mc:Choice xmlns:a14="http://schemas.microsoft.com/office/drawing/2010/main" Requires="a14">
+      <mc:AlternateContent xmlns:mc="http://schemas.openxmlformats.org/markup-compatibility/2006" xmlns:a14="http://schemas.microsoft.com/office/drawing/2010/main">
+        <mc:Choice Requires="a14">
           <p:sp>
             <p:nvSpPr>
               <p:cNvPr id="54" name="TextBox 53"/>
@@ -13493,7 +13495,7 @@
             </p:txBody>
           </p:sp>
         </mc:Choice>
-        <mc:Fallback>
+        <mc:Fallback xmlns="">
           <p:sp>
             <p:nvSpPr>
               <p:cNvPr id="54" name="TextBox 53"/>
@@ -14260,7 +14262,7 @@
           <p:cNvPr id="27" name="직선 화살표 연결선 26">
             <a:extLst>
               <a:ext uri="{FF2B5EF4-FFF2-40B4-BE49-F238E27FC236}">
-                <a16:creationId xmlns:a16="http://schemas.microsoft.com/office/drawing/2014/main" xmlns="" id="{C93B29A1-F190-44D3-A9D0-DFAD4F83776E}"/>
+                <a16:creationId xmlns="" xmlns:a16="http://schemas.microsoft.com/office/drawing/2014/main" id="{C93B29A1-F190-44D3-A9D0-DFAD4F83776E}"/>
               </a:ext>
             </a:extLst>
           </p:cNvPr>
@@ -14306,7 +14308,7 @@
               <p:cNvPr id="28" name="TextBox 27">
                 <a:extLst>
                   <a:ext uri="{FF2B5EF4-FFF2-40B4-BE49-F238E27FC236}">
-                    <a16:creationId xmlns:a16="http://schemas.microsoft.com/office/drawing/2014/main" xmlns="" id="{07B5ABC4-CAA0-493B-ACDF-C42A51522079}"/>
+                    <a16:creationId xmlns="" xmlns:a16="http://schemas.microsoft.com/office/drawing/2014/main" id="{07B5ABC4-CAA0-493B-ACDF-C42A51522079}"/>
                   </a:ext>
                 </a:extLst>
               </p:cNvPr>
@@ -14419,7 +14421,7 @@
           <p:cNvPr id="29" name="직선 화살표 연결선 28">
             <a:extLst>
               <a:ext uri="{FF2B5EF4-FFF2-40B4-BE49-F238E27FC236}">
-                <a16:creationId xmlns:a16="http://schemas.microsoft.com/office/drawing/2014/main" xmlns="" id="{782BF86B-4207-4FE7-8DAC-CEB1861B292A}"/>
+                <a16:creationId xmlns="" xmlns:a16="http://schemas.microsoft.com/office/drawing/2014/main" id="{782BF86B-4207-4FE7-8DAC-CEB1861B292A}"/>
               </a:ext>
             </a:extLst>
           </p:cNvPr>
@@ -14465,7 +14467,7 @@
               <p:cNvPr id="32" name="TextBox 31">
                 <a:extLst>
                   <a:ext uri="{FF2B5EF4-FFF2-40B4-BE49-F238E27FC236}">
-                    <a16:creationId xmlns:a16="http://schemas.microsoft.com/office/drawing/2014/main" xmlns="" id="{5DB3AE05-D351-4E8F-8481-E70A4D8B443E}"/>
+                    <a16:creationId xmlns="" xmlns:a16="http://schemas.microsoft.com/office/drawing/2014/main" id="{5DB3AE05-D351-4E8F-8481-E70A4D8B443E}"/>
                   </a:ext>
                 </a:extLst>
               </p:cNvPr>
@@ -14559,7 +14561,7 @@
           <p:cNvPr id="33" name="직선 화살표 연결선 32">
             <a:extLst>
               <a:ext uri="{FF2B5EF4-FFF2-40B4-BE49-F238E27FC236}">
-                <a16:creationId xmlns:a16="http://schemas.microsoft.com/office/drawing/2014/main" xmlns="" id="{F5FC4C0A-B591-4F3B-BD15-9D9E5EC72772}"/>
+                <a16:creationId xmlns="" xmlns:a16="http://schemas.microsoft.com/office/drawing/2014/main" id="{F5FC4C0A-B591-4F3B-BD15-9D9E5EC72772}"/>
               </a:ext>
             </a:extLst>
           </p:cNvPr>
@@ -14605,7 +14607,7 @@
               <p:cNvPr id="38" name="TextBox 37">
                 <a:extLst>
                   <a:ext uri="{FF2B5EF4-FFF2-40B4-BE49-F238E27FC236}">
-                    <a16:creationId xmlns:a16="http://schemas.microsoft.com/office/drawing/2014/main" xmlns="" id="{EC18DB71-3399-4E5E-B321-6A9670FF95D7}"/>
+                    <a16:creationId xmlns="" xmlns:a16="http://schemas.microsoft.com/office/drawing/2014/main" id="{EC18DB71-3399-4E5E-B321-6A9670FF95D7}"/>
                   </a:ext>
                 </a:extLst>
               </p:cNvPr>
@@ -15364,7 +15366,7 @@
           <p:cNvPr id="4" name="내용 개체 틀 5">
             <a:extLst>
               <a:ext uri="{FF2B5EF4-FFF2-40B4-BE49-F238E27FC236}">
-                <a16:creationId xmlns="" xmlns:a16="http://schemas.microsoft.com/office/drawing/2014/main" id="{26E65B15-652C-471C-B503-9BD1A7ECA9FF}"/>
+                <a16:creationId xmlns:a16="http://schemas.microsoft.com/office/drawing/2014/main" xmlns="" id="{26E65B15-652C-471C-B503-9BD1A7ECA9FF}"/>
               </a:ext>
             </a:extLst>
           </p:cNvPr>
@@ -15393,7 +15395,7 @@
           <p:cNvPr id="5" name="그림 4">
             <a:extLst>
               <a:ext uri="{FF2B5EF4-FFF2-40B4-BE49-F238E27FC236}">
-                <a16:creationId xmlns="" xmlns:a16="http://schemas.microsoft.com/office/drawing/2014/main" id="{8D86471E-9C3A-40C3-8F27-66A11AC93C24}"/>
+                <a16:creationId xmlns:a16="http://schemas.microsoft.com/office/drawing/2014/main" xmlns="" id="{8D86471E-9C3A-40C3-8F27-66A11AC93C24}"/>
               </a:ext>
             </a:extLst>
           </p:cNvPr>
@@ -15640,6 +15642,60 @@
     <p:extLst>
       <p:ext uri="{BB962C8B-B14F-4D97-AF65-F5344CB8AC3E}">
         <p14:creationId xmlns:p14="http://schemas.microsoft.com/office/powerpoint/2010/main" val="3151026552"/>
+      </p:ext>
+    </p:extLst>
+  </p:cSld>
+  <p:clrMapOvr>
+    <a:masterClrMapping/>
+  </p:clrMapOvr>
+</p:sld>
+</file>
+
+<file path=ppt/slides/slide24.xml><?xml version="1.0" encoding="utf-8"?>
+<p:sld xmlns:a="http://schemas.openxmlformats.org/drawingml/2006/main" xmlns:r="http://schemas.openxmlformats.org/officeDocument/2006/relationships" xmlns:p="http://schemas.openxmlformats.org/presentationml/2006/main">
+  <p:cSld>
+    <p:spTree>
+      <p:nvGrpSpPr>
+        <p:cNvPr id="1" name=""/>
+        <p:cNvGrpSpPr/>
+        <p:nvPr/>
+      </p:nvGrpSpPr>
+      <p:grpSpPr>
+        <a:xfrm>
+          <a:off x="0" y="0"/>
+          <a:ext cx="0" cy="0"/>
+          <a:chOff x="0" y="0"/>
+          <a:chExt cx="0" cy="0"/>
+        </a:xfrm>
+      </p:grpSpPr>
+      <p:pic>
+        <p:nvPicPr>
+          <p:cNvPr id="4" name="그림 3"/>
+          <p:cNvPicPr>
+            <a:picLocks noChangeAspect="1"/>
+          </p:cNvPicPr>
+          <p:nvPr/>
+        </p:nvPicPr>
+        <p:blipFill>
+          <a:blip r:embed="rId2"/>
+          <a:stretch>
+            <a:fillRect/>
+          </a:stretch>
+        </p:blipFill>
+        <p:spPr>
+          <a:xfrm>
+            <a:off x="162485" y="0"/>
+            <a:ext cx="11867030" cy="6858000"/>
+          </a:xfrm>
+          <a:prstGeom prst="rect">
+            <a:avLst/>
+          </a:prstGeom>
+        </p:spPr>
+      </p:pic>
+    </p:spTree>
+    <p:extLst>
+      <p:ext uri="{BB962C8B-B14F-4D97-AF65-F5344CB8AC3E}">
+        <p14:creationId xmlns:p14="http://schemas.microsoft.com/office/powerpoint/2010/main" val="760118274"/>
       </p:ext>
     </p:extLst>
   </p:cSld>
@@ -16149,7 +16205,7 @@
           <p:cNvPr id="9" name="그룹 8">
             <a:extLst>
               <a:ext uri="{FF2B5EF4-FFF2-40B4-BE49-F238E27FC236}">
-                <a16:creationId xmlns:a16="http://schemas.microsoft.com/office/drawing/2014/main" xmlns="" id="{F54825A1-879E-45C3-84C9-39758CFBC1AD}"/>
+                <a16:creationId xmlns="" xmlns:a16="http://schemas.microsoft.com/office/drawing/2014/main" id="{F54825A1-879E-45C3-84C9-39758CFBC1AD}"/>
               </a:ext>
             </a:extLst>
           </p:cNvPr>
@@ -16572,7 +16628,7 @@
           <p:cNvPr id="19" name="자유형: 도형 18">
             <a:extLst>
               <a:ext uri="{FF2B5EF4-FFF2-40B4-BE49-F238E27FC236}">
-                <a16:creationId xmlns:a16="http://schemas.microsoft.com/office/drawing/2014/main" xmlns="" id="{28DE563C-2016-4934-A4EE-657070DFAE5E}"/>
+                <a16:creationId xmlns="" xmlns:a16="http://schemas.microsoft.com/office/drawing/2014/main" id="{28DE563C-2016-4934-A4EE-657070DFAE5E}"/>
               </a:ext>
             </a:extLst>
           </p:cNvPr>
@@ -16664,7 +16720,7 @@
               <p:cNvPr id="22" name="TextBox 21">
                 <a:extLst>
                   <a:ext uri="{FF2B5EF4-FFF2-40B4-BE49-F238E27FC236}">
-                    <a16:creationId xmlns:a16="http://schemas.microsoft.com/office/drawing/2014/main" xmlns="" id="{702F36E8-3840-4F82-ACA9-0ADC9BF2CD7E}"/>
+                    <a16:creationId xmlns="" xmlns:a16="http://schemas.microsoft.com/office/drawing/2014/main" id="{702F36E8-3840-4F82-ACA9-0ADC9BF2CD7E}"/>
                   </a:ext>
                 </a:extLst>
               </p:cNvPr>
@@ -16785,7 +16841,7 @@
           <p:cNvPr id="23" name="자유형: 도형 22">
             <a:extLst>
               <a:ext uri="{FF2B5EF4-FFF2-40B4-BE49-F238E27FC236}">
-                <a16:creationId xmlns:a16="http://schemas.microsoft.com/office/drawing/2014/main" xmlns="" id="{D4262DC8-AC8F-4E4E-8F9A-78963014DDC7}"/>
+                <a16:creationId xmlns="" xmlns:a16="http://schemas.microsoft.com/office/drawing/2014/main" id="{D4262DC8-AC8F-4E4E-8F9A-78963014DDC7}"/>
               </a:ext>
             </a:extLst>
           </p:cNvPr>
@@ -16877,7 +16933,7 @@
               <p:cNvPr id="26" name="TextBox 25">
                 <a:extLst>
                   <a:ext uri="{FF2B5EF4-FFF2-40B4-BE49-F238E27FC236}">
-                    <a16:creationId xmlns:a16="http://schemas.microsoft.com/office/drawing/2014/main" xmlns="" id="{4C456F18-AA04-4135-AED2-7569217695DC}"/>
+                    <a16:creationId xmlns="" xmlns:a16="http://schemas.microsoft.com/office/drawing/2014/main" id="{4C456F18-AA04-4135-AED2-7569217695DC}"/>
                   </a:ext>
                 </a:extLst>
               </p:cNvPr>
@@ -17757,7 +17813,7 @@
           <p:cNvPr id="19" name="자유형: 도형 18">
             <a:extLst>
               <a:ext uri="{FF2B5EF4-FFF2-40B4-BE49-F238E27FC236}">
-                <a16:creationId xmlns:a16="http://schemas.microsoft.com/office/drawing/2014/main" xmlns="" id="{28DE563C-2016-4934-A4EE-657070DFAE5E}"/>
+                <a16:creationId xmlns="" xmlns:a16="http://schemas.microsoft.com/office/drawing/2014/main" id="{28DE563C-2016-4934-A4EE-657070DFAE5E}"/>
               </a:ext>
             </a:extLst>
           </p:cNvPr>
@@ -17849,7 +17905,7 @@
               <p:cNvPr id="22" name="TextBox 21">
                 <a:extLst>
                   <a:ext uri="{FF2B5EF4-FFF2-40B4-BE49-F238E27FC236}">
-                    <a16:creationId xmlns:a16="http://schemas.microsoft.com/office/drawing/2014/main" xmlns="" id="{702F36E8-3840-4F82-ACA9-0ADC9BF2CD7E}"/>
+                    <a16:creationId xmlns="" xmlns:a16="http://schemas.microsoft.com/office/drawing/2014/main" id="{702F36E8-3840-4F82-ACA9-0ADC9BF2CD7E}"/>
                   </a:ext>
                 </a:extLst>
               </p:cNvPr>
@@ -17970,7 +18026,7 @@
           <p:cNvPr id="23" name="자유형: 도형 22">
             <a:extLst>
               <a:ext uri="{FF2B5EF4-FFF2-40B4-BE49-F238E27FC236}">
-                <a16:creationId xmlns:a16="http://schemas.microsoft.com/office/drawing/2014/main" xmlns="" id="{D4262DC8-AC8F-4E4E-8F9A-78963014DDC7}"/>
+                <a16:creationId xmlns="" xmlns:a16="http://schemas.microsoft.com/office/drawing/2014/main" id="{D4262DC8-AC8F-4E4E-8F9A-78963014DDC7}"/>
               </a:ext>
             </a:extLst>
           </p:cNvPr>
@@ -18062,7 +18118,7 @@
               <p:cNvPr id="26" name="TextBox 25">
                 <a:extLst>
                   <a:ext uri="{FF2B5EF4-FFF2-40B4-BE49-F238E27FC236}">
-                    <a16:creationId xmlns:a16="http://schemas.microsoft.com/office/drawing/2014/main" xmlns="" id="{4C456F18-AA04-4135-AED2-7569217695DC}"/>
+                    <a16:creationId xmlns="" xmlns:a16="http://schemas.microsoft.com/office/drawing/2014/main" id="{4C456F18-AA04-4135-AED2-7569217695DC}"/>
                   </a:ext>
                 </a:extLst>
               </p:cNvPr>
@@ -18185,7 +18241,7 @@
               <p:cNvPr id="21" name="TextBox 20">
                 <a:extLst>
                   <a:ext uri="{FF2B5EF4-FFF2-40B4-BE49-F238E27FC236}">
-                    <a16:creationId xmlns:a16="http://schemas.microsoft.com/office/drawing/2014/main" xmlns="" id="{7F1A4031-C0F9-4078-B611-60510E555779}"/>
+                    <a16:creationId xmlns="" xmlns:a16="http://schemas.microsoft.com/office/drawing/2014/main" id="{7F1A4031-C0F9-4078-B611-60510E555779}"/>
                   </a:ext>
                 </a:extLst>
               </p:cNvPr>
@@ -18298,7 +18354,7 @@
           <p:cNvPr id="27" name="원호 26">
             <a:extLst>
               <a:ext uri="{FF2B5EF4-FFF2-40B4-BE49-F238E27FC236}">
-                <a16:creationId xmlns:a16="http://schemas.microsoft.com/office/drawing/2014/main" xmlns="" id="{73F2FA99-BAB3-4AEA-A0D4-FFD161E5142F}"/>
+                <a16:creationId xmlns="" xmlns:a16="http://schemas.microsoft.com/office/drawing/2014/main" id="{73F2FA99-BAB3-4AEA-A0D4-FFD161E5142F}"/>
               </a:ext>
             </a:extLst>
           </p:cNvPr>

</xml_diff>

<commit_message>
* CSM  * Beam
* continuum mechanics
 * stress
</commit_message>
<xml_diff>
--- a/그림.pptx
+++ b/그림.pptx
@@ -35,13 +35,14 @@
     <p:sldId id="276" r:id="rId29"/>
     <p:sldId id="277" r:id="rId30"/>
     <p:sldId id="278" r:id="rId31"/>
-    <p:sldId id="279" r:id="rId32"/>
-    <p:sldId id="280" r:id="rId33"/>
-    <p:sldId id="272" r:id="rId34"/>
-    <p:sldId id="259" r:id="rId35"/>
-    <p:sldId id="264" r:id="rId36"/>
-    <p:sldId id="273" r:id="rId37"/>
-    <p:sldId id="281" r:id="rId38"/>
+    <p:sldId id="301" r:id="rId32"/>
+    <p:sldId id="279" r:id="rId33"/>
+    <p:sldId id="280" r:id="rId34"/>
+    <p:sldId id="272" r:id="rId35"/>
+    <p:sldId id="259" r:id="rId36"/>
+    <p:sldId id="264" r:id="rId37"/>
+    <p:sldId id="273" r:id="rId38"/>
+    <p:sldId id="281" r:id="rId39"/>
   </p:sldIdLst>
   <p:sldSz cx="12192000" cy="6858000"/>
   <p:notesSz cx="6858000" cy="9144000"/>
@@ -175,6 +176,7 @@
             <p14:sldId id="276"/>
             <p14:sldId id="277"/>
             <p14:sldId id="278"/>
+            <p14:sldId id="301"/>
             <p14:sldId id="279"/>
             <p14:sldId id="280"/>
             <p14:sldId id="272"/>
@@ -326,7 +328,7 @@
           <a:p>
             <a:fld id="{586A42AD-E6DF-43A8-BCEE-31B231F72482}" type="datetimeFigureOut">
               <a:rPr lang="ko-KR" altLang="en-US" smtClean="0"/>
-              <a:t>2023-01-12</a:t>
+              <a:t>2023-01-17</a:t>
             </a:fld>
             <a:endParaRPr lang="ko-KR" altLang="en-US"/>
           </a:p>
@@ -494,7 +496,7 @@
           <a:p>
             <a:fld id="{586A42AD-E6DF-43A8-BCEE-31B231F72482}" type="datetimeFigureOut">
               <a:rPr lang="ko-KR" altLang="en-US" smtClean="0"/>
-              <a:t>2023-01-12</a:t>
+              <a:t>2023-01-17</a:t>
             </a:fld>
             <a:endParaRPr lang="ko-KR" altLang="en-US"/>
           </a:p>
@@ -672,7 +674,7 @@
           <a:p>
             <a:fld id="{586A42AD-E6DF-43A8-BCEE-31B231F72482}" type="datetimeFigureOut">
               <a:rPr lang="ko-KR" altLang="en-US" smtClean="0"/>
-              <a:t>2023-01-12</a:t>
+              <a:t>2023-01-17</a:t>
             </a:fld>
             <a:endParaRPr lang="ko-KR" altLang="en-US"/>
           </a:p>
@@ -840,7 +842,7 @@
           <a:p>
             <a:fld id="{586A42AD-E6DF-43A8-BCEE-31B231F72482}" type="datetimeFigureOut">
               <a:rPr lang="ko-KR" altLang="en-US" smtClean="0"/>
-              <a:t>2023-01-12</a:t>
+              <a:t>2023-01-17</a:t>
             </a:fld>
             <a:endParaRPr lang="ko-KR" altLang="en-US"/>
           </a:p>
@@ -1085,7 +1087,7 @@
           <a:p>
             <a:fld id="{586A42AD-E6DF-43A8-BCEE-31B231F72482}" type="datetimeFigureOut">
               <a:rPr lang="ko-KR" altLang="en-US" smtClean="0"/>
-              <a:t>2023-01-12</a:t>
+              <a:t>2023-01-17</a:t>
             </a:fld>
             <a:endParaRPr lang="ko-KR" altLang="en-US"/>
           </a:p>
@@ -1314,7 +1316,7 @@
           <a:p>
             <a:fld id="{586A42AD-E6DF-43A8-BCEE-31B231F72482}" type="datetimeFigureOut">
               <a:rPr lang="ko-KR" altLang="en-US" smtClean="0"/>
-              <a:t>2023-01-12</a:t>
+              <a:t>2023-01-17</a:t>
             </a:fld>
             <a:endParaRPr lang="ko-KR" altLang="en-US"/>
           </a:p>
@@ -1678,7 +1680,7 @@
           <a:p>
             <a:fld id="{586A42AD-E6DF-43A8-BCEE-31B231F72482}" type="datetimeFigureOut">
               <a:rPr lang="ko-KR" altLang="en-US" smtClean="0"/>
-              <a:t>2023-01-12</a:t>
+              <a:t>2023-01-17</a:t>
             </a:fld>
             <a:endParaRPr lang="ko-KR" altLang="en-US"/>
           </a:p>
@@ -1795,7 +1797,7 @@
           <a:p>
             <a:fld id="{586A42AD-E6DF-43A8-BCEE-31B231F72482}" type="datetimeFigureOut">
               <a:rPr lang="ko-KR" altLang="en-US" smtClean="0"/>
-              <a:t>2023-01-12</a:t>
+              <a:t>2023-01-17</a:t>
             </a:fld>
             <a:endParaRPr lang="ko-KR" altLang="en-US"/>
           </a:p>
@@ -1890,7 +1892,7 @@
           <a:p>
             <a:fld id="{586A42AD-E6DF-43A8-BCEE-31B231F72482}" type="datetimeFigureOut">
               <a:rPr lang="ko-KR" altLang="en-US" smtClean="0"/>
-              <a:t>2023-01-12</a:t>
+              <a:t>2023-01-17</a:t>
             </a:fld>
             <a:endParaRPr lang="ko-KR" altLang="en-US"/>
           </a:p>
@@ -2165,7 +2167,7 @@
           <a:p>
             <a:fld id="{586A42AD-E6DF-43A8-BCEE-31B231F72482}" type="datetimeFigureOut">
               <a:rPr lang="ko-KR" altLang="en-US" smtClean="0"/>
-              <a:t>2023-01-12</a:t>
+              <a:t>2023-01-17</a:t>
             </a:fld>
             <a:endParaRPr lang="ko-KR" altLang="en-US"/>
           </a:p>
@@ -2417,7 +2419,7 @@
           <a:p>
             <a:fld id="{586A42AD-E6DF-43A8-BCEE-31B231F72482}" type="datetimeFigureOut">
               <a:rPr lang="ko-KR" altLang="en-US" smtClean="0"/>
-              <a:t>2023-01-12</a:t>
+              <a:t>2023-01-17</a:t>
             </a:fld>
             <a:endParaRPr lang="ko-KR" altLang="en-US"/>
           </a:p>
@@ -2628,7 +2630,7 @@
           <a:p>
             <a:fld id="{586A42AD-E6DF-43A8-BCEE-31B231F72482}" type="datetimeFigureOut">
               <a:rPr lang="ko-KR" altLang="en-US" smtClean="0"/>
-              <a:t>2023-01-12</a:t>
+              <a:t>2023-01-17</a:t>
             </a:fld>
             <a:endParaRPr lang="ko-KR" altLang="en-US"/>
           </a:p>
@@ -12229,8 +12231,8 @@
           </a:p>
         </p:txBody>
       </p:sp>
-      <mc:AlternateContent xmlns:mc="http://schemas.openxmlformats.org/markup-compatibility/2006">
-        <mc:Choice xmlns:a14="http://schemas.microsoft.com/office/drawing/2010/main" Requires="a14">
+      <mc:AlternateContent xmlns:mc="http://schemas.openxmlformats.org/markup-compatibility/2006" xmlns:a14="http://schemas.microsoft.com/office/drawing/2010/main">
+        <mc:Choice Requires="a14">
           <p:sp>
             <p:nvSpPr>
               <p:cNvPr id="47" name="TextBox 46"/>
@@ -12274,7 +12276,7 @@
             </p:txBody>
           </p:sp>
         </mc:Choice>
-        <mc:Fallback>
+        <mc:Fallback xmlns="">
           <p:sp>
             <p:nvSpPr>
               <p:cNvPr id="47" name="TextBox 46"/>
@@ -12313,8 +12315,8 @@
           </p:sp>
         </mc:Fallback>
       </mc:AlternateContent>
-      <mc:AlternateContent xmlns:mc="http://schemas.openxmlformats.org/markup-compatibility/2006">
-        <mc:Choice xmlns:a14="http://schemas.microsoft.com/office/drawing/2010/main" Requires="a14">
+      <mc:AlternateContent xmlns:mc="http://schemas.openxmlformats.org/markup-compatibility/2006" xmlns:a14="http://schemas.microsoft.com/office/drawing/2010/main">
+        <mc:Choice Requires="a14">
           <p:sp>
             <p:nvSpPr>
               <p:cNvPr id="48" name="TextBox 47"/>
@@ -12358,7 +12360,7 @@
             </p:txBody>
           </p:sp>
         </mc:Choice>
-        <mc:Fallback>
+        <mc:Fallback xmlns="">
           <p:sp>
             <p:nvSpPr>
               <p:cNvPr id="48" name="TextBox 47"/>
@@ -12397,8 +12399,8 @@
           </p:sp>
         </mc:Fallback>
       </mc:AlternateContent>
-      <mc:AlternateContent xmlns:mc="http://schemas.openxmlformats.org/markup-compatibility/2006">
-        <mc:Choice xmlns:a14="http://schemas.microsoft.com/office/drawing/2010/main" Requires="a14">
+      <mc:AlternateContent xmlns:mc="http://schemas.openxmlformats.org/markup-compatibility/2006" xmlns:a14="http://schemas.microsoft.com/office/drawing/2010/main">
+        <mc:Choice Requires="a14">
           <p:sp>
             <p:nvSpPr>
               <p:cNvPr id="49" name="TextBox 48"/>
@@ -12442,7 +12444,7 @@
             </p:txBody>
           </p:sp>
         </mc:Choice>
-        <mc:Fallback>
+        <mc:Fallback xmlns="">
           <p:sp>
             <p:nvSpPr>
               <p:cNvPr id="49" name="TextBox 48"/>
@@ -12481,8 +12483,8 @@
           </p:sp>
         </mc:Fallback>
       </mc:AlternateContent>
-      <mc:AlternateContent xmlns:mc="http://schemas.openxmlformats.org/markup-compatibility/2006">
-        <mc:Choice xmlns:a14="http://schemas.microsoft.com/office/drawing/2010/main" Requires="a14">
+      <mc:AlternateContent xmlns:mc="http://schemas.openxmlformats.org/markup-compatibility/2006" xmlns:a14="http://schemas.microsoft.com/office/drawing/2010/main">
+        <mc:Choice Requires="a14">
           <p:sp>
             <p:nvSpPr>
               <p:cNvPr id="50" name="TextBox 49"/>
@@ -12526,7 +12528,7 @@
             </p:txBody>
           </p:sp>
         </mc:Choice>
-        <mc:Fallback>
+        <mc:Fallback xmlns="">
           <p:sp>
             <p:nvSpPr>
               <p:cNvPr id="50" name="TextBox 49"/>
@@ -23254,7 +23256,7 @@
           <p:cNvPr id="27" name="직선 화살표 연결선 26">
             <a:extLst>
               <a:ext uri="{FF2B5EF4-FFF2-40B4-BE49-F238E27FC236}">
-                <a16:creationId xmlns:a16="http://schemas.microsoft.com/office/drawing/2014/main" xmlns="" id="{C93B29A1-F190-44D3-A9D0-DFAD4F83776E}"/>
+                <a16:creationId xmlns="" xmlns:a16="http://schemas.microsoft.com/office/drawing/2014/main" id="{C93B29A1-F190-44D3-A9D0-DFAD4F83776E}"/>
               </a:ext>
             </a:extLst>
           </p:cNvPr>
@@ -23300,7 +23302,7 @@
               <p:cNvPr id="28" name="TextBox 27">
                 <a:extLst>
                   <a:ext uri="{FF2B5EF4-FFF2-40B4-BE49-F238E27FC236}">
-                    <a16:creationId xmlns:a16="http://schemas.microsoft.com/office/drawing/2014/main" xmlns="" id="{07B5ABC4-CAA0-493B-ACDF-C42A51522079}"/>
+                    <a16:creationId xmlns="" xmlns:a16="http://schemas.microsoft.com/office/drawing/2014/main" id="{07B5ABC4-CAA0-493B-ACDF-C42A51522079}"/>
                   </a:ext>
                 </a:extLst>
               </p:cNvPr>
@@ -23413,7 +23415,7 @@
           <p:cNvPr id="29" name="직선 화살표 연결선 28">
             <a:extLst>
               <a:ext uri="{FF2B5EF4-FFF2-40B4-BE49-F238E27FC236}">
-                <a16:creationId xmlns:a16="http://schemas.microsoft.com/office/drawing/2014/main" xmlns="" id="{782BF86B-4207-4FE7-8DAC-CEB1861B292A}"/>
+                <a16:creationId xmlns="" xmlns:a16="http://schemas.microsoft.com/office/drawing/2014/main" id="{782BF86B-4207-4FE7-8DAC-CEB1861B292A}"/>
               </a:ext>
             </a:extLst>
           </p:cNvPr>
@@ -23459,7 +23461,7 @@
               <p:cNvPr id="32" name="TextBox 31">
                 <a:extLst>
                   <a:ext uri="{FF2B5EF4-FFF2-40B4-BE49-F238E27FC236}">
-                    <a16:creationId xmlns:a16="http://schemas.microsoft.com/office/drawing/2014/main" xmlns="" id="{5DB3AE05-D351-4E8F-8481-E70A4D8B443E}"/>
+                    <a16:creationId xmlns="" xmlns:a16="http://schemas.microsoft.com/office/drawing/2014/main" id="{5DB3AE05-D351-4E8F-8481-E70A4D8B443E}"/>
                   </a:ext>
                 </a:extLst>
               </p:cNvPr>
@@ -23553,7 +23555,7 @@
           <p:cNvPr id="33" name="직선 화살표 연결선 32">
             <a:extLst>
               <a:ext uri="{FF2B5EF4-FFF2-40B4-BE49-F238E27FC236}">
-                <a16:creationId xmlns:a16="http://schemas.microsoft.com/office/drawing/2014/main" xmlns="" id="{F5FC4C0A-B591-4F3B-BD15-9D9E5EC72772}"/>
+                <a16:creationId xmlns="" xmlns:a16="http://schemas.microsoft.com/office/drawing/2014/main" id="{F5FC4C0A-B591-4F3B-BD15-9D9E5EC72772}"/>
               </a:ext>
             </a:extLst>
           </p:cNvPr>
@@ -23599,7 +23601,7 @@
               <p:cNvPr id="38" name="TextBox 37">
                 <a:extLst>
                   <a:ext uri="{FF2B5EF4-FFF2-40B4-BE49-F238E27FC236}">
-                    <a16:creationId xmlns:a16="http://schemas.microsoft.com/office/drawing/2014/main" xmlns="" id="{EC18DB71-3399-4E5E-B321-6A9670FF95D7}"/>
+                    <a16:creationId xmlns="" xmlns:a16="http://schemas.microsoft.com/office/drawing/2014/main" id="{EC18DB71-3399-4E5E-B321-6A9670FF95D7}"/>
                   </a:ext>
                 </a:extLst>
               </p:cNvPr>
@@ -26372,7 +26374,7 @@
           <p:cNvPr id="9" name="그룹 8">
             <a:extLst>
               <a:ext uri="{FF2B5EF4-FFF2-40B4-BE49-F238E27FC236}">
-                <a16:creationId xmlns:a16="http://schemas.microsoft.com/office/drawing/2014/main" xmlns="" id="{F54825A1-879E-45C3-84C9-39758CFBC1AD}"/>
+                <a16:creationId xmlns="" xmlns:a16="http://schemas.microsoft.com/office/drawing/2014/main" id="{F54825A1-879E-45C3-84C9-39758CFBC1AD}"/>
               </a:ext>
             </a:extLst>
           </p:cNvPr>
@@ -26795,7 +26797,7 @@
           <p:cNvPr id="19" name="자유형: 도형 18">
             <a:extLst>
               <a:ext uri="{FF2B5EF4-FFF2-40B4-BE49-F238E27FC236}">
-                <a16:creationId xmlns:a16="http://schemas.microsoft.com/office/drawing/2014/main" xmlns="" id="{28DE563C-2016-4934-A4EE-657070DFAE5E}"/>
+                <a16:creationId xmlns="" xmlns:a16="http://schemas.microsoft.com/office/drawing/2014/main" id="{28DE563C-2016-4934-A4EE-657070DFAE5E}"/>
               </a:ext>
             </a:extLst>
           </p:cNvPr>
@@ -26887,7 +26889,7 @@
               <p:cNvPr id="22" name="TextBox 21">
                 <a:extLst>
                   <a:ext uri="{FF2B5EF4-FFF2-40B4-BE49-F238E27FC236}">
-                    <a16:creationId xmlns:a16="http://schemas.microsoft.com/office/drawing/2014/main" xmlns="" id="{702F36E8-3840-4F82-ACA9-0ADC9BF2CD7E}"/>
+                    <a16:creationId xmlns="" xmlns:a16="http://schemas.microsoft.com/office/drawing/2014/main" id="{702F36E8-3840-4F82-ACA9-0ADC9BF2CD7E}"/>
                   </a:ext>
                 </a:extLst>
               </p:cNvPr>
@@ -27008,7 +27010,7 @@
           <p:cNvPr id="23" name="자유형: 도형 22">
             <a:extLst>
               <a:ext uri="{FF2B5EF4-FFF2-40B4-BE49-F238E27FC236}">
-                <a16:creationId xmlns:a16="http://schemas.microsoft.com/office/drawing/2014/main" xmlns="" id="{D4262DC8-AC8F-4E4E-8F9A-78963014DDC7}"/>
+                <a16:creationId xmlns="" xmlns:a16="http://schemas.microsoft.com/office/drawing/2014/main" id="{D4262DC8-AC8F-4E4E-8F9A-78963014DDC7}"/>
               </a:ext>
             </a:extLst>
           </p:cNvPr>
@@ -27100,7 +27102,7 @@
               <p:cNvPr id="26" name="TextBox 25">
                 <a:extLst>
                   <a:ext uri="{FF2B5EF4-FFF2-40B4-BE49-F238E27FC236}">
-                    <a16:creationId xmlns:a16="http://schemas.microsoft.com/office/drawing/2014/main" xmlns="" id="{4C456F18-AA04-4135-AED2-7569217695DC}"/>
+                    <a16:creationId xmlns="" xmlns:a16="http://schemas.microsoft.com/office/drawing/2014/main" id="{4C456F18-AA04-4135-AED2-7569217695DC}"/>
                   </a:ext>
                 </a:extLst>
               </p:cNvPr>
@@ -27980,7 +27982,7 @@
           <p:cNvPr id="19" name="자유형: 도형 18">
             <a:extLst>
               <a:ext uri="{FF2B5EF4-FFF2-40B4-BE49-F238E27FC236}">
-                <a16:creationId xmlns:a16="http://schemas.microsoft.com/office/drawing/2014/main" xmlns="" id="{28DE563C-2016-4934-A4EE-657070DFAE5E}"/>
+                <a16:creationId xmlns="" xmlns:a16="http://schemas.microsoft.com/office/drawing/2014/main" id="{28DE563C-2016-4934-A4EE-657070DFAE5E}"/>
               </a:ext>
             </a:extLst>
           </p:cNvPr>
@@ -28072,7 +28074,7 @@
               <p:cNvPr id="22" name="TextBox 21">
                 <a:extLst>
                   <a:ext uri="{FF2B5EF4-FFF2-40B4-BE49-F238E27FC236}">
-                    <a16:creationId xmlns:a16="http://schemas.microsoft.com/office/drawing/2014/main" xmlns="" id="{702F36E8-3840-4F82-ACA9-0ADC9BF2CD7E}"/>
+                    <a16:creationId xmlns="" xmlns:a16="http://schemas.microsoft.com/office/drawing/2014/main" id="{702F36E8-3840-4F82-ACA9-0ADC9BF2CD7E}"/>
                   </a:ext>
                 </a:extLst>
               </p:cNvPr>
@@ -28193,7 +28195,7 @@
           <p:cNvPr id="23" name="자유형: 도형 22">
             <a:extLst>
               <a:ext uri="{FF2B5EF4-FFF2-40B4-BE49-F238E27FC236}">
-                <a16:creationId xmlns:a16="http://schemas.microsoft.com/office/drawing/2014/main" xmlns="" id="{D4262DC8-AC8F-4E4E-8F9A-78963014DDC7}"/>
+                <a16:creationId xmlns="" xmlns:a16="http://schemas.microsoft.com/office/drawing/2014/main" id="{D4262DC8-AC8F-4E4E-8F9A-78963014DDC7}"/>
               </a:ext>
             </a:extLst>
           </p:cNvPr>
@@ -28285,7 +28287,7 @@
               <p:cNvPr id="26" name="TextBox 25">
                 <a:extLst>
                   <a:ext uri="{FF2B5EF4-FFF2-40B4-BE49-F238E27FC236}">
-                    <a16:creationId xmlns:a16="http://schemas.microsoft.com/office/drawing/2014/main" xmlns="" id="{4C456F18-AA04-4135-AED2-7569217695DC}"/>
+                    <a16:creationId xmlns="" xmlns:a16="http://schemas.microsoft.com/office/drawing/2014/main" id="{4C456F18-AA04-4135-AED2-7569217695DC}"/>
                   </a:ext>
                 </a:extLst>
               </p:cNvPr>
@@ -28408,7 +28410,7 @@
               <p:cNvPr id="21" name="TextBox 20">
                 <a:extLst>
                   <a:ext uri="{FF2B5EF4-FFF2-40B4-BE49-F238E27FC236}">
-                    <a16:creationId xmlns:a16="http://schemas.microsoft.com/office/drawing/2014/main" xmlns="" id="{7F1A4031-C0F9-4078-B611-60510E555779}"/>
+                    <a16:creationId xmlns="" xmlns:a16="http://schemas.microsoft.com/office/drawing/2014/main" id="{7F1A4031-C0F9-4078-B611-60510E555779}"/>
                   </a:ext>
                 </a:extLst>
               </p:cNvPr>
@@ -28521,7 +28523,7 @@
           <p:cNvPr id="27" name="원호 26">
             <a:extLst>
               <a:ext uri="{FF2B5EF4-FFF2-40B4-BE49-F238E27FC236}">
-                <a16:creationId xmlns:a16="http://schemas.microsoft.com/office/drawing/2014/main" xmlns="" id="{73F2FA99-BAB3-4AEA-A0D4-FFD161E5142F}"/>
+                <a16:creationId xmlns="" xmlns:a16="http://schemas.microsoft.com/office/drawing/2014/main" id="{73F2FA99-BAB3-4AEA-A0D4-FFD161E5142F}"/>
               </a:ext>
             </a:extLst>
           </p:cNvPr>
@@ -33557,7 +33559,7 @@
           <p:cNvPr id="71" name="자유형: 도형 18">
             <a:extLst>
               <a:ext uri="{FF2B5EF4-FFF2-40B4-BE49-F238E27FC236}">
-                <a16:creationId xmlns:a16="http://schemas.microsoft.com/office/drawing/2014/main" xmlns="" id="{28DE563C-2016-4934-A4EE-657070DFAE5E}"/>
+                <a16:creationId xmlns="" xmlns:a16="http://schemas.microsoft.com/office/drawing/2014/main" id="{28DE563C-2016-4934-A4EE-657070DFAE5E}"/>
               </a:ext>
             </a:extLst>
           </p:cNvPr>
@@ -33649,7 +33651,7 @@
               <p:cNvPr id="72" name="TextBox 71">
                 <a:extLst>
                   <a:ext uri="{FF2B5EF4-FFF2-40B4-BE49-F238E27FC236}">
-                    <a16:creationId xmlns:a16="http://schemas.microsoft.com/office/drawing/2014/main" xmlns="" id="{702F36E8-3840-4F82-ACA9-0ADC9BF2CD7E}"/>
+                    <a16:creationId xmlns="" xmlns:a16="http://schemas.microsoft.com/office/drawing/2014/main" id="{702F36E8-3840-4F82-ACA9-0ADC9BF2CD7E}"/>
                   </a:ext>
                 </a:extLst>
               </p:cNvPr>
@@ -33749,7 +33751,7 @@
           <p:cNvPr id="73" name="자유형: 도형 18">
             <a:extLst>
               <a:ext uri="{FF2B5EF4-FFF2-40B4-BE49-F238E27FC236}">
-                <a16:creationId xmlns:a16="http://schemas.microsoft.com/office/drawing/2014/main" xmlns="" id="{28DE563C-2016-4934-A4EE-657070DFAE5E}"/>
+                <a16:creationId xmlns="" xmlns:a16="http://schemas.microsoft.com/office/drawing/2014/main" id="{28DE563C-2016-4934-A4EE-657070DFAE5E}"/>
               </a:ext>
             </a:extLst>
           </p:cNvPr>
@@ -33841,7 +33843,7 @@
               <p:cNvPr id="74" name="TextBox 73">
                 <a:extLst>
                   <a:ext uri="{FF2B5EF4-FFF2-40B4-BE49-F238E27FC236}">
-                    <a16:creationId xmlns:a16="http://schemas.microsoft.com/office/drawing/2014/main" xmlns="" id="{702F36E8-3840-4F82-ACA9-0ADC9BF2CD7E}"/>
+                    <a16:creationId xmlns="" xmlns:a16="http://schemas.microsoft.com/office/drawing/2014/main" id="{702F36E8-3840-4F82-ACA9-0ADC9BF2CD7E}"/>
                   </a:ext>
                 </a:extLst>
               </p:cNvPr>
@@ -35160,13 +35162,74 @@
       </p:grpSpPr>
       <p:sp>
         <p:nvSpPr>
+          <p:cNvPr id="2" name="제목 1"/>
+          <p:cNvSpPr>
+            <a:spLocks noGrp="1"/>
+          </p:cNvSpPr>
+          <p:nvPr>
+            <p:ph type="title"/>
+          </p:nvPr>
+        </p:nvSpPr>
+        <p:spPr>
+          <a:xfrm>
+            <a:off x="884695" y="2658874"/>
+            <a:ext cx="10515600" cy="1325563"/>
+          </a:xfrm>
+        </p:spPr>
+        <p:txBody>
+          <a:bodyPr>
+            <a:noAutofit/>
+          </a:bodyPr>
+          <a:lstStyle/>
+          <a:p>
+            <a:pPr algn="ctr"/>
+            <a:r>
+              <a:rPr lang="en-US" altLang="ko-KR" sz="13800" b="1" smtClean="0"/>
+              <a:t>Continuum</a:t>
+            </a:r>
+            <a:endParaRPr lang="ko-KR" altLang="en-US" sz="13800" b="1"/>
+          </a:p>
+        </p:txBody>
+      </p:sp>
+    </p:spTree>
+    <p:extLst>
+      <p:ext uri="{BB962C8B-B14F-4D97-AF65-F5344CB8AC3E}">
+        <p14:creationId xmlns:p14="http://schemas.microsoft.com/office/powerpoint/2010/main" val="541654971"/>
+      </p:ext>
+    </p:extLst>
+  </p:cSld>
+  <p:clrMapOvr>
+    <a:masterClrMapping/>
+  </p:clrMapOvr>
+</p:sld>
+</file>
+
+<file path=ppt/slides/slide32.xml><?xml version="1.0" encoding="utf-8"?>
+<p:sld xmlns:a="http://schemas.openxmlformats.org/drawingml/2006/main" xmlns:r="http://schemas.openxmlformats.org/officeDocument/2006/relationships" xmlns:p="http://schemas.openxmlformats.org/presentationml/2006/main">
+  <p:cSld>
+    <p:spTree>
+      <p:nvGrpSpPr>
+        <p:cNvPr id="1" name=""/>
+        <p:cNvGrpSpPr/>
+        <p:nvPr/>
+      </p:nvGrpSpPr>
+      <p:grpSpPr>
+        <a:xfrm>
+          <a:off x="0" y="0"/>
+          <a:ext cx="0" cy="0"/>
+          <a:chOff x="0" y="0"/>
+          <a:chExt cx="0" cy="0"/>
+        </a:xfrm>
+      </p:grpSpPr>
+      <p:sp>
+        <p:nvSpPr>
           <p:cNvPr id="40" name="직사각형 39"/>
           <p:cNvSpPr/>
           <p:nvPr/>
         </p:nvSpPr>
         <p:spPr>
           <a:xfrm>
-            <a:off x="3918471" y="3585795"/>
+            <a:off x="8719071" y="3852495"/>
             <a:ext cx="1800000" cy="1080000"/>
           </a:xfrm>
           <a:prstGeom prst="rect">
@@ -35214,7 +35277,7 @@
         </p:nvCxnSpPr>
         <p:spPr>
           <a:xfrm>
-            <a:off x="5718471" y="4125795"/>
+            <a:off x="10519071" y="4392495"/>
             <a:ext cx="720000" cy="0"/>
           </a:xfrm>
           <a:prstGeom prst="straightConnector1">
@@ -35251,7 +35314,7 @@
         </p:nvCxnSpPr>
         <p:spPr>
           <a:xfrm flipH="1" flipV="1">
-            <a:off x="5832527" y="3569896"/>
+            <a:off x="10633127" y="3836596"/>
             <a:ext cx="0" cy="1080000"/>
           </a:xfrm>
           <a:prstGeom prst="straightConnector1">
@@ -35280,8 +35343,8 @@
           </a:fontRef>
         </p:style>
       </p:cxnSp>
-      <mc:AlternateContent xmlns:mc="http://schemas.openxmlformats.org/markup-compatibility/2006" xmlns:a14="http://schemas.microsoft.com/office/drawing/2010/main">
-        <mc:Choice Requires="a14">
+      <mc:AlternateContent xmlns:mc="http://schemas.openxmlformats.org/markup-compatibility/2006">
+        <mc:Choice xmlns:a14="http://schemas.microsoft.com/office/drawing/2010/main" Requires="a14">
           <p:sp>
             <p:nvSpPr>
               <p:cNvPr id="45" name="TextBox 44"/>
@@ -35290,7 +35353,7 @@
             </p:nvSpPr>
             <p:spPr>
               <a:xfrm>
-                <a:off x="6188937" y="4226205"/>
+                <a:off x="10989537" y="4492905"/>
                 <a:ext cx="996491" cy="279628"/>
               </a:xfrm>
               <a:prstGeom prst="rect">
@@ -35391,7 +35454,7 @@
             </p:txBody>
           </p:sp>
         </mc:Choice>
-        <mc:Fallback xmlns="">
+        <mc:Fallback>
           <p:sp>
             <p:nvSpPr>
               <p:cNvPr id="45" name="TextBox 44"/>
@@ -35402,7 +35465,7 @@
             </p:nvSpPr>
             <p:spPr>
               <a:xfrm>
-                <a:off x="6188937" y="4226205"/>
+                <a:off x="10989537" y="4492905"/>
                 <a:ext cx="996491" cy="279628"/>
               </a:xfrm>
               <a:prstGeom prst="rect">
@@ -35411,7 +35474,7 @@
               <a:blipFill rotWithShape="0">
                 <a:blip r:embed="rId2"/>
                 <a:stretch>
-                  <a:fillRect l="-1829" r="-610" b="-21739"/>
+                  <a:fillRect l="-1840" r="-613" b="-21739"/>
                 </a:stretch>
               </a:blipFill>
             </p:spPr>
@@ -35430,303 +35493,288 @@
           </p:sp>
         </mc:Fallback>
       </mc:AlternateContent>
-      <p:grpSp>
-        <p:nvGrpSpPr>
-          <p:cNvPr id="6" name="그룹 5"/>
-          <p:cNvGrpSpPr/>
+      <p:cxnSp>
+        <p:nvCxnSpPr>
+          <p:cNvPr id="82" name="직선 화살표 연결선 81"/>
+          <p:cNvCxnSpPr/>
           <p:nvPr/>
-        </p:nvGrpSpPr>
-        <p:grpSpPr>
+        </p:nvCxnSpPr>
+        <p:spPr>
           <a:xfrm>
-            <a:off x="2686603" y="5037121"/>
-            <a:ext cx="841610" cy="1016042"/>
-            <a:chOff x="2686603" y="5037121"/>
-            <a:chExt cx="841610" cy="1016042"/>
+            <a:off x="7487203" y="6041785"/>
+            <a:ext cx="511868" cy="1266"/>
           </a:xfrm>
-        </p:grpSpPr>
-        <p:cxnSp>
-          <p:nvCxnSpPr>
-            <p:cNvPr id="82" name="직선 화살표 연결선 81"/>
-            <p:cNvCxnSpPr/>
-            <p:nvPr/>
-          </p:nvCxnSpPr>
-          <p:spPr>
-            <a:xfrm>
-              <a:off x="2686603" y="5775085"/>
-              <a:ext cx="511868" cy="1266"/>
-            </a:xfrm>
-            <a:prstGeom prst="straightConnector1">
-              <a:avLst/>
-            </a:prstGeom>
-            <a:ln w="28575">
-              <a:solidFill>
-                <a:schemeClr val="tx1"/>
-              </a:solidFill>
-              <a:headEnd type="none" w="med" len="med"/>
-              <a:tailEnd type="none" w="med" len="med"/>
-            </a:ln>
-          </p:spPr>
-          <p:style>
-            <a:lnRef idx="1">
-              <a:schemeClr val="accent1"/>
-            </a:lnRef>
-            <a:fillRef idx="0">
-              <a:schemeClr val="accent1"/>
-            </a:fillRef>
-            <a:effectRef idx="0">
-              <a:schemeClr val="accent1"/>
-            </a:effectRef>
-            <a:fontRef idx="minor">
+          <a:prstGeom prst="straightConnector1">
+            <a:avLst/>
+          </a:prstGeom>
+          <a:ln w="28575">
+            <a:solidFill>
               <a:schemeClr val="tx1"/>
-            </a:fontRef>
-          </p:style>
-        </p:cxnSp>
-        <p:cxnSp>
-          <p:nvCxnSpPr>
-            <p:cNvPr id="83" name="직선 화살표 연결선 82"/>
-            <p:cNvCxnSpPr/>
-            <p:nvPr/>
-          </p:nvCxnSpPr>
-          <p:spPr>
-            <a:xfrm flipV="1">
-              <a:off x="2696129" y="5275033"/>
-              <a:ext cx="815" cy="501318"/>
-            </a:xfrm>
-            <a:prstGeom prst="straightConnector1">
-              <a:avLst/>
-            </a:prstGeom>
-            <a:ln w="28575">
-              <a:solidFill>
-                <a:schemeClr val="tx1"/>
-              </a:solidFill>
-              <a:headEnd type="none" w="med" len="med"/>
-              <a:tailEnd type="none" w="med" len="med"/>
-            </a:ln>
-          </p:spPr>
-          <p:style>
-            <a:lnRef idx="1">
-              <a:schemeClr val="accent1"/>
-            </a:lnRef>
-            <a:fillRef idx="0">
-              <a:schemeClr val="accent1"/>
-            </a:fillRef>
-            <a:effectRef idx="0">
-              <a:schemeClr val="accent1"/>
-            </a:effectRef>
-            <a:fontRef idx="minor">
+            </a:solidFill>
+            <a:headEnd type="none" w="med" len="med"/>
+            <a:tailEnd type="none" w="med" len="med"/>
+          </a:ln>
+        </p:spPr>
+        <p:style>
+          <a:lnRef idx="1">
+            <a:schemeClr val="accent1"/>
+          </a:lnRef>
+          <a:fillRef idx="0">
+            <a:schemeClr val="accent1"/>
+          </a:fillRef>
+          <a:effectRef idx="0">
+            <a:schemeClr val="accent1"/>
+          </a:effectRef>
+          <a:fontRef idx="minor">
+            <a:schemeClr val="tx1"/>
+          </a:fontRef>
+        </p:style>
+      </p:cxnSp>
+      <p:cxnSp>
+        <p:nvCxnSpPr>
+          <p:cNvPr id="83" name="직선 화살표 연결선 82"/>
+          <p:cNvCxnSpPr/>
+          <p:nvPr/>
+        </p:nvCxnSpPr>
+        <p:spPr>
+          <a:xfrm flipV="1">
+            <a:off x="7496729" y="5541733"/>
+            <a:ext cx="815" cy="501318"/>
+          </a:xfrm>
+          <a:prstGeom prst="straightConnector1">
+            <a:avLst/>
+          </a:prstGeom>
+          <a:ln w="28575">
+            <a:solidFill>
               <a:schemeClr val="tx1"/>
-            </a:fontRef>
-          </p:style>
-        </p:cxnSp>
-        <mc:AlternateContent xmlns:mc="http://schemas.openxmlformats.org/markup-compatibility/2006" xmlns:a14="http://schemas.microsoft.com/office/drawing/2010/main">
-          <mc:Choice Requires="a14">
-            <p:sp>
-              <p:nvSpPr>
-                <p:cNvPr id="84" name="TextBox 83"/>
-                <p:cNvSpPr txBox="1"/>
-                <p:nvPr/>
-              </p:nvSpPr>
-              <p:spPr>
-                <a:xfrm>
-                  <a:off x="2822077" y="5037121"/>
-                  <a:ext cx="325153" cy="276999"/>
-                </a:xfrm>
-                <a:prstGeom prst="rect">
-                  <a:avLst/>
-                </a:prstGeom>
-                <a:noFill/>
-              </p:spPr>
-              <p:txBody>
-                <a:bodyPr wrap="none" lIns="0" tIns="0" rIns="0" bIns="0" rtlCol="0">
-                  <a:spAutoFit/>
-                </a:bodyPr>
-                <a:lstStyle/>
-                <a:p>
-                  <a:pPr/>
-                  <a14:m>
-                    <m:oMathPara xmlns:m="http://schemas.openxmlformats.org/officeDocument/2006/math">
-                      <m:oMathParaPr>
-                        <m:jc m:val="centerGroup"/>
-                      </m:oMathParaPr>
-                      <m:oMath xmlns:m="http://schemas.openxmlformats.org/officeDocument/2006/math">
-                        <m:sSup>
-                          <m:sSupPr>
-                            <m:ctrlPr>
-                              <a:rPr lang="en-US" altLang="ko-KR" b="0" i="1" smtClean="0">
-                                <a:latin typeface="Cambria Math" panose="02040503050406030204" pitchFamily="18" charset="0"/>
-                              </a:rPr>
-                            </m:ctrlPr>
-                          </m:sSupPr>
-                          <m:e>
-                            <m:r>
-                              <a:rPr lang="en-US" altLang="ko-KR" b="0" i="1" smtClean="0">
-                                <a:latin typeface="Cambria Math" panose="02040503050406030204" pitchFamily="18" charset="0"/>
-                              </a:rPr>
-                              <m:t>𝑥</m:t>
-                            </m:r>
-                          </m:e>
-                          <m:sup>
-                            <m:r>
-                              <a:rPr lang="en-US" altLang="ko-KR" b="0" i="1" smtClean="0">
-                                <a:latin typeface="Cambria Math" panose="02040503050406030204" pitchFamily="18" charset="0"/>
-                              </a:rPr>
-                              <m:t>2</m:t>
-                            </m:r>
-                          </m:sup>
-                        </m:sSup>
-                      </m:oMath>
-                    </m:oMathPara>
-                  </a14:m>
-                  <a:endParaRPr lang="ko-KR" altLang="en-US" dirty="0"/>
-                </a:p>
-              </p:txBody>
-            </p:sp>
-          </mc:Choice>
-          <mc:Fallback xmlns="">
-            <p:sp>
-              <p:nvSpPr>
-                <p:cNvPr id="84" name="TextBox 83"/>
-                <p:cNvSpPr txBox="1">
-                  <a:spLocks noRot="1" noChangeAspect="1" noMove="1" noResize="1" noEditPoints="1" noAdjustHandles="1" noChangeArrowheads="1" noChangeShapeType="1" noTextEdit="1"/>
-                </p:cNvSpPr>
-                <p:nvPr/>
-              </p:nvSpPr>
-              <p:spPr>
-                <a:xfrm>
-                  <a:off x="2822077" y="5037121"/>
-                  <a:ext cx="325153" cy="276999"/>
-                </a:xfrm>
-                <a:prstGeom prst="rect">
-                  <a:avLst/>
-                </a:prstGeom>
-                <a:blipFill rotWithShape="0">
-                  <a:blip r:embed="rId3"/>
-                  <a:stretch>
-                    <a:fillRect l="-5660" r="-1887" b="-2174"/>
-                  </a:stretch>
-                </a:blipFill>
-              </p:spPr>
-              <p:txBody>
-                <a:bodyPr/>
-                <a:lstStyle/>
-                <a:p>
-                  <a:r>
-                    <a:rPr lang="ko-KR" altLang="en-US">
-                      <a:noFill/>
-                    </a:rPr>
-                    <a:t> </a:t>
-                  </a:r>
-                </a:p>
-              </p:txBody>
-            </p:sp>
-          </mc:Fallback>
-        </mc:AlternateContent>
-        <mc:AlternateContent xmlns:mc="http://schemas.openxmlformats.org/markup-compatibility/2006" xmlns:a14="http://schemas.microsoft.com/office/drawing/2010/main">
-          <mc:Choice Requires="a14">
-            <p:sp>
-              <p:nvSpPr>
-                <p:cNvPr id="85" name="TextBox 84"/>
-                <p:cNvSpPr txBox="1"/>
-                <p:nvPr/>
-              </p:nvSpPr>
-              <p:spPr>
-                <a:xfrm>
-                  <a:off x="3207997" y="5776164"/>
-                  <a:ext cx="320216" cy="276999"/>
-                </a:xfrm>
-                <a:prstGeom prst="rect">
-                  <a:avLst/>
-                </a:prstGeom>
-                <a:noFill/>
-              </p:spPr>
-              <p:txBody>
-                <a:bodyPr wrap="none" lIns="0" tIns="0" rIns="0" bIns="0" rtlCol="0">
-                  <a:spAutoFit/>
-                </a:bodyPr>
-                <a:lstStyle/>
-                <a:p>
-                  <a:pPr/>
-                  <a14:m>
-                    <m:oMathPara xmlns:m="http://schemas.openxmlformats.org/officeDocument/2006/math">
-                      <m:oMathParaPr>
-                        <m:jc m:val="centerGroup"/>
-                      </m:oMathParaPr>
-                      <m:oMath xmlns:m="http://schemas.openxmlformats.org/officeDocument/2006/math">
-                        <m:sSup>
-                          <m:sSupPr>
-                            <m:ctrlPr>
-                              <a:rPr lang="en-US" altLang="ko-KR" b="0" i="1" smtClean="0">
-                                <a:latin typeface="Cambria Math" panose="02040503050406030204" pitchFamily="18" charset="0"/>
-                              </a:rPr>
-                            </m:ctrlPr>
-                          </m:sSupPr>
-                          <m:e>
-                            <m:r>
-                              <a:rPr lang="en-US" altLang="ko-KR" b="0" i="1" smtClean="0">
-                                <a:latin typeface="Cambria Math" panose="02040503050406030204" pitchFamily="18" charset="0"/>
-                              </a:rPr>
-                              <m:t>𝑥</m:t>
-                            </m:r>
-                          </m:e>
-                          <m:sup>
-                            <m:r>
-                              <a:rPr lang="en-US" altLang="ko-KR" b="0" i="1" smtClean="0">
-                                <a:latin typeface="Cambria Math" panose="02040503050406030204" pitchFamily="18" charset="0"/>
-                              </a:rPr>
-                              <m:t>1</m:t>
-                            </m:r>
-                          </m:sup>
-                        </m:sSup>
-                      </m:oMath>
-                    </m:oMathPara>
-                  </a14:m>
-                  <a:endParaRPr lang="ko-KR" altLang="en-US" dirty="0"/>
-                </a:p>
-              </p:txBody>
-            </p:sp>
-          </mc:Choice>
-          <mc:Fallback xmlns="">
-            <p:sp>
-              <p:nvSpPr>
-                <p:cNvPr id="85" name="TextBox 84"/>
-                <p:cNvSpPr txBox="1">
-                  <a:spLocks noRot="1" noChangeAspect="1" noMove="1" noResize="1" noEditPoints="1" noAdjustHandles="1" noChangeArrowheads="1" noChangeShapeType="1" noTextEdit="1"/>
-                </p:cNvSpPr>
-                <p:nvPr/>
-              </p:nvSpPr>
-              <p:spPr>
-                <a:xfrm>
-                  <a:off x="3207997" y="5776164"/>
-                  <a:ext cx="320216" cy="276999"/>
-                </a:xfrm>
-                <a:prstGeom prst="rect">
-                  <a:avLst/>
-                </a:prstGeom>
-                <a:blipFill rotWithShape="0">
-                  <a:blip r:embed="rId4"/>
-                  <a:stretch>
-                    <a:fillRect l="-5660" r="-1887" b="-4444"/>
-                  </a:stretch>
-                </a:blipFill>
-              </p:spPr>
-              <p:txBody>
-                <a:bodyPr/>
-                <a:lstStyle/>
-                <a:p>
-                  <a:r>
-                    <a:rPr lang="ko-KR" altLang="en-US">
-                      <a:noFill/>
-                    </a:rPr>
-                    <a:t> </a:t>
-                  </a:r>
-                </a:p>
-              </p:txBody>
-            </p:sp>
-          </mc:Fallback>
-        </mc:AlternateContent>
-      </p:grpSp>
-      <mc:AlternateContent xmlns:mc="http://schemas.openxmlformats.org/markup-compatibility/2006" xmlns:a14="http://schemas.microsoft.com/office/drawing/2010/main">
-        <mc:Choice Requires="a14">
+            </a:solidFill>
+            <a:headEnd type="none" w="med" len="med"/>
+            <a:tailEnd type="none" w="med" len="med"/>
+          </a:ln>
+        </p:spPr>
+        <p:style>
+          <a:lnRef idx="1">
+            <a:schemeClr val="accent1"/>
+          </a:lnRef>
+          <a:fillRef idx="0">
+            <a:schemeClr val="accent1"/>
+          </a:fillRef>
+          <a:effectRef idx="0">
+            <a:schemeClr val="accent1"/>
+          </a:effectRef>
+          <a:fontRef idx="minor">
+            <a:schemeClr val="tx1"/>
+          </a:fontRef>
+        </p:style>
+      </p:cxnSp>
+      <mc:AlternateContent xmlns:mc="http://schemas.openxmlformats.org/markup-compatibility/2006">
+        <mc:Choice xmlns:a14="http://schemas.microsoft.com/office/drawing/2010/main" Requires="a14">
+          <p:sp>
+            <p:nvSpPr>
+              <p:cNvPr id="84" name="TextBox 83"/>
+              <p:cNvSpPr txBox="1"/>
+              <p:nvPr/>
+            </p:nvSpPr>
+            <p:spPr>
+              <a:xfrm>
+                <a:off x="7586203" y="5264734"/>
+                <a:ext cx="313867" cy="276999"/>
+              </a:xfrm>
+              <a:prstGeom prst="rect">
+                <a:avLst/>
+              </a:prstGeom>
+              <a:noFill/>
+            </p:spPr>
+            <p:txBody>
+              <a:bodyPr wrap="none" lIns="0" tIns="0" rIns="0" bIns="0" rtlCol="0">
+                <a:spAutoFit/>
+              </a:bodyPr>
+              <a:lstStyle/>
+              <a:p>
+                <a:pPr/>
+                <a14:m>
+                  <m:oMathPara xmlns:m="http://schemas.openxmlformats.org/officeDocument/2006/math">
+                    <m:oMathParaPr>
+                      <m:jc m:val="centerGroup"/>
+                    </m:oMathParaPr>
+                    <m:oMath xmlns:m="http://schemas.openxmlformats.org/officeDocument/2006/math">
+                      <m:sSub>
+                        <m:sSubPr>
+                          <m:ctrlPr>
+                            <a:rPr lang="en-US" altLang="ko-KR" i="1" smtClean="0">
+                              <a:latin typeface="Cambria Math" panose="02040503050406030204" pitchFamily="18" charset="0"/>
+                            </a:rPr>
+                          </m:ctrlPr>
+                        </m:sSubPr>
+                        <m:e>
+                          <m:r>
+                            <a:rPr lang="en-US" altLang="ko-KR" i="1">
+                              <a:latin typeface="Cambria Math" panose="02040503050406030204" pitchFamily="18" charset="0"/>
+                            </a:rPr>
+                            <m:t>𝛽</m:t>
+                          </m:r>
+                        </m:e>
+                        <m:sub>
+                          <m:r>
+                            <a:rPr lang="en-US" altLang="ko-KR" b="0" i="1" smtClean="0">
+                              <a:latin typeface="Cambria Math" panose="02040503050406030204" pitchFamily="18" charset="0"/>
+                            </a:rPr>
+                            <m:t>3</m:t>
+                          </m:r>
+                        </m:sub>
+                      </m:sSub>
+                    </m:oMath>
+                  </m:oMathPara>
+                </a14:m>
+                <a:endParaRPr lang="ko-KR" altLang="en-US" dirty="0"/>
+              </a:p>
+            </p:txBody>
+          </p:sp>
+        </mc:Choice>
+        <mc:Fallback>
+          <p:sp>
+            <p:nvSpPr>
+              <p:cNvPr id="84" name="TextBox 83"/>
+              <p:cNvSpPr txBox="1">
+                <a:spLocks noRot="1" noChangeAspect="1" noMove="1" noResize="1" noEditPoints="1" noAdjustHandles="1" noChangeArrowheads="1" noChangeShapeType="1" noTextEdit="1"/>
+              </p:cNvSpPr>
+              <p:nvPr/>
+            </p:nvSpPr>
+            <p:spPr>
+              <a:xfrm>
+                <a:off x="7586203" y="5264734"/>
+                <a:ext cx="313867" cy="276999"/>
+              </a:xfrm>
+              <a:prstGeom prst="rect">
+                <a:avLst/>
+              </a:prstGeom>
+              <a:blipFill rotWithShape="0">
+                <a:blip r:embed="rId3"/>
+                <a:stretch>
+                  <a:fillRect l="-21154" r="-3846" b="-40000"/>
+                </a:stretch>
+              </a:blipFill>
+            </p:spPr>
+            <p:txBody>
+              <a:bodyPr/>
+              <a:lstStyle/>
+              <a:p>
+                <a:r>
+                  <a:rPr lang="ko-KR" altLang="en-US">
+                    <a:noFill/>
+                  </a:rPr>
+                  <a:t> </a:t>
+                </a:r>
+              </a:p>
+            </p:txBody>
+          </p:sp>
+        </mc:Fallback>
+      </mc:AlternateContent>
+      <mc:AlternateContent xmlns:mc="http://schemas.openxmlformats.org/markup-compatibility/2006">
+        <mc:Choice xmlns:a14="http://schemas.microsoft.com/office/drawing/2010/main" Requires="a14">
+          <p:sp>
+            <p:nvSpPr>
+              <p:cNvPr id="85" name="TextBox 84"/>
+              <p:cNvSpPr txBox="1"/>
+              <p:nvPr/>
+            </p:nvSpPr>
+            <p:spPr>
+              <a:xfrm>
+                <a:off x="7178657" y="6365516"/>
+                <a:ext cx="308546" cy="276999"/>
+              </a:xfrm>
+              <a:prstGeom prst="rect">
+                <a:avLst/>
+              </a:prstGeom>
+              <a:noFill/>
+            </p:spPr>
+            <p:txBody>
+              <a:bodyPr wrap="none" lIns="0" tIns="0" rIns="0" bIns="0" rtlCol="0">
+                <a:spAutoFit/>
+              </a:bodyPr>
+              <a:lstStyle/>
+              <a:p>
+                <a:pPr/>
+                <a14:m>
+                  <m:oMathPara xmlns:m="http://schemas.openxmlformats.org/officeDocument/2006/math">
+                    <m:oMathParaPr>
+                      <m:jc m:val="centerGroup"/>
+                    </m:oMathParaPr>
+                    <m:oMath xmlns:m="http://schemas.openxmlformats.org/officeDocument/2006/math">
+                      <m:sSub>
+                        <m:sSubPr>
+                          <m:ctrlPr>
+                            <a:rPr lang="en-US" altLang="ko-KR" b="0" i="1" smtClean="0">
+                              <a:latin typeface="Cambria Math" panose="02040503050406030204" pitchFamily="18" charset="0"/>
+                            </a:rPr>
+                          </m:ctrlPr>
+                        </m:sSubPr>
+                        <m:e>
+                          <m:r>
+                            <a:rPr lang="en-US" altLang="ko-KR" b="0" i="1" smtClean="0">
+                              <a:latin typeface="Cambria Math" panose="02040503050406030204" pitchFamily="18" charset="0"/>
+                            </a:rPr>
+                            <m:t>𝛽</m:t>
+                          </m:r>
+                        </m:e>
+                        <m:sub>
+                          <m:r>
+                            <a:rPr lang="en-US" altLang="ko-KR" b="0" i="1" smtClean="0">
+                              <a:latin typeface="Cambria Math" panose="02040503050406030204" pitchFamily="18" charset="0"/>
+                            </a:rPr>
+                            <m:t>1</m:t>
+                          </m:r>
+                        </m:sub>
+                      </m:sSub>
+                    </m:oMath>
+                  </m:oMathPara>
+                </a14:m>
+                <a:endParaRPr lang="ko-KR" altLang="en-US" dirty="0"/>
+              </a:p>
+            </p:txBody>
+          </p:sp>
+        </mc:Choice>
+        <mc:Fallback>
+          <p:sp>
+            <p:nvSpPr>
+              <p:cNvPr id="85" name="TextBox 84"/>
+              <p:cNvSpPr txBox="1">
+                <a:spLocks noRot="1" noChangeAspect="1" noMove="1" noResize="1" noEditPoints="1" noAdjustHandles="1" noChangeArrowheads="1" noChangeShapeType="1" noTextEdit="1"/>
+              </p:cNvSpPr>
+              <p:nvPr/>
+            </p:nvSpPr>
+            <p:spPr>
+              <a:xfrm>
+                <a:off x="7178657" y="6365516"/>
+                <a:ext cx="308546" cy="276999"/>
+              </a:xfrm>
+              <a:prstGeom prst="rect">
+                <a:avLst/>
+              </a:prstGeom>
+              <a:blipFill rotWithShape="0">
+                <a:blip r:embed="rId4"/>
+                <a:stretch>
+                  <a:fillRect l="-22000" r="-4000" b="-36957"/>
+                </a:stretch>
+              </a:blipFill>
+            </p:spPr>
+            <p:txBody>
+              <a:bodyPr/>
+              <a:lstStyle/>
+              <a:p>
+                <a:r>
+                  <a:rPr lang="ko-KR" altLang="en-US">
+                    <a:noFill/>
+                  </a:rPr>
+                  <a:t> </a:t>
+                </a:r>
+              </a:p>
+            </p:txBody>
+          </p:sp>
+        </mc:Fallback>
+      </mc:AlternateContent>
+      <mc:AlternateContent xmlns:mc="http://schemas.openxmlformats.org/markup-compatibility/2006">
+        <mc:Choice xmlns:a14="http://schemas.microsoft.com/office/drawing/2010/main" Requires="a14">
           <p:sp>
             <p:nvSpPr>
               <p:cNvPr id="34" name="TextBox 33"/>
@@ -35735,7 +35783,7 @@
             </p:nvSpPr>
             <p:spPr>
               <a:xfrm>
-                <a:off x="5985363" y="3546102"/>
+                <a:off x="10785963" y="3812802"/>
                 <a:ext cx="1006366" cy="280205"/>
               </a:xfrm>
               <a:prstGeom prst="rect">
@@ -35845,7 +35893,7 @@
             </p:txBody>
           </p:sp>
         </mc:Choice>
-        <mc:Fallback xmlns="">
+        <mc:Fallback>
           <p:sp>
             <p:nvSpPr>
               <p:cNvPr id="34" name="TextBox 33"/>
@@ -35856,7 +35904,7 @@
             </p:nvSpPr>
             <p:spPr>
               <a:xfrm>
-                <a:off x="5985363" y="3546102"/>
+                <a:off x="10785963" y="3812802"/>
                 <a:ext cx="1006366" cy="280205"/>
               </a:xfrm>
               <a:prstGeom prst="rect">
@@ -35865,7 +35913,7 @@
               <a:blipFill rotWithShape="0">
                 <a:blip r:embed="rId5"/>
                 <a:stretch>
-                  <a:fillRect l="-1818" r="-606" b="-19565"/>
+                  <a:fillRect l="-1818" r="-1212" b="-21739"/>
                 </a:stretch>
               </a:blipFill>
             </p:spPr>
@@ -35892,7 +35940,7 @@
         </p:nvCxnSpPr>
         <p:spPr>
           <a:xfrm>
-            <a:off x="4263435" y="3483185"/>
+            <a:off x="9064035" y="3749885"/>
             <a:ext cx="1078114" cy="0"/>
           </a:xfrm>
           <a:prstGeom prst="straightConnector1">
@@ -35929,7 +35977,7 @@
         </p:nvCxnSpPr>
         <p:spPr>
           <a:xfrm flipV="1">
-            <a:off x="4818471" y="2865795"/>
+            <a:off x="9619071" y="3132495"/>
             <a:ext cx="0" cy="720000"/>
           </a:xfrm>
           <a:prstGeom prst="straightConnector1">
@@ -35958,8 +36006,8 @@
           </a:fontRef>
         </p:style>
       </p:cxnSp>
-      <mc:AlternateContent xmlns:mc="http://schemas.openxmlformats.org/markup-compatibility/2006" xmlns:a14="http://schemas.microsoft.com/office/drawing/2010/main">
-        <mc:Choice Requires="a14">
+      <mc:AlternateContent xmlns:mc="http://schemas.openxmlformats.org/markup-compatibility/2006">
+        <mc:Choice xmlns:a14="http://schemas.microsoft.com/office/drawing/2010/main" Requires="a14">
           <p:sp>
             <p:nvSpPr>
               <p:cNvPr id="38" name="TextBox 37"/>
@@ -35968,7 +36016,7 @@
             </p:nvSpPr>
             <p:spPr>
               <a:xfrm>
-                <a:off x="5036607" y="3027704"/>
+                <a:off x="9837207" y="3294404"/>
                 <a:ext cx="996491" cy="280141"/>
               </a:xfrm>
               <a:prstGeom prst="rect">
@@ -36078,7 +36126,7 @@
             </p:txBody>
           </p:sp>
         </mc:Choice>
-        <mc:Fallback xmlns="">
+        <mc:Fallback>
           <p:sp>
             <p:nvSpPr>
               <p:cNvPr id="38" name="TextBox 37"/>
@@ -36089,7 +36137,7 @@
             </p:nvSpPr>
             <p:spPr>
               <a:xfrm>
-                <a:off x="5036607" y="3027704"/>
+                <a:off x="9837207" y="3294404"/>
                 <a:ext cx="996491" cy="280141"/>
               </a:xfrm>
               <a:prstGeom prst="rect">
@@ -36098,7 +36146,7 @@
               <a:blipFill rotWithShape="0">
                 <a:blip r:embed="rId6"/>
                 <a:stretch>
-                  <a:fillRect l="-1829" r="-610" b="-19565"/>
+                  <a:fillRect l="-1840" r="-613" b="-21739"/>
                 </a:stretch>
               </a:blipFill>
             </p:spPr>
@@ -36117,8 +36165,8 @@
           </p:sp>
         </mc:Fallback>
       </mc:AlternateContent>
-      <mc:AlternateContent xmlns:mc="http://schemas.openxmlformats.org/markup-compatibility/2006" xmlns:a14="http://schemas.microsoft.com/office/drawing/2010/main">
-        <mc:Choice Requires="a14">
+      <mc:AlternateContent xmlns:mc="http://schemas.openxmlformats.org/markup-compatibility/2006">
+        <mc:Choice xmlns:a14="http://schemas.microsoft.com/office/drawing/2010/main" Requires="a14">
           <p:sp>
             <p:nvSpPr>
               <p:cNvPr id="47" name="TextBox 46"/>
@@ -36127,7 +36175,7 @@
             </p:nvSpPr>
             <p:spPr>
               <a:xfrm>
-                <a:off x="4322799" y="2463385"/>
+                <a:off x="9123399" y="2730085"/>
                 <a:ext cx="1006366" cy="280718"/>
               </a:xfrm>
               <a:prstGeom prst="rect">
@@ -36237,7 +36285,7 @@
             </p:txBody>
           </p:sp>
         </mc:Choice>
-        <mc:Fallback xmlns="">
+        <mc:Fallback>
           <p:sp>
             <p:nvSpPr>
               <p:cNvPr id="47" name="TextBox 46"/>
@@ -36248,7 +36296,7 @@
             </p:nvSpPr>
             <p:spPr>
               <a:xfrm>
-                <a:off x="4322799" y="2463385"/>
+                <a:off x="9123399" y="2730085"/>
                 <a:ext cx="1006366" cy="280718"/>
               </a:xfrm>
               <a:prstGeom prst="rect">
@@ -36257,7 +36305,7 @@
               <a:blipFill rotWithShape="0">
                 <a:blip r:embed="rId7"/>
                 <a:stretch>
-                  <a:fillRect l="-1818" r="-1212" b="-21739"/>
+                  <a:fillRect l="-1818" r="-606" b="-19565"/>
                 </a:stretch>
               </a:blipFill>
             </p:spPr>
@@ -36276,600 +36324,8 @@
           </p:sp>
         </mc:Fallback>
       </mc:AlternateContent>
-      <p:cxnSp>
-        <p:nvCxnSpPr>
-          <p:cNvPr id="56" name="직선 화살표 연결선 55"/>
-          <p:cNvCxnSpPr/>
-          <p:nvPr/>
-        </p:nvCxnSpPr>
-        <p:spPr>
-          <a:xfrm>
-            <a:off x="3198471" y="4125795"/>
-            <a:ext cx="720000" cy="0"/>
-          </a:xfrm>
-          <a:prstGeom prst="straightConnector1">
-            <a:avLst/>
-          </a:prstGeom>
-          <a:ln w="28575">
-            <a:solidFill>
-              <a:schemeClr val="tx1"/>
-            </a:solidFill>
-            <a:headEnd type="triangle" w="lg" len="lg"/>
-            <a:tailEnd type="none" w="lg" len="med"/>
-          </a:ln>
-        </p:spPr>
-        <p:style>
-          <a:lnRef idx="1">
-            <a:schemeClr val="accent1"/>
-          </a:lnRef>
-          <a:fillRef idx="0">
-            <a:schemeClr val="accent1"/>
-          </a:fillRef>
-          <a:effectRef idx="0">
-            <a:schemeClr val="accent1"/>
-          </a:effectRef>
-          <a:fontRef idx="minor">
-            <a:schemeClr val="tx1"/>
-          </a:fontRef>
-        </p:style>
-      </p:cxnSp>
-      <p:cxnSp>
-        <p:nvCxnSpPr>
-          <p:cNvPr id="57" name="직선 화살표 연결선 56"/>
-          <p:cNvCxnSpPr/>
-          <p:nvPr/>
-        </p:nvCxnSpPr>
-        <p:spPr>
-          <a:xfrm flipH="1" flipV="1">
-            <a:off x="3701255" y="3686205"/>
-            <a:ext cx="0" cy="1080000"/>
-          </a:xfrm>
-          <a:prstGeom prst="straightConnector1">
-            <a:avLst/>
-          </a:prstGeom>
-          <a:ln w="28575">
-            <a:solidFill>
-              <a:schemeClr val="tx1"/>
-            </a:solidFill>
-            <a:headEnd type="triangle" w="lg" len="lg"/>
-            <a:tailEnd type="none" w="lg" len="med"/>
-          </a:ln>
-        </p:spPr>
-        <p:style>
-          <a:lnRef idx="1">
-            <a:schemeClr val="accent1"/>
-          </a:lnRef>
-          <a:fillRef idx="0">
-            <a:schemeClr val="accent1"/>
-          </a:fillRef>
-          <a:effectRef idx="0">
-            <a:schemeClr val="accent1"/>
-          </a:effectRef>
-          <a:fontRef idx="minor">
-            <a:schemeClr val="tx1"/>
-          </a:fontRef>
-        </p:style>
-      </p:cxnSp>
-      <p:cxnSp>
-        <p:nvCxnSpPr>
-          <p:cNvPr id="58" name="직선 화살표 연결선 57"/>
-          <p:cNvCxnSpPr/>
-          <p:nvPr/>
-        </p:nvCxnSpPr>
-        <p:spPr>
-          <a:xfrm>
-            <a:off x="4279414" y="4936913"/>
-            <a:ext cx="1078114" cy="0"/>
-          </a:xfrm>
-          <a:prstGeom prst="straightConnector1">
-            <a:avLst/>
-          </a:prstGeom>
-          <a:ln w="28575">
-            <a:solidFill>
-              <a:schemeClr val="tx1"/>
-            </a:solidFill>
-            <a:headEnd type="triangle" w="lg" len="lg"/>
-            <a:tailEnd type="none" w="med" len="med"/>
-          </a:ln>
-        </p:spPr>
-        <p:style>
-          <a:lnRef idx="1">
-            <a:schemeClr val="accent1"/>
-          </a:lnRef>
-          <a:fillRef idx="0">
-            <a:schemeClr val="accent1"/>
-          </a:fillRef>
-          <a:effectRef idx="0">
-            <a:schemeClr val="accent1"/>
-          </a:effectRef>
-          <a:fontRef idx="minor">
-            <a:schemeClr val="tx1"/>
-          </a:fontRef>
-        </p:style>
-      </p:cxnSp>
-      <p:cxnSp>
-        <p:nvCxnSpPr>
-          <p:cNvPr id="59" name="직선 화살표 연결선 58"/>
-          <p:cNvCxnSpPr/>
-          <p:nvPr/>
-        </p:nvCxnSpPr>
-        <p:spPr>
-          <a:xfrm flipV="1">
-            <a:off x="4818471" y="4698584"/>
-            <a:ext cx="0" cy="720000"/>
-          </a:xfrm>
-          <a:prstGeom prst="straightConnector1">
-            <a:avLst/>
-          </a:prstGeom>
-          <a:ln w="28575">
-            <a:solidFill>
-              <a:schemeClr val="tx1"/>
-            </a:solidFill>
-            <a:headEnd type="triangle" w="lg" len="lg"/>
-            <a:tailEnd type="none" w="med" len="med"/>
-          </a:ln>
-        </p:spPr>
-        <p:style>
-          <a:lnRef idx="1">
-            <a:schemeClr val="accent1"/>
-          </a:lnRef>
-          <a:fillRef idx="0">
-            <a:schemeClr val="accent1"/>
-          </a:fillRef>
-          <a:effectRef idx="0">
-            <a:schemeClr val="accent1"/>
-          </a:effectRef>
-          <a:fontRef idx="minor">
-            <a:schemeClr val="tx1"/>
-          </a:fontRef>
-        </p:style>
-      </p:cxnSp>
-      <mc:AlternateContent xmlns:mc="http://schemas.openxmlformats.org/markup-compatibility/2006" xmlns:a14="http://schemas.microsoft.com/office/drawing/2010/main">
-        <mc:Choice Requires="a14">
-          <p:sp>
-            <p:nvSpPr>
-              <p:cNvPr id="60" name="TextBox 59"/>
-              <p:cNvSpPr txBox="1"/>
-              <p:nvPr/>
-            </p:nvSpPr>
-            <p:spPr>
-              <a:xfrm>
-                <a:off x="4649835" y="5494367"/>
-                <a:ext cx="337272" cy="280718"/>
-              </a:xfrm>
-              <a:prstGeom prst="rect">
-                <a:avLst/>
-              </a:prstGeom>
-              <a:noFill/>
-            </p:spPr>
-            <p:txBody>
-              <a:bodyPr wrap="none" lIns="0" tIns="0" rIns="0" bIns="0" rtlCol="0">
-                <a:spAutoFit/>
-              </a:bodyPr>
-              <a:lstStyle/>
-              <a:p>
-                <a:pPr/>
-                <a14:m>
-                  <m:oMathPara xmlns:m="http://schemas.openxmlformats.org/officeDocument/2006/math">
-                    <m:oMathParaPr>
-                      <m:jc m:val="centerGroup"/>
-                    </m:oMathParaPr>
-                    <m:oMath xmlns:m="http://schemas.openxmlformats.org/officeDocument/2006/math">
-                      <m:sSubSup>
-                        <m:sSubSupPr>
-                          <m:ctrlPr>
-                            <a:rPr lang="en-US" altLang="ko-KR" i="1" smtClean="0">
-                              <a:latin typeface="Cambria Math" panose="02040503050406030204" pitchFamily="18" charset="0"/>
-                            </a:rPr>
-                          </m:ctrlPr>
-                        </m:sSubSupPr>
-                        <m:e>
-                          <m:r>
-                            <a:rPr lang="en-US" altLang="ko-KR" i="1">
-                              <a:latin typeface="Cambria Math" panose="02040503050406030204" pitchFamily="18" charset="0"/>
-                            </a:rPr>
-                            <m:t>𝜎</m:t>
-                          </m:r>
-                        </m:e>
-                        <m:sub>
-                          <m:r>
-                            <a:rPr lang="en-US" altLang="ko-KR" b="0" i="1" smtClean="0">
-                              <a:latin typeface="Cambria Math" panose="02040503050406030204" pitchFamily="18" charset="0"/>
-                            </a:rPr>
-                            <m:t>2</m:t>
-                          </m:r>
-                        </m:sub>
-                        <m:sup>
-                          <m:r>
-                            <a:rPr lang="en-US" altLang="ko-KR" b="0" i="1" smtClean="0">
-                              <a:latin typeface="Cambria Math" panose="02040503050406030204" pitchFamily="18" charset="0"/>
-                            </a:rPr>
-                            <m:t>2</m:t>
-                          </m:r>
-                        </m:sup>
-                      </m:sSubSup>
-                    </m:oMath>
-                  </m:oMathPara>
-                </a14:m>
-                <a:endParaRPr lang="ko-KR" altLang="en-US" dirty="0"/>
-              </a:p>
-            </p:txBody>
-          </p:sp>
-        </mc:Choice>
-        <mc:Fallback xmlns="">
-          <p:sp>
-            <p:nvSpPr>
-              <p:cNvPr id="60" name="TextBox 59"/>
-              <p:cNvSpPr txBox="1">
-                <a:spLocks noRot="1" noChangeAspect="1" noMove="1" noResize="1" noEditPoints="1" noAdjustHandles="1" noChangeArrowheads="1" noChangeShapeType="1" noTextEdit="1"/>
-              </p:cNvSpPr>
-              <p:nvPr/>
-            </p:nvSpPr>
-            <p:spPr>
-              <a:xfrm>
-                <a:off x="4649835" y="5494367"/>
-                <a:ext cx="337272" cy="280718"/>
-              </a:xfrm>
-              <a:prstGeom prst="rect">
-                <a:avLst/>
-              </a:prstGeom>
-              <a:blipFill rotWithShape="0">
-                <a:blip r:embed="rId8"/>
-                <a:stretch>
-                  <a:fillRect l="-5455" r="-1818" b="-21739"/>
-                </a:stretch>
-              </a:blipFill>
-            </p:spPr>
-            <p:txBody>
-              <a:bodyPr/>
-              <a:lstStyle/>
-              <a:p>
-                <a:r>
-                  <a:rPr lang="ko-KR" altLang="en-US">
-                    <a:noFill/>
-                  </a:rPr>
-                  <a:t> </a:t>
-                </a:r>
-              </a:p>
-            </p:txBody>
-          </p:sp>
-        </mc:Fallback>
-      </mc:AlternateContent>
-      <mc:AlternateContent xmlns:mc="http://schemas.openxmlformats.org/markup-compatibility/2006" xmlns:a14="http://schemas.microsoft.com/office/drawing/2010/main">
-        <mc:Choice Requires="a14">
-          <p:sp>
-            <p:nvSpPr>
-              <p:cNvPr id="61" name="TextBox 60"/>
-              <p:cNvSpPr txBox="1"/>
-              <p:nvPr/>
-            </p:nvSpPr>
-            <p:spPr>
-              <a:xfrm>
-                <a:off x="4030241" y="5025063"/>
-                <a:ext cx="332334" cy="280141"/>
-              </a:xfrm>
-              <a:prstGeom prst="rect">
-                <a:avLst/>
-              </a:prstGeom>
-              <a:noFill/>
-            </p:spPr>
-            <p:txBody>
-              <a:bodyPr wrap="none" lIns="0" tIns="0" rIns="0" bIns="0" rtlCol="0">
-                <a:spAutoFit/>
-              </a:bodyPr>
-              <a:lstStyle/>
-              <a:p>
-                <a:pPr/>
-                <a14:m>
-                  <m:oMathPara xmlns:m="http://schemas.openxmlformats.org/officeDocument/2006/math">
-                    <m:oMathParaPr>
-                      <m:jc m:val="centerGroup"/>
-                    </m:oMathParaPr>
-                    <m:oMath xmlns:m="http://schemas.openxmlformats.org/officeDocument/2006/math">
-                      <m:sSubSup>
-                        <m:sSubSupPr>
-                          <m:ctrlPr>
-                            <a:rPr lang="en-US" altLang="ko-KR" i="1" smtClean="0">
-                              <a:latin typeface="Cambria Math" panose="02040503050406030204" pitchFamily="18" charset="0"/>
-                            </a:rPr>
-                          </m:ctrlPr>
-                        </m:sSubSupPr>
-                        <m:e>
-                          <m:r>
-                            <a:rPr lang="en-US" altLang="ko-KR" i="1">
-                              <a:latin typeface="Cambria Math" panose="02040503050406030204" pitchFamily="18" charset="0"/>
-                            </a:rPr>
-                            <m:t>𝜎</m:t>
-                          </m:r>
-                        </m:e>
-                        <m:sub>
-                          <m:r>
-                            <a:rPr lang="en-US" altLang="ko-KR" b="0" i="1" smtClean="0">
-                              <a:latin typeface="Cambria Math" panose="02040503050406030204" pitchFamily="18" charset="0"/>
-                            </a:rPr>
-                            <m:t>2</m:t>
-                          </m:r>
-                        </m:sub>
-                        <m:sup>
-                          <m:r>
-                            <a:rPr lang="en-US" altLang="ko-KR" i="1">
-                              <a:latin typeface="Cambria Math" panose="02040503050406030204" pitchFamily="18" charset="0"/>
-                            </a:rPr>
-                            <m:t>1</m:t>
-                          </m:r>
-                        </m:sup>
-                      </m:sSubSup>
-                    </m:oMath>
-                  </m:oMathPara>
-                </a14:m>
-                <a:endParaRPr lang="ko-KR" altLang="en-US" dirty="0"/>
-              </a:p>
-            </p:txBody>
-          </p:sp>
-        </mc:Choice>
-        <mc:Fallback xmlns="">
-          <p:sp>
-            <p:nvSpPr>
-              <p:cNvPr id="61" name="TextBox 60"/>
-              <p:cNvSpPr txBox="1">
-                <a:spLocks noRot="1" noChangeAspect="1" noMove="1" noResize="1" noEditPoints="1" noAdjustHandles="1" noChangeArrowheads="1" noChangeShapeType="1" noTextEdit="1"/>
-              </p:cNvSpPr>
-              <p:nvPr/>
-            </p:nvSpPr>
-            <p:spPr>
-              <a:xfrm>
-                <a:off x="4030241" y="5025063"/>
-                <a:ext cx="332334" cy="280141"/>
-              </a:xfrm>
-              <a:prstGeom prst="rect">
-                <a:avLst/>
-              </a:prstGeom>
-              <a:blipFill rotWithShape="0">
-                <a:blip r:embed="rId9"/>
-                <a:stretch>
-                  <a:fillRect l="-5455" r="-1818" b="-21739"/>
-                </a:stretch>
-              </a:blipFill>
-            </p:spPr>
-            <p:txBody>
-              <a:bodyPr/>
-              <a:lstStyle/>
-              <a:p>
-                <a:r>
-                  <a:rPr lang="ko-KR" altLang="en-US">
-                    <a:noFill/>
-                  </a:rPr>
-                  <a:t> </a:t>
-                </a:r>
-              </a:p>
-            </p:txBody>
-          </p:sp>
-        </mc:Fallback>
-      </mc:AlternateContent>
-      <mc:AlternateContent xmlns:mc="http://schemas.openxmlformats.org/markup-compatibility/2006" xmlns:a14="http://schemas.microsoft.com/office/drawing/2010/main">
-        <mc:Choice Requires="a14">
-          <p:sp>
-            <p:nvSpPr>
-              <p:cNvPr id="62" name="TextBox 61"/>
-              <p:cNvSpPr txBox="1"/>
-              <p:nvPr/>
-            </p:nvSpPr>
-            <p:spPr>
-              <a:xfrm>
-                <a:off x="3281838" y="4510227"/>
-                <a:ext cx="337272" cy="280205"/>
-              </a:xfrm>
-              <a:prstGeom prst="rect">
-                <a:avLst/>
-              </a:prstGeom>
-              <a:noFill/>
-            </p:spPr>
-            <p:txBody>
-              <a:bodyPr wrap="none" lIns="0" tIns="0" rIns="0" bIns="0" rtlCol="0">
-                <a:spAutoFit/>
-              </a:bodyPr>
-              <a:lstStyle/>
-              <a:p>
-                <a:pPr/>
-                <a14:m>
-                  <m:oMathPara xmlns:m="http://schemas.openxmlformats.org/officeDocument/2006/math">
-                    <m:oMathParaPr>
-                      <m:jc m:val="centerGroup"/>
-                    </m:oMathParaPr>
-                    <m:oMath xmlns:m="http://schemas.openxmlformats.org/officeDocument/2006/math">
-                      <m:sSubSup>
-                        <m:sSubSupPr>
-                          <m:ctrlPr>
-                            <a:rPr lang="en-US" altLang="ko-KR" i="1" smtClean="0">
-                              <a:latin typeface="Cambria Math" panose="02040503050406030204" pitchFamily="18" charset="0"/>
-                            </a:rPr>
-                          </m:ctrlPr>
-                        </m:sSubSupPr>
-                        <m:e>
-                          <m:r>
-                            <a:rPr lang="en-US" altLang="ko-KR" i="1">
-                              <a:latin typeface="Cambria Math" panose="02040503050406030204" pitchFamily="18" charset="0"/>
-                            </a:rPr>
-                            <m:t>𝜎</m:t>
-                          </m:r>
-                        </m:e>
-                        <m:sub>
-                          <m:r>
-                            <a:rPr lang="en-US" altLang="ko-KR" i="1">
-                              <a:latin typeface="Cambria Math" panose="02040503050406030204" pitchFamily="18" charset="0"/>
-                            </a:rPr>
-                            <m:t>1</m:t>
-                          </m:r>
-                        </m:sub>
-                        <m:sup>
-                          <m:r>
-                            <a:rPr lang="en-US" altLang="ko-KR" b="0" i="1" smtClean="0">
-                              <a:latin typeface="Cambria Math" panose="02040503050406030204" pitchFamily="18" charset="0"/>
-                            </a:rPr>
-                            <m:t>2</m:t>
-                          </m:r>
-                        </m:sup>
-                      </m:sSubSup>
-                    </m:oMath>
-                  </m:oMathPara>
-                </a14:m>
-                <a:endParaRPr lang="ko-KR" altLang="en-US" dirty="0"/>
-              </a:p>
-            </p:txBody>
-          </p:sp>
-        </mc:Choice>
-        <mc:Fallback xmlns="">
-          <p:sp>
-            <p:nvSpPr>
-              <p:cNvPr id="62" name="TextBox 61"/>
-              <p:cNvSpPr txBox="1">
-                <a:spLocks noRot="1" noChangeAspect="1" noMove="1" noResize="1" noEditPoints="1" noAdjustHandles="1" noChangeArrowheads="1" noChangeShapeType="1" noTextEdit="1"/>
-              </p:cNvSpPr>
-              <p:nvPr/>
-            </p:nvSpPr>
-            <p:spPr>
-              <a:xfrm>
-                <a:off x="3281838" y="4510227"/>
-                <a:ext cx="337272" cy="280205"/>
-              </a:xfrm>
-              <a:prstGeom prst="rect">
-                <a:avLst/>
-              </a:prstGeom>
-              <a:blipFill rotWithShape="0">
-                <a:blip r:embed="rId10"/>
-                <a:stretch>
-                  <a:fillRect l="-5357" r="-1786" b="-19565"/>
-                </a:stretch>
-              </a:blipFill>
-            </p:spPr>
-            <p:txBody>
-              <a:bodyPr/>
-              <a:lstStyle/>
-              <a:p>
-                <a:r>
-                  <a:rPr lang="ko-KR" altLang="en-US">
-                    <a:noFill/>
-                  </a:rPr>
-                  <a:t> </a:t>
-                </a:r>
-              </a:p>
-            </p:txBody>
-          </p:sp>
-        </mc:Fallback>
-      </mc:AlternateContent>
-      <mc:AlternateContent xmlns:mc="http://schemas.openxmlformats.org/markup-compatibility/2006" xmlns:a14="http://schemas.microsoft.com/office/drawing/2010/main">
-        <mc:Choice Requires="a14">
-          <p:sp>
-            <p:nvSpPr>
-              <p:cNvPr id="63" name="TextBox 62"/>
-              <p:cNvSpPr txBox="1"/>
-              <p:nvPr/>
-            </p:nvSpPr>
-            <p:spPr>
-              <a:xfrm>
-                <a:off x="3115671" y="3653952"/>
-                <a:ext cx="332334" cy="279628"/>
-              </a:xfrm>
-              <a:prstGeom prst="rect">
-                <a:avLst/>
-              </a:prstGeom>
-              <a:noFill/>
-            </p:spPr>
-            <p:txBody>
-              <a:bodyPr wrap="none" lIns="0" tIns="0" rIns="0" bIns="0" rtlCol="0">
-                <a:spAutoFit/>
-              </a:bodyPr>
-              <a:lstStyle/>
-              <a:p>
-                <a:pPr/>
-                <a14:m>
-                  <m:oMathPara xmlns:m="http://schemas.openxmlformats.org/officeDocument/2006/math">
-                    <m:oMathParaPr>
-                      <m:jc m:val="centerGroup"/>
-                    </m:oMathParaPr>
-                    <m:oMath xmlns:m="http://schemas.openxmlformats.org/officeDocument/2006/math">
-                      <m:sSubSup>
-                        <m:sSubSupPr>
-                          <m:ctrlPr>
-                            <a:rPr lang="en-US" altLang="ko-KR" i="1">
-                              <a:latin typeface="Cambria Math" panose="02040503050406030204" pitchFamily="18" charset="0"/>
-                            </a:rPr>
-                          </m:ctrlPr>
-                        </m:sSubSupPr>
-                        <m:e>
-                          <m:r>
-                            <a:rPr lang="en-US" altLang="ko-KR" i="1">
-                              <a:latin typeface="Cambria Math" panose="02040503050406030204" pitchFamily="18" charset="0"/>
-                            </a:rPr>
-                            <m:t>𝜎</m:t>
-                          </m:r>
-                        </m:e>
-                        <m:sub>
-                          <m:r>
-                            <a:rPr lang="en-US" altLang="ko-KR" i="1">
-                              <a:latin typeface="Cambria Math" panose="02040503050406030204" pitchFamily="18" charset="0"/>
-                            </a:rPr>
-                            <m:t>1</m:t>
-                          </m:r>
-                        </m:sub>
-                        <m:sup>
-                          <m:r>
-                            <a:rPr lang="en-US" altLang="ko-KR" i="1">
-                              <a:latin typeface="Cambria Math" panose="02040503050406030204" pitchFamily="18" charset="0"/>
-                            </a:rPr>
-                            <m:t>1</m:t>
-                          </m:r>
-                        </m:sup>
-                      </m:sSubSup>
-                    </m:oMath>
-                  </m:oMathPara>
-                </a14:m>
-                <a:endParaRPr lang="ko-KR" altLang="en-US" dirty="0"/>
-              </a:p>
-            </p:txBody>
-          </p:sp>
-        </mc:Choice>
-        <mc:Fallback xmlns="">
-          <p:sp>
-            <p:nvSpPr>
-              <p:cNvPr id="63" name="TextBox 62"/>
-              <p:cNvSpPr txBox="1">
-                <a:spLocks noRot="1" noChangeAspect="1" noMove="1" noResize="1" noEditPoints="1" noAdjustHandles="1" noChangeArrowheads="1" noChangeShapeType="1" noTextEdit="1"/>
-              </p:cNvSpPr>
-              <p:nvPr/>
-            </p:nvSpPr>
-            <p:spPr>
-              <a:xfrm>
-                <a:off x="3115671" y="3653952"/>
-                <a:ext cx="332334" cy="279628"/>
-              </a:xfrm>
-              <a:prstGeom prst="rect">
-                <a:avLst/>
-              </a:prstGeom>
-              <a:blipFill rotWithShape="0">
-                <a:blip r:embed="rId11"/>
-                <a:stretch>
-                  <a:fillRect l="-5455" r="-1818" b="-21739"/>
-                </a:stretch>
-              </a:blipFill>
-            </p:spPr>
-            <p:txBody>
-              <a:bodyPr/>
-              <a:lstStyle/>
-              <a:p>
-                <a:r>
-                  <a:rPr lang="ko-KR" altLang="en-US">
-                    <a:noFill/>
-                  </a:rPr>
-                  <a:t> </a:t>
-                </a:r>
-              </a:p>
-            </p:txBody>
-          </p:sp>
-        </mc:Fallback>
-      </mc:AlternateContent>
-      <mc:AlternateContent xmlns:mc="http://schemas.openxmlformats.org/markup-compatibility/2006" xmlns:a14="http://schemas.microsoft.com/office/drawing/2010/main">
-        <mc:Choice Requires="a14">
+      <mc:AlternateContent xmlns:mc="http://schemas.openxmlformats.org/markup-compatibility/2006">
+        <mc:Choice xmlns:a14="http://schemas.microsoft.com/office/drawing/2010/main" Requires="a14">
           <p:sp>
             <p:nvSpPr>
               <p:cNvPr id="64" name="TextBox 63"/>
@@ -36878,7 +36334,7 @@
             </p:nvSpPr>
             <p:spPr>
               <a:xfrm>
-                <a:off x="4589434" y="4300408"/>
+                <a:off x="9390034" y="4567108"/>
                 <a:ext cx="458074" cy="276999"/>
               </a:xfrm>
               <a:prstGeom prst="rect">
@@ -36938,7 +36394,7 @@
             </p:txBody>
           </p:sp>
         </mc:Choice>
-        <mc:Fallback xmlns="">
+        <mc:Fallback>
           <p:sp>
             <p:nvSpPr>
               <p:cNvPr id="64" name="TextBox 63"/>
@@ -36949,16 +36405,16 @@
             </p:nvSpPr>
             <p:spPr>
               <a:xfrm>
-                <a:off x="4589434" y="4300408"/>
+                <a:off x="9390034" y="4567108"/>
                 <a:ext cx="458074" cy="276999"/>
               </a:xfrm>
               <a:prstGeom prst="rect">
                 <a:avLst/>
               </a:prstGeom>
               <a:blipFill rotWithShape="0">
-                <a:blip r:embed="rId12"/>
+                <a:blip r:embed="rId8"/>
                 <a:stretch>
-                  <a:fillRect l="-9333" r="-1333" b="-10870"/>
+                  <a:fillRect l="-7895" r="-1316" b="-10870"/>
                 </a:stretch>
               </a:blipFill>
             </p:spPr>
@@ -36977,8 +36433,8 @@
           </p:sp>
         </mc:Fallback>
       </mc:AlternateContent>
-      <mc:AlternateContent xmlns:mc="http://schemas.openxmlformats.org/markup-compatibility/2006" xmlns:a14="http://schemas.microsoft.com/office/drawing/2010/main">
-        <mc:Choice Requires="a14">
+      <mc:AlternateContent xmlns:mc="http://schemas.openxmlformats.org/markup-compatibility/2006">
+        <mc:Choice xmlns:a14="http://schemas.microsoft.com/office/drawing/2010/main" Requires="a14">
           <p:sp>
             <p:nvSpPr>
               <p:cNvPr id="65" name="TextBox 64"/>
@@ -36987,7 +36443,7 @@
             </p:nvSpPr>
             <p:spPr>
               <a:xfrm>
-                <a:off x="5272219" y="3962076"/>
+                <a:off x="10072819" y="4228776"/>
                 <a:ext cx="463011" cy="276999"/>
               </a:xfrm>
               <a:prstGeom prst="rect">
@@ -37047,7 +36503,7 @@
             </p:txBody>
           </p:sp>
         </mc:Choice>
-        <mc:Fallback xmlns="">
+        <mc:Fallback>
           <p:sp>
             <p:nvSpPr>
               <p:cNvPr id="65" name="TextBox 64"/>
@@ -37058,16 +36514,16 @@
             </p:nvSpPr>
             <p:spPr>
               <a:xfrm>
-                <a:off x="5272219" y="3962076"/>
+                <a:off x="10072819" y="4228776"/>
                 <a:ext cx="463011" cy="276999"/>
               </a:xfrm>
               <a:prstGeom prst="rect">
                 <a:avLst/>
               </a:prstGeom>
               <a:blipFill rotWithShape="0">
-                <a:blip r:embed="rId13"/>
+                <a:blip r:embed="rId9"/>
                 <a:stretch>
-                  <a:fillRect l="-9211" r="-1316" b="-11111"/>
+                  <a:fillRect l="-7895" r="-2632" b="-11111"/>
                 </a:stretch>
               </a:blipFill>
             </p:spPr>
@@ -37086,6 +36542,2132 @@
           </p:sp>
         </mc:Fallback>
       </mc:AlternateContent>
+      <p:cxnSp>
+        <p:nvCxnSpPr>
+          <p:cNvPr id="26" name="직선 화살표 연결선 25"/>
+          <p:cNvCxnSpPr/>
+          <p:nvPr/>
+        </p:nvCxnSpPr>
+        <p:spPr>
+          <a:xfrm flipV="1">
+            <a:off x="7229911" y="6041785"/>
+            <a:ext cx="257292" cy="278078"/>
+          </a:xfrm>
+          <a:prstGeom prst="straightConnector1">
+            <a:avLst/>
+          </a:prstGeom>
+          <a:ln w="28575">
+            <a:solidFill>
+              <a:schemeClr val="tx1"/>
+            </a:solidFill>
+            <a:headEnd type="none" w="med" len="med"/>
+            <a:tailEnd type="none" w="med" len="med"/>
+          </a:ln>
+        </p:spPr>
+        <p:style>
+          <a:lnRef idx="1">
+            <a:schemeClr val="accent1"/>
+          </a:lnRef>
+          <a:fillRef idx="0">
+            <a:schemeClr val="accent1"/>
+          </a:fillRef>
+          <a:effectRef idx="0">
+            <a:schemeClr val="accent1"/>
+          </a:effectRef>
+          <a:fontRef idx="minor">
+            <a:schemeClr val="tx1"/>
+          </a:fontRef>
+        </p:style>
+      </p:cxnSp>
+      <mc:AlternateContent xmlns:mc="http://schemas.openxmlformats.org/markup-compatibility/2006">
+        <mc:Choice xmlns:a14="http://schemas.microsoft.com/office/drawing/2010/main" Requires="a14">
+          <p:sp>
+            <p:nvSpPr>
+              <p:cNvPr id="29" name="TextBox 28"/>
+              <p:cNvSpPr txBox="1"/>
+              <p:nvPr/>
+            </p:nvSpPr>
+            <p:spPr>
+              <a:xfrm>
+                <a:off x="8085538" y="5903825"/>
+                <a:ext cx="313867" cy="276999"/>
+              </a:xfrm>
+              <a:prstGeom prst="rect">
+                <a:avLst/>
+              </a:prstGeom>
+              <a:noFill/>
+            </p:spPr>
+            <p:txBody>
+              <a:bodyPr wrap="none" lIns="0" tIns="0" rIns="0" bIns="0" rtlCol="0">
+                <a:spAutoFit/>
+              </a:bodyPr>
+              <a:lstStyle/>
+              <a:p>
+                <a:pPr/>
+                <a14:m>
+                  <m:oMathPara xmlns:m="http://schemas.openxmlformats.org/officeDocument/2006/math">
+                    <m:oMathParaPr>
+                      <m:jc m:val="centerGroup"/>
+                    </m:oMathParaPr>
+                    <m:oMath xmlns:m="http://schemas.openxmlformats.org/officeDocument/2006/math">
+                      <m:sSub>
+                        <m:sSubPr>
+                          <m:ctrlPr>
+                            <a:rPr lang="en-US" altLang="ko-KR" b="0" i="1" smtClean="0">
+                              <a:latin typeface="Cambria Math" panose="02040503050406030204" pitchFamily="18" charset="0"/>
+                            </a:rPr>
+                          </m:ctrlPr>
+                        </m:sSubPr>
+                        <m:e>
+                          <m:r>
+                            <a:rPr lang="en-US" altLang="ko-KR" b="0" i="1" smtClean="0">
+                              <a:latin typeface="Cambria Math" panose="02040503050406030204" pitchFamily="18" charset="0"/>
+                            </a:rPr>
+                            <m:t>𝛽</m:t>
+                          </m:r>
+                        </m:e>
+                        <m:sub>
+                          <m:r>
+                            <a:rPr lang="en-US" altLang="ko-KR" b="0" i="1" smtClean="0">
+                              <a:latin typeface="Cambria Math" panose="02040503050406030204" pitchFamily="18" charset="0"/>
+                            </a:rPr>
+                            <m:t>2</m:t>
+                          </m:r>
+                        </m:sub>
+                      </m:sSub>
+                    </m:oMath>
+                  </m:oMathPara>
+                </a14:m>
+                <a:endParaRPr lang="ko-KR" altLang="en-US" dirty="0"/>
+              </a:p>
+            </p:txBody>
+          </p:sp>
+        </mc:Choice>
+        <mc:Fallback>
+          <p:sp>
+            <p:nvSpPr>
+              <p:cNvPr id="29" name="TextBox 28"/>
+              <p:cNvSpPr txBox="1">
+                <a:spLocks noRot="1" noChangeAspect="1" noMove="1" noResize="1" noEditPoints="1" noAdjustHandles="1" noChangeArrowheads="1" noChangeShapeType="1" noTextEdit="1"/>
+              </p:cNvSpPr>
+              <p:nvPr/>
+            </p:nvSpPr>
+            <p:spPr>
+              <a:xfrm>
+                <a:off x="8085538" y="5903825"/>
+                <a:ext cx="313867" cy="276999"/>
+              </a:xfrm>
+              <a:prstGeom prst="rect">
+                <a:avLst/>
+              </a:prstGeom>
+              <a:blipFill rotWithShape="0">
+                <a:blip r:embed="rId10"/>
+                <a:stretch>
+                  <a:fillRect l="-21154" r="-3846" b="-36957"/>
+                </a:stretch>
+              </a:blipFill>
+            </p:spPr>
+            <p:txBody>
+              <a:bodyPr/>
+              <a:lstStyle/>
+              <a:p>
+                <a:r>
+                  <a:rPr lang="ko-KR" altLang="en-US">
+                    <a:noFill/>
+                  </a:rPr>
+                  <a:t> </a:t>
+                </a:r>
+              </a:p>
+            </p:txBody>
+          </p:sp>
+        </mc:Fallback>
+      </mc:AlternateContent>
+      <p:grpSp>
+        <p:nvGrpSpPr>
+          <p:cNvPr id="30" name="그룹 29"/>
+          <p:cNvGrpSpPr/>
+          <p:nvPr/>
+        </p:nvGrpSpPr>
+        <p:grpSpPr>
+          <a:xfrm>
+            <a:off x="2308957" y="802802"/>
+            <a:ext cx="3789414" cy="3165146"/>
+            <a:chOff x="2086736" y="5146499"/>
+            <a:chExt cx="1509568" cy="1399170"/>
+          </a:xfrm>
+        </p:grpSpPr>
+        <p:sp>
+          <p:nvSpPr>
+            <p:cNvPr id="31" name="정육면체 30"/>
+            <p:cNvSpPr/>
+            <p:nvPr/>
+          </p:nvSpPr>
+          <p:spPr>
+            <a:xfrm>
+              <a:off x="2089777" y="5149489"/>
+              <a:ext cx="1506527" cy="1396180"/>
+            </a:xfrm>
+            <a:prstGeom prst="cube">
+              <a:avLst>
+                <a:gd name="adj" fmla="val 29825"/>
+              </a:avLst>
+            </a:prstGeom>
+            <a:noFill/>
+            <a:ln w="28575">
+              <a:solidFill>
+                <a:schemeClr val="tx1"/>
+              </a:solidFill>
+            </a:ln>
+          </p:spPr>
+          <p:style>
+            <a:lnRef idx="2">
+              <a:schemeClr val="accent1">
+                <a:shade val="50000"/>
+              </a:schemeClr>
+            </a:lnRef>
+            <a:fillRef idx="1">
+              <a:schemeClr val="accent1"/>
+            </a:fillRef>
+            <a:effectRef idx="0">
+              <a:schemeClr val="accent1"/>
+            </a:effectRef>
+            <a:fontRef idx="minor">
+              <a:schemeClr val="lt1"/>
+            </a:fontRef>
+          </p:style>
+          <p:txBody>
+            <a:bodyPr rtlCol="0" anchor="ctr"/>
+            <a:lstStyle/>
+            <a:p>
+              <a:pPr algn="ctr"/>
+              <a:endParaRPr lang="ko-KR" altLang="en-US"/>
+            </a:p>
+          </p:txBody>
+        </p:sp>
+        <p:cxnSp>
+          <p:nvCxnSpPr>
+            <p:cNvPr id="32" name="직선 연결선 31"/>
+            <p:cNvCxnSpPr/>
+            <p:nvPr/>
+          </p:nvCxnSpPr>
+          <p:spPr>
+            <a:xfrm flipV="1">
+              <a:off x="2086736" y="6133746"/>
+              <a:ext cx="373982" cy="400069"/>
+            </a:xfrm>
+            <a:prstGeom prst="line">
+              <a:avLst/>
+            </a:prstGeom>
+            <a:ln>
+              <a:prstDash val="dash"/>
+            </a:ln>
+          </p:spPr>
+          <p:style>
+            <a:lnRef idx="1">
+              <a:schemeClr val="dk1"/>
+            </a:lnRef>
+            <a:fillRef idx="0">
+              <a:schemeClr val="dk1"/>
+            </a:fillRef>
+            <a:effectRef idx="0">
+              <a:schemeClr val="dk1"/>
+            </a:effectRef>
+            <a:fontRef idx="minor">
+              <a:schemeClr val="tx1"/>
+            </a:fontRef>
+          </p:style>
+        </p:cxnSp>
+        <p:cxnSp>
+          <p:nvCxnSpPr>
+            <p:cNvPr id="33" name="직선 연결선 32"/>
+            <p:cNvCxnSpPr/>
+            <p:nvPr/>
+          </p:nvCxnSpPr>
+          <p:spPr>
+            <a:xfrm flipH="1" flipV="1">
+              <a:off x="2457146" y="5146499"/>
+              <a:ext cx="8224" cy="976058"/>
+            </a:xfrm>
+            <a:prstGeom prst="line">
+              <a:avLst/>
+            </a:prstGeom>
+            <a:ln>
+              <a:prstDash val="dash"/>
+            </a:ln>
+          </p:spPr>
+          <p:style>
+            <a:lnRef idx="1">
+              <a:schemeClr val="dk1"/>
+            </a:lnRef>
+            <a:fillRef idx="0">
+              <a:schemeClr val="dk1"/>
+            </a:fillRef>
+            <a:effectRef idx="0">
+              <a:schemeClr val="dk1"/>
+            </a:effectRef>
+            <a:fontRef idx="minor">
+              <a:schemeClr val="tx1"/>
+            </a:fontRef>
+          </p:style>
+        </p:cxnSp>
+        <p:cxnSp>
+          <p:nvCxnSpPr>
+            <p:cNvPr id="35" name="직선 연결선 34"/>
+            <p:cNvCxnSpPr/>
+            <p:nvPr/>
+          </p:nvCxnSpPr>
+          <p:spPr>
+            <a:xfrm flipV="1">
+              <a:off x="2469653" y="6122558"/>
+              <a:ext cx="1124204" cy="6247"/>
+            </a:xfrm>
+            <a:prstGeom prst="line">
+              <a:avLst/>
+            </a:prstGeom>
+            <a:ln>
+              <a:prstDash val="dash"/>
+            </a:ln>
+          </p:spPr>
+          <p:style>
+            <a:lnRef idx="1">
+              <a:schemeClr val="dk1"/>
+            </a:lnRef>
+            <a:fillRef idx="0">
+              <a:schemeClr val="dk1"/>
+            </a:fillRef>
+            <a:effectRef idx="0">
+              <a:schemeClr val="dk1"/>
+            </a:effectRef>
+            <a:fontRef idx="minor">
+              <a:schemeClr val="tx1"/>
+            </a:fontRef>
+          </p:style>
+        </p:cxnSp>
+      </p:grpSp>
+      <p:cxnSp>
+        <p:nvCxnSpPr>
+          <p:cNvPr id="39" name="직선 화살표 연결선 38"/>
+          <p:cNvCxnSpPr/>
+          <p:nvPr/>
+        </p:nvCxnSpPr>
+        <p:spPr>
+          <a:xfrm>
+            <a:off x="1178694" y="1131574"/>
+            <a:ext cx="511868" cy="1266"/>
+          </a:xfrm>
+          <a:prstGeom prst="straightConnector1">
+            <a:avLst/>
+          </a:prstGeom>
+          <a:ln w="28575">
+            <a:solidFill>
+              <a:schemeClr val="tx1"/>
+            </a:solidFill>
+            <a:headEnd type="none" w="med" len="med"/>
+            <a:tailEnd type="none" w="med" len="med"/>
+          </a:ln>
+        </p:spPr>
+        <p:style>
+          <a:lnRef idx="1">
+            <a:schemeClr val="accent1"/>
+          </a:lnRef>
+          <a:fillRef idx="0">
+            <a:schemeClr val="accent1"/>
+          </a:fillRef>
+          <a:effectRef idx="0">
+            <a:schemeClr val="accent1"/>
+          </a:effectRef>
+          <a:fontRef idx="minor">
+            <a:schemeClr val="tx1"/>
+          </a:fontRef>
+        </p:style>
+      </p:cxnSp>
+      <p:cxnSp>
+        <p:nvCxnSpPr>
+          <p:cNvPr id="43" name="직선 화살표 연결선 42"/>
+          <p:cNvCxnSpPr/>
+          <p:nvPr/>
+        </p:nvCxnSpPr>
+        <p:spPr>
+          <a:xfrm flipV="1">
+            <a:off x="1188220" y="631522"/>
+            <a:ext cx="815" cy="501318"/>
+          </a:xfrm>
+          <a:prstGeom prst="straightConnector1">
+            <a:avLst/>
+          </a:prstGeom>
+          <a:ln w="28575">
+            <a:solidFill>
+              <a:schemeClr val="tx1"/>
+            </a:solidFill>
+            <a:headEnd type="none" w="med" len="med"/>
+            <a:tailEnd type="none" w="med" len="med"/>
+          </a:ln>
+        </p:spPr>
+        <p:style>
+          <a:lnRef idx="1">
+            <a:schemeClr val="accent1"/>
+          </a:lnRef>
+          <a:fillRef idx="0">
+            <a:schemeClr val="accent1"/>
+          </a:fillRef>
+          <a:effectRef idx="0">
+            <a:schemeClr val="accent1"/>
+          </a:effectRef>
+          <a:fontRef idx="minor">
+            <a:schemeClr val="tx1"/>
+          </a:fontRef>
+        </p:style>
+      </p:cxnSp>
+      <mc:AlternateContent xmlns:mc="http://schemas.openxmlformats.org/markup-compatibility/2006">
+        <mc:Choice xmlns:a14="http://schemas.microsoft.com/office/drawing/2010/main" Requires="a14">
+          <p:sp>
+            <p:nvSpPr>
+              <p:cNvPr id="44" name="TextBox 43"/>
+              <p:cNvSpPr txBox="1"/>
+              <p:nvPr/>
+            </p:nvSpPr>
+            <p:spPr>
+              <a:xfrm>
+                <a:off x="1277694" y="354523"/>
+                <a:ext cx="313867" cy="276999"/>
+              </a:xfrm>
+              <a:prstGeom prst="rect">
+                <a:avLst/>
+              </a:prstGeom>
+              <a:noFill/>
+            </p:spPr>
+            <p:txBody>
+              <a:bodyPr wrap="none" lIns="0" tIns="0" rIns="0" bIns="0" rtlCol="0">
+                <a:spAutoFit/>
+              </a:bodyPr>
+              <a:lstStyle/>
+              <a:p>
+                <a:pPr/>
+                <a14:m>
+                  <m:oMathPara xmlns:m="http://schemas.openxmlformats.org/officeDocument/2006/math">
+                    <m:oMathParaPr>
+                      <m:jc m:val="centerGroup"/>
+                    </m:oMathParaPr>
+                    <m:oMath xmlns:m="http://schemas.openxmlformats.org/officeDocument/2006/math">
+                      <m:sSub>
+                        <m:sSubPr>
+                          <m:ctrlPr>
+                            <a:rPr lang="en-US" altLang="ko-KR" i="1" smtClean="0">
+                              <a:latin typeface="Cambria Math" panose="02040503050406030204" pitchFamily="18" charset="0"/>
+                            </a:rPr>
+                          </m:ctrlPr>
+                        </m:sSubPr>
+                        <m:e>
+                          <m:r>
+                            <a:rPr lang="en-US" altLang="ko-KR" i="1">
+                              <a:latin typeface="Cambria Math" panose="02040503050406030204" pitchFamily="18" charset="0"/>
+                            </a:rPr>
+                            <m:t>𝛽</m:t>
+                          </m:r>
+                        </m:e>
+                        <m:sub>
+                          <m:r>
+                            <a:rPr lang="en-US" altLang="ko-KR" b="0" i="1" smtClean="0">
+                              <a:latin typeface="Cambria Math" panose="02040503050406030204" pitchFamily="18" charset="0"/>
+                            </a:rPr>
+                            <m:t>3</m:t>
+                          </m:r>
+                        </m:sub>
+                      </m:sSub>
+                    </m:oMath>
+                  </m:oMathPara>
+                </a14:m>
+                <a:endParaRPr lang="ko-KR" altLang="en-US" dirty="0"/>
+              </a:p>
+            </p:txBody>
+          </p:sp>
+        </mc:Choice>
+        <mc:Fallback>
+          <p:sp>
+            <p:nvSpPr>
+              <p:cNvPr id="44" name="TextBox 43"/>
+              <p:cNvSpPr txBox="1">
+                <a:spLocks noRot="1" noChangeAspect="1" noMove="1" noResize="1" noEditPoints="1" noAdjustHandles="1" noChangeArrowheads="1" noChangeShapeType="1" noTextEdit="1"/>
+              </p:cNvSpPr>
+              <p:nvPr/>
+            </p:nvSpPr>
+            <p:spPr>
+              <a:xfrm>
+                <a:off x="1277694" y="354523"/>
+                <a:ext cx="313867" cy="276999"/>
+              </a:xfrm>
+              <a:prstGeom prst="rect">
+                <a:avLst/>
+              </a:prstGeom>
+              <a:blipFill rotWithShape="0">
+                <a:blip r:embed="rId11"/>
+                <a:stretch>
+                  <a:fillRect l="-21569" r="-3922" b="-36957"/>
+                </a:stretch>
+              </a:blipFill>
+            </p:spPr>
+            <p:txBody>
+              <a:bodyPr/>
+              <a:lstStyle/>
+              <a:p>
+                <a:r>
+                  <a:rPr lang="ko-KR" altLang="en-US">
+                    <a:noFill/>
+                  </a:rPr>
+                  <a:t> </a:t>
+                </a:r>
+              </a:p>
+            </p:txBody>
+          </p:sp>
+        </mc:Fallback>
+      </mc:AlternateContent>
+      <mc:AlternateContent xmlns:mc="http://schemas.openxmlformats.org/markup-compatibility/2006">
+        <mc:Choice xmlns:a14="http://schemas.microsoft.com/office/drawing/2010/main" Requires="a14">
+          <p:sp>
+            <p:nvSpPr>
+              <p:cNvPr id="46" name="TextBox 45"/>
+              <p:cNvSpPr txBox="1"/>
+              <p:nvPr/>
+            </p:nvSpPr>
+            <p:spPr>
+              <a:xfrm>
+                <a:off x="870148" y="1455305"/>
+                <a:ext cx="308546" cy="276999"/>
+              </a:xfrm>
+              <a:prstGeom prst="rect">
+                <a:avLst/>
+              </a:prstGeom>
+              <a:noFill/>
+            </p:spPr>
+            <p:txBody>
+              <a:bodyPr wrap="none" lIns="0" tIns="0" rIns="0" bIns="0" rtlCol="0">
+                <a:spAutoFit/>
+              </a:bodyPr>
+              <a:lstStyle/>
+              <a:p>
+                <a:pPr/>
+                <a14:m>
+                  <m:oMathPara xmlns:m="http://schemas.openxmlformats.org/officeDocument/2006/math">
+                    <m:oMathParaPr>
+                      <m:jc m:val="centerGroup"/>
+                    </m:oMathParaPr>
+                    <m:oMath xmlns:m="http://schemas.openxmlformats.org/officeDocument/2006/math">
+                      <m:sSub>
+                        <m:sSubPr>
+                          <m:ctrlPr>
+                            <a:rPr lang="en-US" altLang="ko-KR" b="0" i="1" smtClean="0">
+                              <a:latin typeface="Cambria Math" panose="02040503050406030204" pitchFamily="18" charset="0"/>
+                            </a:rPr>
+                          </m:ctrlPr>
+                        </m:sSubPr>
+                        <m:e>
+                          <m:r>
+                            <a:rPr lang="en-US" altLang="ko-KR" b="0" i="1" smtClean="0">
+                              <a:latin typeface="Cambria Math" panose="02040503050406030204" pitchFamily="18" charset="0"/>
+                            </a:rPr>
+                            <m:t>𝛽</m:t>
+                          </m:r>
+                        </m:e>
+                        <m:sub>
+                          <m:r>
+                            <a:rPr lang="en-US" altLang="ko-KR" b="0" i="1" smtClean="0">
+                              <a:latin typeface="Cambria Math" panose="02040503050406030204" pitchFamily="18" charset="0"/>
+                            </a:rPr>
+                            <m:t>1</m:t>
+                          </m:r>
+                        </m:sub>
+                      </m:sSub>
+                    </m:oMath>
+                  </m:oMathPara>
+                </a14:m>
+                <a:endParaRPr lang="ko-KR" altLang="en-US" dirty="0"/>
+              </a:p>
+            </p:txBody>
+          </p:sp>
+        </mc:Choice>
+        <mc:Fallback>
+          <p:sp>
+            <p:nvSpPr>
+              <p:cNvPr id="46" name="TextBox 45"/>
+              <p:cNvSpPr txBox="1">
+                <a:spLocks noRot="1" noChangeAspect="1" noMove="1" noResize="1" noEditPoints="1" noAdjustHandles="1" noChangeArrowheads="1" noChangeShapeType="1" noTextEdit="1"/>
+              </p:cNvSpPr>
+              <p:nvPr/>
+            </p:nvSpPr>
+            <p:spPr>
+              <a:xfrm>
+                <a:off x="870148" y="1455305"/>
+                <a:ext cx="308546" cy="276999"/>
+              </a:xfrm>
+              <a:prstGeom prst="rect">
+                <a:avLst/>
+              </a:prstGeom>
+              <a:blipFill rotWithShape="0">
+                <a:blip r:embed="rId12"/>
+                <a:stretch>
+                  <a:fillRect l="-22000" r="-4000" b="-40000"/>
+                </a:stretch>
+              </a:blipFill>
+            </p:spPr>
+            <p:txBody>
+              <a:bodyPr/>
+              <a:lstStyle/>
+              <a:p>
+                <a:r>
+                  <a:rPr lang="ko-KR" altLang="en-US">
+                    <a:noFill/>
+                  </a:rPr>
+                  <a:t> </a:t>
+                </a:r>
+              </a:p>
+            </p:txBody>
+          </p:sp>
+        </mc:Fallback>
+      </mc:AlternateContent>
+      <p:cxnSp>
+        <p:nvCxnSpPr>
+          <p:cNvPr id="48" name="직선 화살표 연결선 47"/>
+          <p:cNvCxnSpPr/>
+          <p:nvPr/>
+        </p:nvCxnSpPr>
+        <p:spPr>
+          <a:xfrm flipV="1">
+            <a:off x="921402" y="1131574"/>
+            <a:ext cx="257292" cy="278078"/>
+          </a:xfrm>
+          <a:prstGeom prst="straightConnector1">
+            <a:avLst/>
+          </a:prstGeom>
+          <a:ln w="28575">
+            <a:solidFill>
+              <a:schemeClr val="tx1"/>
+            </a:solidFill>
+            <a:headEnd type="none" w="med" len="med"/>
+            <a:tailEnd type="none" w="med" len="med"/>
+          </a:ln>
+        </p:spPr>
+        <p:style>
+          <a:lnRef idx="1">
+            <a:schemeClr val="accent1"/>
+          </a:lnRef>
+          <a:fillRef idx="0">
+            <a:schemeClr val="accent1"/>
+          </a:fillRef>
+          <a:effectRef idx="0">
+            <a:schemeClr val="accent1"/>
+          </a:effectRef>
+          <a:fontRef idx="minor">
+            <a:schemeClr val="tx1"/>
+          </a:fontRef>
+        </p:style>
+      </p:cxnSp>
+      <mc:AlternateContent xmlns:mc="http://schemas.openxmlformats.org/markup-compatibility/2006">
+        <mc:Choice xmlns:a14="http://schemas.microsoft.com/office/drawing/2010/main" Requires="a14">
+          <p:sp>
+            <p:nvSpPr>
+              <p:cNvPr id="49" name="TextBox 48"/>
+              <p:cNvSpPr txBox="1"/>
+              <p:nvPr/>
+            </p:nvSpPr>
+            <p:spPr>
+              <a:xfrm>
+                <a:off x="1777029" y="993614"/>
+                <a:ext cx="313867" cy="276999"/>
+              </a:xfrm>
+              <a:prstGeom prst="rect">
+                <a:avLst/>
+              </a:prstGeom>
+              <a:noFill/>
+            </p:spPr>
+            <p:txBody>
+              <a:bodyPr wrap="none" lIns="0" tIns="0" rIns="0" bIns="0" rtlCol="0">
+                <a:spAutoFit/>
+              </a:bodyPr>
+              <a:lstStyle/>
+              <a:p>
+                <a:pPr/>
+                <a14:m>
+                  <m:oMathPara xmlns:m="http://schemas.openxmlformats.org/officeDocument/2006/math">
+                    <m:oMathParaPr>
+                      <m:jc m:val="centerGroup"/>
+                    </m:oMathParaPr>
+                    <m:oMath xmlns:m="http://schemas.openxmlformats.org/officeDocument/2006/math">
+                      <m:sSub>
+                        <m:sSubPr>
+                          <m:ctrlPr>
+                            <a:rPr lang="en-US" altLang="ko-KR" b="0" i="1" smtClean="0">
+                              <a:latin typeface="Cambria Math" panose="02040503050406030204" pitchFamily="18" charset="0"/>
+                            </a:rPr>
+                          </m:ctrlPr>
+                        </m:sSubPr>
+                        <m:e>
+                          <m:r>
+                            <a:rPr lang="en-US" altLang="ko-KR" b="0" i="1" smtClean="0">
+                              <a:latin typeface="Cambria Math" panose="02040503050406030204" pitchFamily="18" charset="0"/>
+                            </a:rPr>
+                            <m:t>𝛽</m:t>
+                          </m:r>
+                        </m:e>
+                        <m:sub>
+                          <m:r>
+                            <a:rPr lang="en-US" altLang="ko-KR" b="0" i="1" smtClean="0">
+                              <a:latin typeface="Cambria Math" panose="02040503050406030204" pitchFamily="18" charset="0"/>
+                            </a:rPr>
+                            <m:t>2</m:t>
+                          </m:r>
+                        </m:sub>
+                      </m:sSub>
+                    </m:oMath>
+                  </m:oMathPara>
+                </a14:m>
+                <a:endParaRPr lang="ko-KR" altLang="en-US" dirty="0"/>
+              </a:p>
+            </p:txBody>
+          </p:sp>
+        </mc:Choice>
+        <mc:Fallback>
+          <p:sp>
+            <p:nvSpPr>
+              <p:cNvPr id="49" name="TextBox 48"/>
+              <p:cNvSpPr txBox="1">
+                <a:spLocks noRot="1" noChangeAspect="1" noMove="1" noResize="1" noEditPoints="1" noAdjustHandles="1" noChangeArrowheads="1" noChangeShapeType="1" noTextEdit="1"/>
+              </p:cNvSpPr>
+              <p:nvPr/>
+            </p:nvSpPr>
+            <p:spPr>
+              <a:xfrm>
+                <a:off x="1777029" y="993614"/>
+                <a:ext cx="313867" cy="276999"/>
+              </a:xfrm>
+              <a:prstGeom prst="rect">
+                <a:avLst/>
+              </a:prstGeom>
+              <a:blipFill rotWithShape="0">
+                <a:blip r:embed="rId13"/>
+                <a:stretch>
+                  <a:fillRect l="-21569" r="-3922" b="-40000"/>
+                </a:stretch>
+              </a:blipFill>
+            </p:spPr>
+            <p:txBody>
+              <a:bodyPr/>
+              <a:lstStyle/>
+              <a:p>
+                <a:r>
+                  <a:rPr lang="ko-KR" altLang="en-US">
+                    <a:noFill/>
+                  </a:rPr>
+                  <a:t> </a:t>
+                </a:r>
+              </a:p>
+            </p:txBody>
+          </p:sp>
+        </mc:Fallback>
+      </mc:AlternateContent>
+      <p:grpSp>
+        <p:nvGrpSpPr>
+          <p:cNvPr id="15" name="그룹 14"/>
+          <p:cNvGrpSpPr/>
+          <p:nvPr/>
+        </p:nvGrpSpPr>
+        <p:grpSpPr>
+          <a:xfrm>
+            <a:off x="3566022" y="405750"/>
+            <a:ext cx="1640993" cy="1250844"/>
+            <a:chOff x="2177208" y="716923"/>
+            <a:chExt cx="1640993" cy="1250844"/>
+          </a:xfrm>
+        </p:grpSpPr>
+        <p:grpSp>
+          <p:nvGrpSpPr>
+            <p:cNvPr id="13" name="그룹 12"/>
+            <p:cNvGrpSpPr/>
+            <p:nvPr/>
+          </p:nvGrpSpPr>
+          <p:grpSpPr>
+            <a:xfrm>
+              <a:off x="2595409" y="882181"/>
+              <a:ext cx="744691" cy="833353"/>
+              <a:chOff x="2691590" y="800099"/>
+              <a:chExt cx="744691" cy="833353"/>
+            </a:xfrm>
+          </p:grpSpPr>
+          <p:cxnSp>
+            <p:nvCxnSpPr>
+              <p:cNvPr id="50" name="직선 화살표 연결선 49"/>
+              <p:cNvCxnSpPr/>
+              <p:nvPr/>
+            </p:nvCxnSpPr>
+            <p:spPr>
+              <a:xfrm flipH="1">
+                <a:off x="2691590" y="1270613"/>
+                <a:ext cx="267511" cy="362839"/>
+              </a:xfrm>
+              <a:prstGeom prst="straightConnector1">
+                <a:avLst/>
+              </a:prstGeom>
+              <a:ln w="28575">
+                <a:solidFill>
+                  <a:schemeClr val="tx1"/>
+                </a:solidFill>
+                <a:headEnd w="lg" len="lg"/>
+                <a:tailEnd type="triangle" w="lg" len="lg"/>
+              </a:ln>
+            </p:spPr>
+            <p:style>
+              <a:lnRef idx="1">
+                <a:schemeClr val="accent1"/>
+              </a:lnRef>
+              <a:fillRef idx="0">
+                <a:schemeClr val="accent1"/>
+              </a:fillRef>
+              <a:effectRef idx="0">
+                <a:schemeClr val="accent1"/>
+              </a:effectRef>
+              <a:fontRef idx="minor">
+                <a:schemeClr val="tx1"/>
+              </a:fontRef>
+            </p:style>
+          </p:cxnSp>
+          <p:cxnSp>
+            <p:nvCxnSpPr>
+              <p:cNvPr id="51" name="직선 화살표 연결선 50"/>
+              <p:cNvCxnSpPr/>
+              <p:nvPr/>
+            </p:nvCxnSpPr>
+            <p:spPr>
+              <a:xfrm flipV="1">
+                <a:off x="2948690" y="1276818"/>
+                <a:ext cx="487591" cy="7930"/>
+              </a:xfrm>
+              <a:prstGeom prst="straightConnector1">
+                <a:avLst/>
+              </a:prstGeom>
+              <a:ln w="28575">
+                <a:solidFill>
+                  <a:schemeClr val="tx1"/>
+                </a:solidFill>
+                <a:headEnd w="lg" len="lg"/>
+                <a:tailEnd type="triangle" w="lg" len="lg"/>
+              </a:ln>
+            </p:spPr>
+            <p:style>
+              <a:lnRef idx="1">
+                <a:schemeClr val="accent1"/>
+              </a:lnRef>
+              <a:fillRef idx="0">
+                <a:schemeClr val="accent1"/>
+              </a:fillRef>
+              <a:effectRef idx="0">
+                <a:schemeClr val="accent1"/>
+              </a:effectRef>
+              <a:fontRef idx="minor">
+                <a:schemeClr val="tx1"/>
+              </a:fontRef>
+            </p:style>
+          </p:cxnSp>
+          <p:cxnSp>
+            <p:nvCxnSpPr>
+              <p:cNvPr id="52" name="직선 화살표 연결선 51"/>
+              <p:cNvCxnSpPr/>
+              <p:nvPr/>
+            </p:nvCxnSpPr>
+            <p:spPr>
+              <a:xfrm flipH="1" flipV="1">
+                <a:off x="2946400" y="800099"/>
+                <a:ext cx="0" cy="504000"/>
+              </a:xfrm>
+              <a:prstGeom prst="straightConnector1">
+                <a:avLst/>
+              </a:prstGeom>
+              <a:ln w="28575">
+                <a:solidFill>
+                  <a:schemeClr val="tx1"/>
+                </a:solidFill>
+                <a:headEnd w="lg" len="lg"/>
+                <a:tailEnd type="triangle" w="lg" len="lg"/>
+              </a:ln>
+            </p:spPr>
+            <p:style>
+              <a:lnRef idx="1">
+                <a:schemeClr val="accent1"/>
+              </a:lnRef>
+              <a:fillRef idx="0">
+                <a:schemeClr val="accent1"/>
+              </a:fillRef>
+              <a:effectRef idx="0">
+                <a:schemeClr val="accent1"/>
+              </a:effectRef>
+              <a:fontRef idx="minor">
+                <a:schemeClr val="tx1"/>
+              </a:fontRef>
+            </p:style>
+          </p:cxnSp>
+        </p:grpSp>
+        <mc:AlternateContent xmlns:mc="http://schemas.openxmlformats.org/markup-compatibility/2006">
+          <mc:Choice xmlns:a14="http://schemas.microsoft.com/office/drawing/2010/main" Requires="a14">
+            <p:sp>
+              <p:nvSpPr>
+                <p:cNvPr id="14" name="직사각형 13"/>
+                <p:cNvSpPr/>
+                <p:nvPr/>
+              </p:nvSpPr>
+              <p:spPr>
+                <a:xfrm>
+                  <a:off x="2177208" y="1594716"/>
+                  <a:ext cx="521938" cy="373051"/>
+                </a:xfrm>
+                <a:prstGeom prst="rect">
+                  <a:avLst/>
+                </a:prstGeom>
+              </p:spPr>
+              <p:txBody>
+                <a:bodyPr wrap="none">
+                  <a:spAutoFit/>
+                </a:bodyPr>
+                <a:lstStyle/>
+                <a:p>
+                  <a14:m>
+                    <m:oMathPara xmlns:m="http://schemas.openxmlformats.org/officeDocument/2006/math">
+                      <m:oMathParaPr>
+                        <m:jc m:val="centerGroup"/>
+                      </m:oMathParaPr>
+                      <m:oMath xmlns:m="http://schemas.openxmlformats.org/officeDocument/2006/math">
+                        <m:sSubSup>
+                          <m:sSubSupPr>
+                            <m:ctrlPr>
+                              <a:rPr lang="en-US" altLang="ko-KR" i="1" smtClean="0">
+                                <a:latin typeface="Cambria Math" panose="02040503050406030204" pitchFamily="18" charset="0"/>
+                              </a:rPr>
+                            </m:ctrlPr>
+                          </m:sSubSupPr>
+                          <m:e>
+                            <m:r>
+                              <a:rPr lang="en-US" altLang="ko-KR" b="0" i="1" smtClean="0">
+                                <a:latin typeface="Cambria Math" panose="02040503050406030204" pitchFamily="18" charset="0"/>
+                              </a:rPr>
+                              <m:t>𝑇</m:t>
+                            </m:r>
+                          </m:e>
+                          <m:sub>
+                            <m:r>
+                              <a:rPr lang="en-US" altLang="ko-KR" b="0" i="1" smtClean="0">
+                                <a:latin typeface="Cambria Math" panose="02040503050406030204" pitchFamily="18" charset="0"/>
+                              </a:rPr>
+                              <m:t>3</m:t>
+                            </m:r>
+                          </m:sub>
+                          <m:sup>
+                            <m:r>
+                              <a:rPr lang="en-US" altLang="ko-KR" b="0" i="1" smtClean="0">
+                                <a:latin typeface="Cambria Math" panose="02040503050406030204" pitchFamily="18" charset="0"/>
+                              </a:rPr>
+                              <m:t>1</m:t>
+                            </m:r>
+                          </m:sup>
+                        </m:sSubSup>
+                      </m:oMath>
+                    </m:oMathPara>
+                  </a14:m>
+                  <a:endParaRPr lang="ko-KR" altLang="en-US"/>
+                </a:p>
+              </p:txBody>
+            </p:sp>
+          </mc:Choice>
+          <mc:Fallback>
+            <p:sp>
+              <p:nvSpPr>
+                <p:cNvPr id="14" name="직사각형 13"/>
+                <p:cNvSpPr>
+                  <a:spLocks noRot="1" noChangeAspect="1" noMove="1" noResize="1" noEditPoints="1" noAdjustHandles="1" noChangeArrowheads="1" noChangeShapeType="1" noTextEdit="1"/>
+                </p:cNvSpPr>
+                <p:nvPr/>
+              </p:nvSpPr>
+              <p:spPr>
+                <a:xfrm>
+                  <a:off x="2177208" y="1594716"/>
+                  <a:ext cx="521938" cy="373051"/>
+                </a:xfrm>
+                <a:prstGeom prst="rect">
+                  <a:avLst/>
+                </a:prstGeom>
+                <a:blipFill rotWithShape="0">
+                  <a:blip r:embed="rId14"/>
+                  <a:stretch>
+                    <a:fillRect b="-3279"/>
+                  </a:stretch>
+                </a:blipFill>
+              </p:spPr>
+              <p:txBody>
+                <a:bodyPr/>
+                <a:lstStyle/>
+                <a:p>
+                  <a:r>
+                    <a:rPr lang="ko-KR" altLang="en-US">
+                      <a:noFill/>
+                    </a:rPr>
+                    <a:t> </a:t>
+                  </a:r>
+                </a:p>
+              </p:txBody>
+            </p:sp>
+          </mc:Fallback>
+        </mc:AlternateContent>
+        <mc:AlternateContent xmlns:mc="http://schemas.openxmlformats.org/markup-compatibility/2006">
+          <mc:Choice xmlns:a14="http://schemas.microsoft.com/office/drawing/2010/main" Requires="a14">
+            <p:sp>
+              <p:nvSpPr>
+                <p:cNvPr id="54" name="직사각형 53"/>
+                <p:cNvSpPr/>
+                <p:nvPr/>
+              </p:nvSpPr>
+              <p:spPr>
+                <a:xfrm>
+                  <a:off x="3296263" y="1176339"/>
+                  <a:ext cx="521938" cy="373051"/>
+                </a:xfrm>
+                <a:prstGeom prst="rect">
+                  <a:avLst/>
+                </a:prstGeom>
+              </p:spPr>
+              <p:txBody>
+                <a:bodyPr wrap="none">
+                  <a:spAutoFit/>
+                </a:bodyPr>
+                <a:lstStyle/>
+                <a:p>
+                  <a14:m>
+                    <m:oMathPara xmlns:m="http://schemas.openxmlformats.org/officeDocument/2006/math">
+                      <m:oMathParaPr>
+                        <m:jc m:val="centerGroup"/>
+                      </m:oMathParaPr>
+                      <m:oMath xmlns:m="http://schemas.openxmlformats.org/officeDocument/2006/math">
+                        <m:sSubSup>
+                          <m:sSubSupPr>
+                            <m:ctrlPr>
+                              <a:rPr lang="en-US" altLang="ko-KR" i="1" smtClean="0">
+                                <a:latin typeface="Cambria Math" panose="02040503050406030204" pitchFamily="18" charset="0"/>
+                              </a:rPr>
+                            </m:ctrlPr>
+                          </m:sSubSupPr>
+                          <m:e>
+                            <m:r>
+                              <a:rPr lang="en-US" altLang="ko-KR" b="0" i="1" smtClean="0">
+                                <a:latin typeface="Cambria Math" panose="02040503050406030204" pitchFamily="18" charset="0"/>
+                              </a:rPr>
+                              <m:t>𝑇</m:t>
+                            </m:r>
+                          </m:e>
+                          <m:sub>
+                            <m:r>
+                              <a:rPr lang="en-US" altLang="ko-KR" b="0" i="1" smtClean="0">
+                                <a:latin typeface="Cambria Math" panose="02040503050406030204" pitchFamily="18" charset="0"/>
+                              </a:rPr>
+                              <m:t>3</m:t>
+                            </m:r>
+                          </m:sub>
+                          <m:sup>
+                            <m:r>
+                              <a:rPr lang="en-US" altLang="ko-KR" b="0" i="1" smtClean="0">
+                                <a:latin typeface="Cambria Math" panose="02040503050406030204" pitchFamily="18" charset="0"/>
+                              </a:rPr>
+                              <m:t>2</m:t>
+                            </m:r>
+                          </m:sup>
+                        </m:sSubSup>
+                      </m:oMath>
+                    </m:oMathPara>
+                  </a14:m>
+                  <a:endParaRPr lang="ko-KR" altLang="en-US"/>
+                </a:p>
+              </p:txBody>
+            </p:sp>
+          </mc:Choice>
+          <mc:Fallback>
+            <p:sp>
+              <p:nvSpPr>
+                <p:cNvPr id="54" name="직사각형 53"/>
+                <p:cNvSpPr>
+                  <a:spLocks noRot="1" noChangeAspect="1" noMove="1" noResize="1" noEditPoints="1" noAdjustHandles="1" noChangeArrowheads="1" noChangeShapeType="1" noTextEdit="1"/>
+                </p:cNvSpPr>
+                <p:nvPr/>
+              </p:nvSpPr>
+              <p:spPr>
+                <a:xfrm>
+                  <a:off x="3296263" y="1176339"/>
+                  <a:ext cx="521938" cy="373051"/>
+                </a:xfrm>
+                <a:prstGeom prst="rect">
+                  <a:avLst/>
+                </a:prstGeom>
+                <a:blipFill rotWithShape="0">
+                  <a:blip r:embed="rId15"/>
+                  <a:stretch>
+                    <a:fillRect b="-3279"/>
+                  </a:stretch>
+                </a:blipFill>
+              </p:spPr>
+              <p:txBody>
+                <a:bodyPr/>
+                <a:lstStyle/>
+                <a:p>
+                  <a:r>
+                    <a:rPr lang="ko-KR" altLang="en-US">
+                      <a:noFill/>
+                    </a:rPr>
+                    <a:t> </a:t>
+                  </a:r>
+                </a:p>
+              </p:txBody>
+            </p:sp>
+          </mc:Fallback>
+        </mc:AlternateContent>
+        <mc:AlternateContent xmlns:mc="http://schemas.openxmlformats.org/markup-compatibility/2006">
+          <mc:Choice xmlns:a14="http://schemas.microsoft.com/office/drawing/2010/main" Requires="a14">
+            <p:sp>
+              <p:nvSpPr>
+                <p:cNvPr id="55" name="직사각형 54"/>
+                <p:cNvSpPr/>
+                <p:nvPr/>
+              </p:nvSpPr>
+              <p:spPr>
+                <a:xfrm>
+                  <a:off x="2296729" y="716923"/>
+                  <a:ext cx="521938" cy="373051"/>
+                </a:xfrm>
+                <a:prstGeom prst="rect">
+                  <a:avLst/>
+                </a:prstGeom>
+              </p:spPr>
+              <p:txBody>
+                <a:bodyPr wrap="none">
+                  <a:spAutoFit/>
+                </a:bodyPr>
+                <a:lstStyle/>
+                <a:p>
+                  <a14:m>
+                    <m:oMathPara xmlns:m="http://schemas.openxmlformats.org/officeDocument/2006/math">
+                      <m:oMathParaPr>
+                        <m:jc m:val="centerGroup"/>
+                      </m:oMathParaPr>
+                      <m:oMath xmlns:m="http://schemas.openxmlformats.org/officeDocument/2006/math">
+                        <m:sSubSup>
+                          <m:sSubSupPr>
+                            <m:ctrlPr>
+                              <a:rPr lang="en-US" altLang="ko-KR" i="1" smtClean="0">
+                                <a:latin typeface="Cambria Math" panose="02040503050406030204" pitchFamily="18" charset="0"/>
+                              </a:rPr>
+                            </m:ctrlPr>
+                          </m:sSubSupPr>
+                          <m:e>
+                            <m:r>
+                              <a:rPr lang="en-US" altLang="ko-KR" b="0" i="1" smtClean="0">
+                                <a:latin typeface="Cambria Math" panose="02040503050406030204" pitchFamily="18" charset="0"/>
+                              </a:rPr>
+                              <m:t>𝑇</m:t>
+                            </m:r>
+                          </m:e>
+                          <m:sub>
+                            <m:r>
+                              <a:rPr lang="en-US" altLang="ko-KR" b="0" i="1" smtClean="0">
+                                <a:latin typeface="Cambria Math" panose="02040503050406030204" pitchFamily="18" charset="0"/>
+                              </a:rPr>
+                              <m:t>3</m:t>
+                            </m:r>
+                          </m:sub>
+                          <m:sup>
+                            <m:r>
+                              <a:rPr lang="en-US" altLang="ko-KR" b="0" i="1" smtClean="0">
+                                <a:latin typeface="Cambria Math" panose="02040503050406030204" pitchFamily="18" charset="0"/>
+                              </a:rPr>
+                              <m:t>3</m:t>
+                            </m:r>
+                          </m:sup>
+                        </m:sSubSup>
+                      </m:oMath>
+                    </m:oMathPara>
+                  </a14:m>
+                  <a:endParaRPr lang="ko-KR" altLang="en-US"/>
+                </a:p>
+              </p:txBody>
+            </p:sp>
+          </mc:Choice>
+          <mc:Fallback>
+            <p:sp>
+              <p:nvSpPr>
+                <p:cNvPr id="55" name="직사각형 54"/>
+                <p:cNvSpPr>
+                  <a:spLocks noRot="1" noChangeAspect="1" noMove="1" noResize="1" noEditPoints="1" noAdjustHandles="1" noChangeArrowheads="1" noChangeShapeType="1" noTextEdit="1"/>
+                </p:cNvSpPr>
+                <p:nvPr/>
+              </p:nvSpPr>
+              <p:spPr>
+                <a:xfrm>
+                  <a:off x="2296729" y="716923"/>
+                  <a:ext cx="521938" cy="373051"/>
+                </a:xfrm>
+                <a:prstGeom prst="rect">
+                  <a:avLst/>
+                </a:prstGeom>
+                <a:blipFill rotWithShape="0">
+                  <a:blip r:embed="rId16"/>
+                  <a:stretch>
+                    <a:fillRect b="-3279"/>
+                  </a:stretch>
+                </a:blipFill>
+              </p:spPr>
+              <p:txBody>
+                <a:bodyPr/>
+                <a:lstStyle/>
+                <a:p>
+                  <a:r>
+                    <a:rPr lang="ko-KR" altLang="en-US">
+                      <a:noFill/>
+                    </a:rPr>
+                    <a:t> </a:t>
+                  </a:r>
+                </a:p>
+              </p:txBody>
+            </p:sp>
+          </mc:Fallback>
+        </mc:AlternateContent>
+      </p:grpSp>
+      <p:grpSp>
+        <p:nvGrpSpPr>
+          <p:cNvPr id="66" name="그룹 65"/>
+          <p:cNvGrpSpPr/>
+          <p:nvPr/>
+        </p:nvGrpSpPr>
+        <p:grpSpPr>
+          <a:xfrm>
+            <a:off x="5351875" y="1569182"/>
+            <a:ext cx="1262291" cy="1441621"/>
+            <a:chOff x="2595409" y="586002"/>
+            <a:chExt cx="1262291" cy="1441621"/>
+          </a:xfrm>
+        </p:grpSpPr>
+        <p:grpSp>
+          <p:nvGrpSpPr>
+            <p:cNvPr id="67" name="그룹 66"/>
+            <p:cNvGrpSpPr/>
+            <p:nvPr/>
+          </p:nvGrpSpPr>
+          <p:grpSpPr>
+            <a:xfrm>
+              <a:off x="2595409" y="882181"/>
+              <a:ext cx="813619" cy="833353"/>
+              <a:chOff x="2691590" y="800099"/>
+              <a:chExt cx="813619" cy="833353"/>
+            </a:xfrm>
+          </p:grpSpPr>
+          <p:cxnSp>
+            <p:nvCxnSpPr>
+              <p:cNvPr id="71" name="직선 화살표 연결선 70"/>
+              <p:cNvCxnSpPr/>
+              <p:nvPr/>
+            </p:nvCxnSpPr>
+            <p:spPr>
+              <a:xfrm flipH="1">
+                <a:off x="2691590" y="1270613"/>
+                <a:ext cx="267511" cy="362839"/>
+              </a:xfrm>
+              <a:prstGeom prst="straightConnector1">
+                <a:avLst/>
+              </a:prstGeom>
+              <a:ln w="28575">
+                <a:solidFill>
+                  <a:schemeClr val="tx1"/>
+                </a:solidFill>
+                <a:headEnd w="lg" len="lg"/>
+                <a:tailEnd type="triangle" w="lg" len="lg"/>
+              </a:ln>
+            </p:spPr>
+            <p:style>
+              <a:lnRef idx="1">
+                <a:schemeClr val="accent1"/>
+              </a:lnRef>
+              <a:fillRef idx="0">
+                <a:schemeClr val="accent1"/>
+              </a:fillRef>
+              <a:effectRef idx="0">
+                <a:schemeClr val="accent1"/>
+              </a:effectRef>
+              <a:fontRef idx="minor">
+                <a:schemeClr val="tx1"/>
+              </a:fontRef>
+            </p:style>
+          </p:cxnSp>
+          <p:cxnSp>
+            <p:nvCxnSpPr>
+              <p:cNvPr id="72" name="직선 화살표 연결선 71"/>
+              <p:cNvCxnSpPr/>
+              <p:nvPr/>
+            </p:nvCxnSpPr>
+            <p:spPr>
+              <a:xfrm>
+                <a:off x="2948690" y="1284748"/>
+                <a:ext cx="556519" cy="254"/>
+              </a:xfrm>
+              <a:prstGeom prst="straightConnector1">
+                <a:avLst/>
+              </a:prstGeom>
+              <a:ln w="28575">
+                <a:solidFill>
+                  <a:schemeClr val="tx1"/>
+                </a:solidFill>
+                <a:headEnd w="lg" len="lg"/>
+                <a:tailEnd type="triangle" w="lg" len="lg"/>
+              </a:ln>
+            </p:spPr>
+            <p:style>
+              <a:lnRef idx="1">
+                <a:schemeClr val="accent1"/>
+              </a:lnRef>
+              <a:fillRef idx="0">
+                <a:schemeClr val="accent1"/>
+              </a:fillRef>
+              <a:effectRef idx="0">
+                <a:schemeClr val="accent1"/>
+              </a:effectRef>
+              <a:fontRef idx="minor">
+                <a:schemeClr val="tx1"/>
+              </a:fontRef>
+            </p:style>
+          </p:cxnSp>
+          <p:cxnSp>
+            <p:nvCxnSpPr>
+              <p:cNvPr id="73" name="직선 화살표 연결선 72"/>
+              <p:cNvCxnSpPr/>
+              <p:nvPr/>
+            </p:nvCxnSpPr>
+            <p:spPr>
+              <a:xfrm flipH="1" flipV="1">
+                <a:off x="2946400" y="800099"/>
+                <a:ext cx="0" cy="504000"/>
+              </a:xfrm>
+              <a:prstGeom prst="straightConnector1">
+                <a:avLst/>
+              </a:prstGeom>
+              <a:ln w="28575">
+                <a:solidFill>
+                  <a:schemeClr val="tx1"/>
+                </a:solidFill>
+                <a:headEnd w="lg" len="lg"/>
+                <a:tailEnd type="triangle" w="lg" len="lg"/>
+              </a:ln>
+            </p:spPr>
+            <p:style>
+              <a:lnRef idx="1">
+                <a:schemeClr val="accent1"/>
+              </a:lnRef>
+              <a:fillRef idx="0">
+                <a:schemeClr val="accent1"/>
+              </a:fillRef>
+              <a:effectRef idx="0">
+                <a:schemeClr val="accent1"/>
+              </a:effectRef>
+              <a:fontRef idx="minor">
+                <a:schemeClr val="tx1"/>
+              </a:fontRef>
+            </p:style>
+          </p:cxnSp>
+        </p:grpSp>
+        <mc:AlternateContent xmlns:mc="http://schemas.openxmlformats.org/markup-compatibility/2006">
+          <mc:Choice xmlns:a14="http://schemas.microsoft.com/office/drawing/2010/main" Requires="a14">
+            <p:sp>
+              <p:nvSpPr>
+                <p:cNvPr id="68" name="직사각형 67"/>
+                <p:cNvSpPr/>
+                <p:nvPr/>
+              </p:nvSpPr>
+              <p:spPr>
+                <a:xfrm>
+                  <a:off x="2657908" y="1654572"/>
+                  <a:ext cx="521938" cy="373051"/>
+                </a:xfrm>
+                <a:prstGeom prst="rect">
+                  <a:avLst/>
+                </a:prstGeom>
+              </p:spPr>
+              <p:txBody>
+                <a:bodyPr wrap="none">
+                  <a:spAutoFit/>
+                </a:bodyPr>
+                <a:lstStyle/>
+                <a:p>
+                  <a14:m>
+                    <m:oMathPara xmlns:m="http://schemas.openxmlformats.org/officeDocument/2006/math">
+                      <m:oMathParaPr>
+                        <m:jc m:val="centerGroup"/>
+                      </m:oMathParaPr>
+                      <m:oMath xmlns:m="http://schemas.openxmlformats.org/officeDocument/2006/math">
+                        <m:sSubSup>
+                          <m:sSubSupPr>
+                            <m:ctrlPr>
+                              <a:rPr lang="en-US" altLang="ko-KR" i="1" smtClean="0">
+                                <a:latin typeface="Cambria Math" panose="02040503050406030204" pitchFamily="18" charset="0"/>
+                              </a:rPr>
+                            </m:ctrlPr>
+                          </m:sSubSupPr>
+                          <m:e>
+                            <m:r>
+                              <a:rPr lang="en-US" altLang="ko-KR" b="0" i="1" smtClean="0">
+                                <a:latin typeface="Cambria Math" panose="02040503050406030204" pitchFamily="18" charset="0"/>
+                              </a:rPr>
+                              <m:t>𝑇</m:t>
+                            </m:r>
+                          </m:e>
+                          <m:sub>
+                            <m:r>
+                              <a:rPr lang="en-US" altLang="ko-KR" b="0" i="1" smtClean="0">
+                                <a:latin typeface="Cambria Math" panose="02040503050406030204" pitchFamily="18" charset="0"/>
+                              </a:rPr>
+                              <m:t>2</m:t>
+                            </m:r>
+                          </m:sub>
+                          <m:sup>
+                            <m:r>
+                              <a:rPr lang="en-US" altLang="ko-KR" b="0" i="1" smtClean="0">
+                                <a:latin typeface="Cambria Math" panose="02040503050406030204" pitchFamily="18" charset="0"/>
+                              </a:rPr>
+                              <m:t>1</m:t>
+                            </m:r>
+                          </m:sup>
+                        </m:sSubSup>
+                      </m:oMath>
+                    </m:oMathPara>
+                  </a14:m>
+                  <a:endParaRPr lang="ko-KR" altLang="en-US"/>
+                </a:p>
+              </p:txBody>
+            </p:sp>
+          </mc:Choice>
+          <mc:Fallback>
+            <p:sp>
+              <p:nvSpPr>
+                <p:cNvPr id="68" name="직사각형 67"/>
+                <p:cNvSpPr>
+                  <a:spLocks noRot="1" noChangeAspect="1" noMove="1" noResize="1" noEditPoints="1" noAdjustHandles="1" noChangeArrowheads="1" noChangeShapeType="1" noTextEdit="1"/>
+                </p:cNvSpPr>
+                <p:nvPr/>
+              </p:nvSpPr>
+              <p:spPr>
+                <a:xfrm>
+                  <a:off x="2657908" y="1654572"/>
+                  <a:ext cx="521938" cy="373051"/>
+                </a:xfrm>
+                <a:prstGeom prst="rect">
+                  <a:avLst/>
+                </a:prstGeom>
+                <a:blipFill rotWithShape="0">
+                  <a:blip r:embed="rId17"/>
+                  <a:stretch>
+                    <a:fillRect b="-3279"/>
+                  </a:stretch>
+                </a:blipFill>
+              </p:spPr>
+              <p:txBody>
+                <a:bodyPr/>
+                <a:lstStyle/>
+                <a:p>
+                  <a:r>
+                    <a:rPr lang="ko-KR" altLang="en-US">
+                      <a:noFill/>
+                    </a:rPr>
+                    <a:t> </a:t>
+                  </a:r>
+                </a:p>
+              </p:txBody>
+            </p:sp>
+          </mc:Fallback>
+        </mc:AlternateContent>
+        <mc:AlternateContent xmlns:mc="http://schemas.openxmlformats.org/markup-compatibility/2006">
+          <mc:Choice xmlns:a14="http://schemas.microsoft.com/office/drawing/2010/main" Requires="a14">
+            <p:sp>
+              <p:nvSpPr>
+                <p:cNvPr id="69" name="직사각형 68"/>
+                <p:cNvSpPr/>
+                <p:nvPr/>
+              </p:nvSpPr>
+              <p:spPr>
+                <a:xfrm>
+                  <a:off x="3335762" y="1211850"/>
+                  <a:ext cx="521938" cy="373051"/>
+                </a:xfrm>
+                <a:prstGeom prst="rect">
+                  <a:avLst/>
+                </a:prstGeom>
+              </p:spPr>
+              <p:txBody>
+                <a:bodyPr wrap="none">
+                  <a:spAutoFit/>
+                </a:bodyPr>
+                <a:lstStyle/>
+                <a:p>
+                  <a14:m>
+                    <m:oMathPara xmlns:m="http://schemas.openxmlformats.org/officeDocument/2006/math">
+                      <m:oMathParaPr>
+                        <m:jc m:val="centerGroup"/>
+                      </m:oMathParaPr>
+                      <m:oMath xmlns:m="http://schemas.openxmlformats.org/officeDocument/2006/math">
+                        <m:sSubSup>
+                          <m:sSubSupPr>
+                            <m:ctrlPr>
+                              <a:rPr lang="en-US" altLang="ko-KR" i="1" smtClean="0">
+                                <a:latin typeface="Cambria Math" panose="02040503050406030204" pitchFamily="18" charset="0"/>
+                              </a:rPr>
+                            </m:ctrlPr>
+                          </m:sSubSupPr>
+                          <m:e>
+                            <m:r>
+                              <a:rPr lang="en-US" altLang="ko-KR" b="0" i="1" smtClean="0">
+                                <a:latin typeface="Cambria Math" panose="02040503050406030204" pitchFamily="18" charset="0"/>
+                              </a:rPr>
+                              <m:t>𝑇</m:t>
+                            </m:r>
+                          </m:e>
+                          <m:sub>
+                            <m:r>
+                              <a:rPr lang="en-US" altLang="ko-KR" b="0" i="1" smtClean="0">
+                                <a:latin typeface="Cambria Math" panose="02040503050406030204" pitchFamily="18" charset="0"/>
+                              </a:rPr>
+                              <m:t>2</m:t>
+                            </m:r>
+                          </m:sub>
+                          <m:sup>
+                            <m:r>
+                              <a:rPr lang="en-US" altLang="ko-KR" b="0" i="1" smtClean="0">
+                                <a:latin typeface="Cambria Math" panose="02040503050406030204" pitchFamily="18" charset="0"/>
+                              </a:rPr>
+                              <m:t>2</m:t>
+                            </m:r>
+                          </m:sup>
+                        </m:sSubSup>
+                      </m:oMath>
+                    </m:oMathPara>
+                  </a14:m>
+                  <a:endParaRPr lang="ko-KR" altLang="en-US"/>
+                </a:p>
+              </p:txBody>
+            </p:sp>
+          </mc:Choice>
+          <mc:Fallback>
+            <p:sp>
+              <p:nvSpPr>
+                <p:cNvPr id="69" name="직사각형 68"/>
+                <p:cNvSpPr>
+                  <a:spLocks noRot="1" noChangeAspect="1" noMove="1" noResize="1" noEditPoints="1" noAdjustHandles="1" noChangeArrowheads="1" noChangeShapeType="1" noTextEdit="1"/>
+                </p:cNvSpPr>
+                <p:nvPr/>
+              </p:nvSpPr>
+              <p:spPr>
+                <a:xfrm>
+                  <a:off x="3335762" y="1211850"/>
+                  <a:ext cx="521938" cy="373051"/>
+                </a:xfrm>
+                <a:prstGeom prst="rect">
+                  <a:avLst/>
+                </a:prstGeom>
+                <a:blipFill rotWithShape="0">
+                  <a:blip r:embed="rId18"/>
+                  <a:stretch>
+                    <a:fillRect b="-3279"/>
+                  </a:stretch>
+                </a:blipFill>
+              </p:spPr>
+              <p:txBody>
+                <a:bodyPr/>
+                <a:lstStyle/>
+                <a:p>
+                  <a:r>
+                    <a:rPr lang="ko-KR" altLang="en-US">
+                      <a:noFill/>
+                    </a:rPr>
+                    <a:t> </a:t>
+                  </a:r>
+                </a:p>
+              </p:txBody>
+            </p:sp>
+          </mc:Fallback>
+        </mc:AlternateContent>
+        <mc:AlternateContent xmlns:mc="http://schemas.openxmlformats.org/markup-compatibility/2006">
+          <mc:Choice xmlns:a14="http://schemas.microsoft.com/office/drawing/2010/main" Requires="a14">
+            <p:sp>
+              <p:nvSpPr>
+                <p:cNvPr id="70" name="직사각형 69"/>
+                <p:cNvSpPr/>
+                <p:nvPr/>
+              </p:nvSpPr>
+              <p:spPr>
+                <a:xfrm>
+                  <a:off x="2918877" y="586002"/>
+                  <a:ext cx="521938" cy="373051"/>
+                </a:xfrm>
+                <a:prstGeom prst="rect">
+                  <a:avLst/>
+                </a:prstGeom>
+              </p:spPr>
+              <p:txBody>
+                <a:bodyPr wrap="none">
+                  <a:spAutoFit/>
+                </a:bodyPr>
+                <a:lstStyle/>
+                <a:p>
+                  <a14:m>
+                    <m:oMathPara xmlns:m="http://schemas.openxmlformats.org/officeDocument/2006/math">
+                      <m:oMathParaPr>
+                        <m:jc m:val="centerGroup"/>
+                      </m:oMathParaPr>
+                      <m:oMath xmlns:m="http://schemas.openxmlformats.org/officeDocument/2006/math">
+                        <m:sSubSup>
+                          <m:sSubSupPr>
+                            <m:ctrlPr>
+                              <a:rPr lang="en-US" altLang="ko-KR" i="1" smtClean="0">
+                                <a:latin typeface="Cambria Math" panose="02040503050406030204" pitchFamily="18" charset="0"/>
+                              </a:rPr>
+                            </m:ctrlPr>
+                          </m:sSubSupPr>
+                          <m:e>
+                            <m:r>
+                              <a:rPr lang="en-US" altLang="ko-KR" b="0" i="1" smtClean="0">
+                                <a:latin typeface="Cambria Math" panose="02040503050406030204" pitchFamily="18" charset="0"/>
+                              </a:rPr>
+                              <m:t>𝑇</m:t>
+                            </m:r>
+                          </m:e>
+                          <m:sub>
+                            <m:r>
+                              <a:rPr lang="en-US" altLang="ko-KR" b="0" i="1" smtClean="0">
+                                <a:latin typeface="Cambria Math" panose="02040503050406030204" pitchFamily="18" charset="0"/>
+                              </a:rPr>
+                              <m:t>2</m:t>
+                            </m:r>
+                          </m:sub>
+                          <m:sup>
+                            <m:r>
+                              <a:rPr lang="en-US" altLang="ko-KR" b="0" i="1" smtClean="0">
+                                <a:latin typeface="Cambria Math" panose="02040503050406030204" pitchFamily="18" charset="0"/>
+                              </a:rPr>
+                              <m:t>3</m:t>
+                            </m:r>
+                          </m:sup>
+                        </m:sSubSup>
+                      </m:oMath>
+                    </m:oMathPara>
+                  </a14:m>
+                  <a:endParaRPr lang="ko-KR" altLang="en-US"/>
+                </a:p>
+              </p:txBody>
+            </p:sp>
+          </mc:Choice>
+          <mc:Fallback>
+            <p:sp>
+              <p:nvSpPr>
+                <p:cNvPr id="70" name="직사각형 69"/>
+                <p:cNvSpPr>
+                  <a:spLocks noRot="1" noChangeAspect="1" noMove="1" noResize="1" noEditPoints="1" noAdjustHandles="1" noChangeArrowheads="1" noChangeShapeType="1" noTextEdit="1"/>
+                </p:cNvSpPr>
+                <p:nvPr/>
+              </p:nvSpPr>
+              <p:spPr>
+                <a:xfrm>
+                  <a:off x="2918877" y="586002"/>
+                  <a:ext cx="521938" cy="373051"/>
+                </a:xfrm>
+                <a:prstGeom prst="rect">
+                  <a:avLst/>
+                </a:prstGeom>
+                <a:blipFill rotWithShape="0">
+                  <a:blip r:embed="rId19"/>
+                  <a:stretch>
+                    <a:fillRect b="-1613"/>
+                  </a:stretch>
+                </a:blipFill>
+              </p:spPr>
+              <p:txBody>
+                <a:bodyPr/>
+                <a:lstStyle/>
+                <a:p>
+                  <a:r>
+                    <a:rPr lang="ko-KR" altLang="en-US">
+                      <a:noFill/>
+                    </a:rPr>
+                    <a:t> </a:t>
+                  </a:r>
+                </a:p>
+              </p:txBody>
+            </p:sp>
+          </mc:Fallback>
+        </mc:AlternateContent>
+      </p:grpSp>
+      <p:grpSp>
+        <p:nvGrpSpPr>
+          <p:cNvPr id="74" name="그룹 73"/>
+          <p:cNvGrpSpPr/>
+          <p:nvPr/>
+        </p:nvGrpSpPr>
+        <p:grpSpPr>
+          <a:xfrm>
+            <a:off x="3208631" y="2110311"/>
+            <a:ext cx="1601877" cy="1589332"/>
+            <a:chOff x="2255505" y="553779"/>
+            <a:chExt cx="1601877" cy="1589332"/>
+          </a:xfrm>
+        </p:grpSpPr>
+        <p:grpSp>
+          <p:nvGrpSpPr>
+            <p:cNvPr id="75" name="그룹 74"/>
+            <p:cNvGrpSpPr/>
+            <p:nvPr/>
+          </p:nvGrpSpPr>
+          <p:grpSpPr>
+            <a:xfrm>
+              <a:off x="2595409" y="882181"/>
+              <a:ext cx="744691" cy="833353"/>
+              <a:chOff x="2691590" y="800099"/>
+              <a:chExt cx="744691" cy="833353"/>
+            </a:xfrm>
+          </p:grpSpPr>
+          <p:cxnSp>
+            <p:nvCxnSpPr>
+              <p:cNvPr id="79" name="직선 화살표 연결선 78"/>
+              <p:cNvCxnSpPr/>
+              <p:nvPr/>
+            </p:nvCxnSpPr>
+            <p:spPr>
+              <a:xfrm flipH="1">
+                <a:off x="2691590" y="1270613"/>
+                <a:ext cx="267511" cy="362839"/>
+              </a:xfrm>
+              <a:prstGeom prst="straightConnector1">
+                <a:avLst/>
+              </a:prstGeom>
+              <a:ln w="28575">
+                <a:solidFill>
+                  <a:schemeClr val="tx1"/>
+                </a:solidFill>
+                <a:headEnd w="lg" len="lg"/>
+                <a:tailEnd type="triangle" w="lg" len="lg"/>
+              </a:ln>
+            </p:spPr>
+            <p:style>
+              <a:lnRef idx="1">
+                <a:schemeClr val="accent1"/>
+              </a:lnRef>
+              <a:fillRef idx="0">
+                <a:schemeClr val="accent1"/>
+              </a:fillRef>
+              <a:effectRef idx="0">
+                <a:schemeClr val="accent1"/>
+              </a:effectRef>
+              <a:fontRef idx="minor">
+                <a:schemeClr val="tx1"/>
+              </a:fontRef>
+            </p:style>
+          </p:cxnSp>
+          <p:cxnSp>
+            <p:nvCxnSpPr>
+              <p:cNvPr id="80" name="직선 화살표 연결선 79"/>
+              <p:cNvCxnSpPr/>
+              <p:nvPr/>
+            </p:nvCxnSpPr>
+            <p:spPr>
+              <a:xfrm flipV="1">
+                <a:off x="2948690" y="1276818"/>
+                <a:ext cx="487591" cy="7930"/>
+              </a:xfrm>
+              <a:prstGeom prst="straightConnector1">
+                <a:avLst/>
+              </a:prstGeom>
+              <a:ln w="28575">
+                <a:solidFill>
+                  <a:schemeClr val="tx1"/>
+                </a:solidFill>
+                <a:headEnd w="lg" len="lg"/>
+                <a:tailEnd type="triangle" w="lg" len="lg"/>
+              </a:ln>
+            </p:spPr>
+            <p:style>
+              <a:lnRef idx="1">
+                <a:schemeClr val="accent1"/>
+              </a:lnRef>
+              <a:fillRef idx="0">
+                <a:schemeClr val="accent1"/>
+              </a:fillRef>
+              <a:effectRef idx="0">
+                <a:schemeClr val="accent1"/>
+              </a:effectRef>
+              <a:fontRef idx="minor">
+                <a:schemeClr val="tx1"/>
+              </a:fontRef>
+            </p:style>
+          </p:cxnSp>
+          <p:cxnSp>
+            <p:nvCxnSpPr>
+              <p:cNvPr id="81" name="직선 화살표 연결선 80"/>
+              <p:cNvCxnSpPr/>
+              <p:nvPr/>
+            </p:nvCxnSpPr>
+            <p:spPr>
+              <a:xfrm flipH="1" flipV="1">
+                <a:off x="2946400" y="800099"/>
+                <a:ext cx="0" cy="504000"/>
+              </a:xfrm>
+              <a:prstGeom prst="straightConnector1">
+                <a:avLst/>
+              </a:prstGeom>
+              <a:ln w="28575">
+                <a:solidFill>
+                  <a:schemeClr val="tx1"/>
+                </a:solidFill>
+                <a:headEnd w="lg" len="lg"/>
+                <a:tailEnd type="triangle" w="lg" len="lg"/>
+              </a:ln>
+            </p:spPr>
+            <p:style>
+              <a:lnRef idx="1">
+                <a:schemeClr val="accent1"/>
+              </a:lnRef>
+              <a:fillRef idx="0">
+                <a:schemeClr val="accent1"/>
+              </a:fillRef>
+              <a:effectRef idx="0">
+                <a:schemeClr val="accent1"/>
+              </a:effectRef>
+              <a:fontRef idx="minor">
+                <a:schemeClr val="tx1"/>
+              </a:fontRef>
+            </p:style>
+          </p:cxnSp>
+        </p:grpSp>
+        <mc:AlternateContent xmlns:mc="http://schemas.openxmlformats.org/markup-compatibility/2006">
+          <mc:Choice xmlns:a14="http://schemas.microsoft.com/office/drawing/2010/main" Requires="a14">
+            <p:sp>
+              <p:nvSpPr>
+                <p:cNvPr id="76" name="직사각형 75"/>
+                <p:cNvSpPr/>
+                <p:nvPr/>
+              </p:nvSpPr>
+              <p:spPr>
+                <a:xfrm>
+                  <a:off x="2255505" y="1770060"/>
+                  <a:ext cx="521938" cy="373051"/>
+                </a:xfrm>
+                <a:prstGeom prst="rect">
+                  <a:avLst/>
+                </a:prstGeom>
+              </p:spPr>
+              <p:txBody>
+                <a:bodyPr wrap="none">
+                  <a:spAutoFit/>
+                </a:bodyPr>
+                <a:lstStyle/>
+                <a:p>
+                  <a14:m>
+                    <m:oMathPara xmlns:m="http://schemas.openxmlformats.org/officeDocument/2006/math">
+                      <m:oMathParaPr>
+                        <m:jc m:val="centerGroup"/>
+                      </m:oMathParaPr>
+                      <m:oMath xmlns:m="http://schemas.openxmlformats.org/officeDocument/2006/math">
+                        <m:sSubSup>
+                          <m:sSubSupPr>
+                            <m:ctrlPr>
+                              <a:rPr lang="en-US" altLang="ko-KR" i="1" smtClean="0">
+                                <a:latin typeface="Cambria Math" panose="02040503050406030204" pitchFamily="18" charset="0"/>
+                              </a:rPr>
+                            </m:ctrlPr>
+                          </m:sSubSupPr>
+                          <m:e>
+                            <m:r>
+                              <a:rPr lang="en-US" altLang="ko-KR" b="0" i="1" smtClean="0">
+                                <a:latin typeface="Cambria Math" panose="02040503050406030204" pitchFamily="18" charset="0"/>
+                              </a:rPr>
+                              <m:t>𝑇</m:t>
+                            </m:r>
+                          </m:e>
+                          <m:sub>
+                            <m:r>
+                              <a:rPr lang="en-US" altLang="ko-KR" b="0" i="1" smtClean="0">
+                                <a:latin typeface="Cambria Math" panose="02040503050406030204" pitchFamily="18" charset="0"/>
+                              </a:rPr>
+                              <m:t>1</m:t>
+                            </m:r>
+                          </m:sub>
+                          <m:sup>
+                            <m:r>
+                              <a:rPr lang="en-US" altLang="ko-KR" b="0" i="1" smtClean="0">
+                                <a:latin typeface="Cambria Math" panose="02040503050406030204" pitchFamily="18" charset="0"/>
+                              </a:rPr>
+                              <m:t>1</m:t>
+                            </m:r>
+                          </m:sup>
+                        </m:sSubSup>
+                      </m:oMath>
+                    </m:oMathPara>
+                  </a14:m>
+                  <a:endParaRPr lang="ko-KR" altLang="en-US"/>
+                </a:p>
+              </p:txBody>
+            </p:sp>
+          </mc:Choice>
+          <mc:Fallback>
+            <p:sp>
+              <p:nvSpPr>
+                <p:cNvPr id="76" name="직사각형 75"/>
+                <p:cNvSpPr>
+                  <a:spLocks noRot="1" noChangeAspect="1" noMove="1" noResize="1" noEditPoints="1" noAdjustHandles="1" noChangeArrowheads="1" noChangeShapeType="1" noTextEdit="1"/>
+                </p:cNvSpPr>
+                <p:nvPr/>
+              </p:nvSpPr>
+              <p:spPr>
+                <a:xfrm>
+                  <a:off x="2255505" y="1770060"/>
+                  <a:ext cx="521938" cy="373051"/>
+                </a:xfrm>
+                <a:prstGeom prst="rect">
+                  <a:avLst/>
+                </a:prstGeom>
+                <a:blipFill rotWithShape="0">
+                  <a:blip r:embed="rId20"/>
+                  <a:stretch>
+                    <a:fillRect b="-3279"/>
+                  </a:stretch>
+                </a:blipFill>
+              </p:spPr>
+              <p:txBody>
+                <a:bodyPr/>
+                <a:lstStyle/>
+                <a:p>
+                  <a:r>
+                    <a:rPr lang="ko-KR" altLang="en-US">
+                      <a:noFill/>
+                    </a:rPr>
+                    <a:t> </a:t>
+                  </a:r>
+                </a:p>
+              </p:txBody>
+            </p:sp>
+          </mc:Fallback>
+        </mc:AlternateContent>
+        <mc:AlternateContent xmlns:mc="http://schemas.openxmlformats.org/markup-compatibility/2006">
+          <mc:Choice xmlns:a14="http://schemas.microsoft.com/office/drawing/2010/main" Requires="a14">
+            <p:sp>
+              <p:nvSpPr>
+                <p:cNvPr id="77" name="직사각형 76"/>
+                <p:cNvSpPr/>
+                <p:nvPr/>
+              </p:nvSpPr>
+              <p:spPr>
+                <a:xfrm>
+                  <a:off x="3335444" y="1134181"/>
+                  <a:ext cx="521938" cy="373051"/>
+                </a:xfrm>
+                <a:prstGeom prst="rect">
+                  <a:avLst/>
+                </a:prstGeom>
+              </p:spPr>
+              <p:txBody>
+                <a:bodyPr wrap="none">
+                  <a:spAutoFit/>
+                </a:bodyPr>
+                <a:lstStyle/>
+                <a:p>
+                  <a14:m>
+                    <m:oMathPara xmlns:m="http://schemas.openxmlformats.org/officeDocument/2006/math">
+                      <m:oMathParaPr>
+                        <m:jc m:val="centerGroup"/>
+                      </m:oMathParaPr>
+                      <m:oMath xmlns:m="http://schemas.openxmlformats.org/officeDocument/2006/math">
+                        <m:sSubSup>
+                          <m:sSubSupPr>
+                            <m:ctrlPr>
+                              <a:rPr lang="en-US" altLang="ko-KR" i="1" smtClean="0">
+                                <a:latin typeface="Cambria Math" panose="02040503050406030204" pitchFamily="18" charset="0"/>
+                              </a:rPr>
+                            </m:ctrlPr>
+                          </m:sSubSupPr>
+                          <m:e>
+                            <m:r>
+                              <a:rPr lang="en-US" altLang="ko-KR" b="0" i="1" smtClean="0">
+                                <a:latin typeface="Cambria Math" panose="02040503050406030204" pitchFamily="18" charset="0"/>
+                              </a:rPr>
+                              <m:t>𝑇</m:t>
+                            </m:r>
+                          </m:e>
+                          <m:sub>
+                            <m:r>
+                              <a:rPr lang="en-US" altLang="ko-KR" b="0" i="1" smtClean="0">
+                                <a:latin typeface="Cambria Math" panose="02040503050406030204" pitchFamily="18" charset="0"/>
+                              </a:rPr>
+                              <m:t>1</m:t>
+                            </m:r>
+                          </m:sub>
+                          <m:sup>
+                            <m:r>
+                              <a:rPr lang="en-US" altLang="ko-KR" b="0" i="1" smtClean="0">
+                                <a:latin typeface="Cambria Math" panose="02040503050406030204" pitchFamily="18" charset="0"/>
+                              </a:rPr>
+                              <m:t>2</m:t>
+                            </m:r>
+                          </m:sup>
+                        </m:sSubSup>
+                      </m:oMath>
+                    </m:oMathPara>
+                  </a14:m>
+                  <a:endParaRPr lang="ko-KR" altLang="en-US"/>
+                </a:p>
+              </p:txBody>
+            </p:sp>
+          </mc:Choice>
+          <mc:Fallback>
+            <p:sp>
+              <p:nvSpPr>
+                <p:cNvPr id="77" name="직사각형 76"/>
+                <p:cNvSpPr>
+                  <a:spLocks noRot="1" noChangeAspect="1" noMove="1" noResize="1" noEditPoints="1" noAdjustHandles="1" noChangeArrowheads="1" noChangeShapeType="1" noTextEdit="1"/>
+                </p:cNvSpPr>
+                <p:nvPr/>
+              </p:nvSpPr>
+              <p:spPr>
+                <a:xfrm>
+                  <a:off x="3335444" y="1134181"/>
+                  <a:ext cx="521938" cy="373051"/>
+                </a:xfrm>
+                <a:prstGeom prst="rect">
+                  <a:avLst/>
+                </a:prstGeom>
+                <a:blipFill rotWithShape="0">
+                  <a:blip r:embed="rId21"/>
+                  <a:stretch>
+                    <a:fillRect b="-1613"/>
+                  </a:stretch>
+                </a:blipFill>
+              </p:spPr>
+              <p:txBody>
+                <a:bodyPr/>
+                <a:lstStyle/>
+                <a:p>
+                  <a:r>
+                    <a:rPr lang="ko-KR" altLang="en-US">
+                      <a:noFill/>
+                    </a:rPr>
+                    <a:t> </a:t>
+                  </a:r>
+                </a:p>
+              </p:txBody>
+            </p:sp>
+          </mc:Fallback>
+        </mc:AlternateContent>
+        <mc:AlternateContent xmlns:mc="http://schemas.openxmlformats.org/markup-compatibility/2006">
+          <mc:Choice xmlns:a14="http://schemas.microsoft.com/office/drawing/2010/main" Requires="a14">
+            <p:sp>
+              <p:nvSpPr>
+                <p:cNvPr id="78" name="직사각형 77"/>
+                <p:cNvSpPr/>
+                <p:nvPr/>
+              </p:nvSpPr>
+              <p:spPr>
+                <a:xfrm>
+                  <a:off x="2768650" y="553779"/>
+                  <a:ext cx="521938" cy="373051"/>
+                </a:xfrm>
+                <a:prstGeom prst="rect">
+                  <a:avLst/>
+                </a:prstGeom>
+              </p:spPr>
+              <p:txBody>
+                <a:bodyPr wrap="none">
+                  <a:spAutoFit/>
+                </a:bodyPr>
+                <a:lstStyle/>
+                <a:p>
+                  <a14:m>
+                    <m:oMathPara xmlns:m="http://schemas.openxmlformats.org/officeDocument/2006/math">
+                      <m:oMathParaPr>
+                        <m:jc m:val="centerGroup"/>
+                      </m:oMathParaPr>
+                      <m:oMath xmlns:m="http://schemas.openxmlformats.org/officeDocument/2006/math">
+                        <m:sSubSup>
+                          <m:sSubSupPr>
+                            <m:ctrlPr>
+                              <a:rPr lang="en-US" altLang="ko-KR" i="1" smtClean="0">
+                                <a:latin typeface="Cambria Math" panose="02040503050406030204" pitchFamily="18" charset="0"/>
+                              </a:rPr>
+                            </m:ctrlPr>
+                          </m:sSubSupPr>
+                          <m:e>
+                            <m:r>
+                              <a:rPr lang="en-US" altLang="ko-KR" b="0" i="1" smtClean="0">
+                                <a:latin typeface="Cambria Math" panose="02040503050406030204" pitchFamily="18" charset="0"/>
+                              </a:rPr>
+                              <m:t>𝑇</m:t>
+                            </m:r>
+                          </m:e>
+                          <m:sub>
+                            <m:r>
+                              <a:rPr lang="en-US" altLang="ko-KR" b="0" i="1" smtClean="0">
+                                <a:latin typeface="Cambria Math" panose="02040503050406030204" pitchFamily="18" charset="0"/>
+                              </a:rPr>
+                              <m:t>1</m:t>
+                            </m:r>
+                          </m:sub>
+                          <m:sup>
+                            <m:r>
+                              <a:rPr lang="en-US" altLang="ko-KR" b="0" i="1" smtClean="0">
+                                <a:latin typeface="Cambria Math" panose="02040503050406030204" pitchFamily="18" charset="0"/>
+                              </a:rPr>
+                              <m:t>3</m:t>
+                            </m:r>
+                          </m:sup>
+                        </m:sSubSup>
+                      </m:oMath>
+                    </m:oMathPara>
+                  </a14:m>
+                  <a:endParaRPr lang="ko-KR" altLang="en-US"/>
+                </a:p>
+              </p:txBody>
+            </p:sp>
+          </mc:Choice>
+          <mc:Fallback>
+            <p:sp>
+              <p:nvSpPr>
+                <p:cNvPr id="78" name="직사각형 77"/>
+                <p:cNvSpPr>
+                  <a:spLocks noRot="1" noChangeAspect="1" noMove="1" noResize="1" noEditPoints="1" noAdjustHandles="1" noChangeArrowheads="1" noChangeShapeType="1" noTextEdit="1"/>
+                </p:cNvSpPr>
+                <p:nvPr/>
+              </p:nvSpPr>
+              <p:spPr>
+                <a:xfrm>
+                  <a:off x="2768650" y="553779"/>
+                  <a:ext cx="521938" cy="373051"/>
+                </a:xfrm>
+                <a:prstGeom prst="rect">
+                  <a:avLst/>
+                </a:prstGeom>
+                <a:blipFill rotWithShape="0">
+                  <a:blip r:embed="rId22"/>
+                  <a:stretch>
+                    <a:fillRect b="-3279"/>
+                  </a:stretch>
+                </a:blipFill>
+              </p:spPr>
+              <p:txBody>
+                <a:bodyPr/>
+                <a:lstStyle/>
+                <a:p>
+                  <a:r>
+                    <a:rPr lang="ko-KR" altLang="en-US">
+                      <a:noFill/>
+                    </a:rPr>
+                    <a:t> </a:t>
+                  </a:r>
+                </a:p>
+              </p:txBody>
+            </p:sp>
+          </mc:Fallback>
+        </mc:AlternateContent>
+      </p:grpSp>
     </p:spTree>
     <p:extLst>
       <p:ext uri="{BB962C8B-B14F-4D97-AF65-F5344CB8AC3E}">
@@ -37099,7 +38681,7 @@
 </p:sld>
 </file>
 
-<file path=ppt/slides/slide32.xml><?xml version="1.0" encoding="utf-8"?>
+<file path=ppt/slides/slide33.xml><?xml version="1.0" encoding="utf-8"?>
 <p:sld xmlns:a="http://schemas.openxmlformats.org/drawingml/2006/main" xmlns:r="http://schemas.openxmlformats.org/officeDocument/2006/relationships" xmlns:p="http://schemas.openxmlformats.org/presentationml/2006/main">
   <p:cSld>
     <p:spTree>
@@ -37559,7 +39141,7 @@
 </p:sld>
 </file>
 
-<file path=ppt/slides/slide33.xml><?xml version="1.0" encoding="utf-8"?>
+<file path=ppt/slides/slide34.xml><?xml version="1.0" encoding="utf-8"?>
 <p:sld xmlns:a="http://schemas.openxmlformats.org/drawingml/2006/main" xmlns:r="http://schemas.openxmlformats.org/officeDocument/2006/relationships" xmlns:p="http://schemas.openxmlformats.org/presentationml/2006/main">
   <p:cSld>
     <p:spTree>
@@ -37589,7 +39171,7 @@
 </p:sld>
 </file>
 
-<file path=ppt/slides/slide34.xml><?xml version="1.0" encoding="utf-8"?>
+<file path=ppt/slides/slide35.xml><?xml version="1.0" encoding="utf-8"?>
 <p:sld xmlns:a="http://schemas.openxmlformats.org/drawingml/2006/main" xmlns:r="http://schemas.openxmlformats.org/officeDocument/2006/relationships" xmlns:p="http://schemas.openxmlformats.org/presentationml/2006/main">
   <p:cSld>
     <p:spTree>
@@ -38175,7 +39757,7 @@
 </p:sld>
 </file>
 
-<file path=ppt/slides/slide35.xml><?xml version="1.0" encoding="utf-8"?>
+<file path=ppt/slides/slide36.xml><?xml version="1.0" encoding="utf-8"?>
 <p:sld xmlns:a="http://schemas.openxmlformats.org/drawingml/2006/main" xmlns:r="http://schemas.openxmlformats.org/officeDocument/2006/relationships" xmlns:p="http://schemas.openxmlformats.org/presentationml/2006/main">
   <p:cSld>
     <p:spTree>
@@ -38197,7 +39779,7 @@
           <p:cNvPr id="4" name="내용 개체 틀 5">
             <a:extLst>
               <a:ext uri="{FF2B5EF4-FFF2-40B4-BE49-F238E27FC236}">
-                <a16:creationId xmlns:a16="http://schemas.microsoft.com/office/drawing/2014/main" xmlns="" id="{26E65B15-652C-471C-B503-9BD1A7ECA9FF}"/>
+                <a16:creationId xmlns="" xmlns:a16="http://schemas.microsoft.com/office/drawing/2014/main" id="{26E65B15-652C-471C-B503-9BD1A7ECA9FF}"/>
               </a:ext>
             </a:extLst>
           </p:cNvPr>
@@ -38226,7 +39808,7 @@
           <p:cNvPr id="5" name="그림 4">
             <a:extLst>
               <a:ext uri="{FF2B5EF4-FFF2-40B4-BE49-F238E27FC236}">
-                <a16:creationId xmlns:a16="http://schemas.microsoft.com/office/drawing/2014/main" xmlns="" id="{8D86471E-9C3A-40C3-8F27-66A11AC93C24}"/>
+                <a16:creationId xmlns="" xmlns:a16="http://schemas.microsoft.com/office/drawing/2014/main" id="{8D86471E-9C3A-40C3-8F27-66A11AC93C24}"/>
               </a:ext>
             </a:extLst>
           </p:cNvPr>
@@ -38264,7 +39846,7 @@
 </p:sld>
 </file>
 
-<file path=ppt/slides/slide36.xml><?xml version="1.0" encoding="utf-8"?>
+<file path=ppt/slides/slide37.xml><?xml version="1.0" encoding="utf-8"?>
 <p:sld xmlns:a="http://schemas.openxmlformats.org/drawingml/2006/main" xmlns:r="http://schemas.openxmlformats.org/officeDocument/2006/relationships" xmlns:p="http://schemas.openxmlformats.org/presentationml/2006/main">
   <p:cSld>
     <p:spTree>
@@ -38482,7 +40064,7 @@
 </p:sld>
 </file>
 
-<file path=ppt/slides/slide37.xml><?xml version="1.0" encoding="utf-8"?>
+<file path=ppt/slides/slide38.xml><?xml version="1.0" encoding="utf-8"?>
 <p:sld xmlns:a="http://schemas.openxmlformats.org/drawingml/2006/main" xmlns:r="http://schemas.openxmlformats.org/officeDocument/2006/relationships" xmlns:p="http://schemas.openxmlformats.org/presentationml/2006/main">
   <p:cSld>
     <p:spTree>

</xml_diff>